<commit_message>
MAJ Scipt & PP
Bon normalement, Euler et CN fonctionne bien maintenant (correction bug)
Après pour la MM, il y a des diff entre ce qui est attendu et ce qui est obtenue. Donc soit c'est normale, soit soucis au niveau de l'implémentation de la MMS au script (mais en tout cas la résolution est pour sur bonne)
Reste à voir ça, ce qui amènera à la quesiton D
</commit_message>
<xml_diff>
--- a/doc/Rapport_Devoir2.pptx
+++ b/doc/Rapport_Devoir2.pptx
@@ -133,7 +133,7 @@
 <file path=ppt/revisionInfo.xml><?xml version="1.0" encoding="utf-8"?>
 <p1510:revInfo xmlns:a="http://schemas.openxmlformats.org/drawingml/2006/main" xmlns:r="http://schemas.openxmlformats.org/officeDocument/2006/relationships" xmlns:p1510="http://schemas.microsoft.com/office/powerpoint/2015/10/main">
   <p1510:revLst>
-    <p1510:client id="{1D234A9C-22E0-43CD-8D54-3191A7902E4E}" v="882" dt="2025-02-22T19:52:54.919"/>
+    <p1510:client id="{1D234A9C-22E0-43CD-8D54-3191A7902E4E}" v="1235" dt="2025-02-23T02:48:21.274"/>
   </p1510:revLst>
 </p1510:revInfo>
 </file>
@@ -517,70 +517,6 @@
           </ac:spMkLst>
         </pc:spChg>
         <pc:spChg chg="add mod">
-          <ac:chgData name="François GLEYZON" userId="a2d04f23f7faf3ef" providerId="LiveId" clId="{8625411A-B743-4065-8137-36E899DC5753}" dt="2025-02-05T21:03:31.477" v="4163" actId="20577"/>
-          <ac:spMkLst>
-            <pc:docMk/>
-            <pc:sldMk cId="1452944335" sldId="261"/>
-            <ac:spMk id="5" creationId="{D8E09B78-47CC-84BD-A259-AA9B0A6D0125}"/>
-          </ac:spMkLst>
-        </pc:spChg>
-        <pc:spChg chg="add mod">
-          <ac:chgData name="François GLEYZON" userId="a2d04f23f7faf3ef" providerId="LiveId" clId="{8625411A-B743-4065-8137-36E899DC5753}" dt="2025-02-05T21:03:45.175" v="4169" actId="14100"/>
-          <ac:spMkLst>
-            <pc:docMk/>
-            <pc:sldMk cId="1452944335" sldId="261"/>
-            <ac:spMk id="6" creationId="{EE12E67D-0239-1317-5143-EADC4A6FD1E7}"/>
-          </ac:spMkLst>
-        </pc:spChg>
-        <pc:spChg chg="add mod">
-          <ac:chgData name="François GLEYZON" userId="a2d04f23f7faf3ef" providerId="LiveId" clId="{8625411A-B743-4065-8137-36E899DC5753}" dt="2025-02-05T21:03:23.262" v="4150"/>
-          <ac:spMkLst>
-            <pc:docMk/>
-            <pc:sldMk cId="1452944335" sldId="261"/>
-            <ac:spMk id="7" creationId="{EA320C37-86BC-1C54-FDB3-FB623D060A31}"/>
-          </ac:spMkLst>
-        </pc:spChg>
-        <pc:spChg chg="add mod">
-          <ac:chgData name="François GLEYZON" userId="a2d04f23f7faf3ef" providerId="LiveId" clId="{8625411A-B743-4065-8137-36E899DC5753}" dt="2025-02-14T00:29:59.019" v="10862" actId="790"/>
-          <ac:spMkLst>
-            <pc:docMk/>
-            <pc:sldMk cId="1452944335" sldId="261"/>
-            <ac:spMk id="8" creationId="{3F891217-F85C-D70C-2308-582197B55664}"/>
-          </ac:spMkLst>
-        </pc:spChg>
-        <pc:spChg chg="add mod">
-          <ac:chgData name="François GLEYZON" userId="a2d04f23f7faf3ef" providerId="LiveId" clId="{8625411A-B743-4065-8137-36E899DC5753}" dt="2025-02-14T00:29:59.019" v="10862" actId="790"/>
-          <ac:spMkLst>
-            <pc:docMk/>
-            <pc:sldMk cId="1452944335" sldId="261"/>
-            <ac:spMk id="9" creationId="{15BED661-D5E8-5D5F-962C-7A789302F672}"/>
-          </ac:spMkLst>
-        </pc:spChg>
-        <pc:spChg chg="add mod">
-          <ac:chgData name="François GLEYZON" userId="a2d04f23f7faf3ef" providerId="LiveId" clId="{8625411A-B743-4065-8137-36E899DC5753}" dt="2025-02-14T00:29:59.019" v="10862" actId="790"/>
-          <ac:spMkLst>
-            <pc:docMk/>
-            <pc:sldMk cId="1452944335" sldId="261"/>
-            <ac:spMk id="10" creationId="{4B5486D3-9894-C2BC-A87B-09DEDB4C8900}"/>
-          </ac:spMkLst>
-        </pc:spChg>
-        <pc:spChg chg="add mod">
-          <ac:chgData name="François GLEYZON" userId="a2d04f23f7faf3ef" providerId="LiveId" clId="{8625411A-B743-4065-8137-36E899DC5753}" dt="2025-02-14T00:29:59.019" v="10862" actId="790"/>
-          <ac:spMkLst>
-            <pc:docMk/>
-            <pc:sldMk cId="1452944335" sldId="261"/>
-            <ac:spMk id="11" creationId="{2C5B5726-7BDA-16C2-725D-68E0A9FFBD27}"/>
-          </ac:spMkLst>
-        </pc:spChg>
-        <pc:spChg chg="add mod">
-          <ac:chgData name="François GLEYZON" userId="a2d04f23f7faf3ef" providerId="LiveId" clId="{8625411A-B743-4065-8137-36E899DC5753}" dt="2025-02-14T00:29:59.019" v="10862" actId="790"/>
-          <ac:spMkLst>
-            <pc:docMk/>
-            <pc:sldMk cId="1452944335" sldId="261"/>
-            <ac:spMk id="12" creationId="{2443DA39-C273-D2B8-F9E1-87B2F44BDC42}"/>
-          </ac:spMkLst>
-        </pc:spChg>
-        <pc:spChg chg="add mod">
           <ac:chgData name="François GLEYZON" userId="a2d04f23f7faf3ef" providerId="LiveId" clId="{8625411A-B743-4065-8137-36E899DC5753}" dt="2025-02-14T00:29:59.019" v="10862" actId="790"/>
           <ac:spMkLst>
             <pc:docMk/>
@@ -588,78 +524,6 @@
             <ac:spMk id="13" creationId="{B7F086DE-1FC4-C625-C46F-7162AFC5DB60}"/>
           </ac:spMkLst>
         </pc:spChg>
-        <pc:spChg chg="add mod">
-          <ac:chgData name="François GLEYZON" userId="a2d04f23f7faf3ef" providerId="LiveId" clId="{8625411A-B743-4065-8137-36E899DC5753}" dt="2025-02-11T00:26:52.927" v="7559" actId="20577"/>
-          <ac:spMkLst>
-            <pc:docMk/>
-            <pc:sldMk cId="1452944335" sldId="261"/>
-            <ac:spMk id="17" creationId="{3CF42690-7162-FF5D-0928-122CB4424C2F}"/>
-          </ac:spMkLst>
-        </pc:spChg>
-        <pc:spChg chg="add mod">
-          <ac:chgData name="François GLEYZON" userId="a2d04f23f7faf3ef" providerId="LiveId" clId="{8625411A-B743-4065-8137-36E899DC5753}" dt="2025-02-14T00:29:59.019" v="10862" actId="790"/>
-          <ac:spMkLst>
-            <pc:docMk/>
-            <pc:sldMk cId="1452944335" sldId="261"/>
-            <ac:spMk id="18" creationId="{F4DF8ABF-BD8B-C0FA-91D0-EDC9227E9B17}"/>
-          </ac:spMkLst>
-        </pc:spChg>
-        <pc:spChg chg="add mod">
-          <ac:chgData name="François GLEYZON" userId="a2d04f23f7faf3ef" providerId="LiveId" clId="{8625411A-B743-4065-8137-36E899DC5753}" dt="2025-02-08T18:05:26.449" v="6705"/>
-          <ac:spMkLst>
-            <pc:docMk/>
-            <pc:sldMk cId="1452944335" sldId="261"/>
-            <ac:spMk id="19" creationId="{464B3D4D-12EB-D238-43B4-6F57113E9E0A}"/>
-          </ac:spMkLst>
-        </pc:spChg>
-        <pc:spChg chg="add mod">
-          <ac:chgData name="François GLEYZON" userId="a2d04f23f7faf3ef" providerId="LiveId" clId="{8625411A-B743-4065-8137-36E899DC5753}" dt="2025-02-08T18:07:09.460" v="6734" actId="1076"/>
-          <ac:spMkLst>
-            <pc:docMk/>
-            <pc:sldMk cId="1452944335" sldId="261"/>
-            <ac:spMk id="20" creationId="{F7B2648C-C01D-2FC8-0F3F-A810BEC0B6B3}"/>
-          </ac:spMkLst>
-        </pc:spChg>
-        <pc:spChg chg="add mod">
-          <ac:chgData name="François GLEYZON" userId="a2d04f23f7faf3ef" providerId="LiveId" clId="{8625411A-B743-4065-8137-36E899DC5753}" dt="2025-02-14T00:29:59.019" v="10862" actId="790"/>
-          <ac:spMkLst>
-            <pc:docMk/>
-            <pc:sldMk cId="1452944335" sldId="261"/>
-            <ac:spMk id="21" creationId="{83D574B7-1395-2485-4E73-08C18756132D}"/>
-          </ac:spMkLst>
-        </pc:spChg>
-        <pc:spChg chg="add mod">
-          <ac:chgData name="François GLEYZON" userId="a2d04f23f7faf3ef" providerId="LiveId" clId="{8625411A-B743-4065-8137-36E899DC5753}" dt="2025-02-08T18:07:20.688" v="6749" actId="1036"/>
-          <ac:spMkLst>
-            <pc:docMk/>
-            <pc:sldMk cId="1452944335" sldId="261"/>
-            <ac:spMk id="22" creationId="{7C293DC5-C800-0980-6F2B-BE6AD964B1B5}"/>
-          </ac:spMkLst>
-        </pc:spChg>
-        <pc:spChg chg="add mod">
-          <ac:chgData name="François GLEYZON" userId="a2d04f23f7faf3ef" providerId="LiveId" clId="{8625411A-B743-4065-8137-36E899DC5753}" dt="2025-02-14T00:29:59.019" v="10862" actId="790"/>
-          <ac:spMkLst>
-            <pc:docMk/>
-            <pc:sldMk cId="1452944335" sldId="261"/>
-            <ac:spMk id="23" creationId="{3BF53B97-0F67-E339-0733-64B4CBED7BE3}"/>
-          </ac:spMkLst>
-        </pc:spChg>
-        <pc:spChg chg="add mod">
-          <ac:chgData name="François GLEYZON" userId="a2d04f23f7faf3ef" providerId="LiveId" clId="{8625411A-B743-4065-8137-36E899DC5753}" dt="2025-02-14T00:29:59.019" v="10862" actId="790"/>
-          <ac:spMkLst>
-            <pc:docMk/>
-            <pc:sldMk cId="1452944335" sldId="261"/>
-            <ac:spMk id="24" creationId="{5348E2F8-935A-84B2-C999-9952A11CE7E6}"/>
-          </ac:spMkLst>
-        </pc:spChg>
-        <pc:picChg chg="add mod ord">
-          <ac:chgData name="François GLEYZON" userId="a2d04f23f7faf3ef" providerId="LiveId" clId="{8625411A-B743-4065-8137-36E899DC5753}" dt="2025-02-11T00:23:56.069" v="7257" actId="167"/>
-          <ac:picMkLst>
-            <pc:docMk/>
-            <pc:sldMk cId="1452944335" sldId="261"/>
-            <ac:picMk id="16" creationId="{C17D4E60-FB62-8A17-CC77-4C431C144C76}"/>
-          </ac:picMkLst>
-        </pc:picChg>
       </pc:sldChg>
       <pc:sldChg chg="del">
         <pc:chgData name="François GLEYZON" userId="a2d04f23f7faf3ef" providerId="LiveId" clId="{8625411A-B743-4065-8137-36E899DC5753}" dt="2025-02-05T20:27:22.032" v="3304" actId="2696"/>
@@ -1130,7 +994,7 @@
   <pc:docChgLst>
     <pc:chgData name="François GLEYZON" userId="a2d04f23f7faf3ef" providerId="LiveId" clId="{1D234A9C-22E0-43CD-8D54-3191A7902E4E}"/>
     <pc:docChg chg="undo redo custSel addSld delSld modSld">
-      <pc:chgData name="François GLEYZON" userId="a2d04f23f7faf3ef" providerId="LiveId" clId="{1D234A9C-22E0-43CD-8D54-3191A7902E4E}" dt="2025-02-22T19:53:29.969" v="2713" actId="20577"/>
+      <pc:chgData name="François GLEYZON" userId="a2d04f23f7faf3ef" providerId="LiveId" clId="{1D234A9C-22E0-43CD-8D54-3191A7902E4E}" dt="2025-02-23T02:48:28.717" v="3346" actId="14100"/>
       <pc:docMkLst>
         <pc:docMk/>
       </pc:docMkLst>
@@ -1587,7 +1451,7 @@
         </pc:sldMkLst>
       </pc:sldChg>
       <pc:sldChg chg="addSp delSp modSp mod">
-        <pc:chgData name="François GLEYZON" userId="a2d04f23f7faf3ef" providerId="LiveId" clId="{1D234A9C-22E0-43CD-8D54-3191A7902E4E}" dt="2025-02-22T19:52:08.229" v="2659" actId="14100"/>
+        <pc:chgData name="François GLEYZON" userId="a2d04f23f7faf3ef" providerId="LiveId" clId="{1D234A9C-22E0-43CD-8D54-3191A7902E4E}" dt="2025-02-23T02:48:28.717" v="3346" actId="14100"/>
         <pc:sldMkLst>
           <pc:docMk/>
           <pc:sldMk cId="1063259523" sldId="260"/>
@@ -1601,11 +1465,19 @@
           </ac:spMkLst>
         </pc:spChg>
         <pc:spChg chg="mod">
-          <ac:chgData name="François GLEYZON" userId="a2d04f23f7faf3ef" providerId="LiveId" clId="{1D234A9C-22E0-43CD-8D54-3191A7902E4E}" dt="2025-02-22T19:49:22.189" v="2650" actId="20577"/>
+          <ac:chgData name="François GLEYZON" userId="a2d04f23f7faf3ef" providerId="LiveId" clId="{1D234A9C-22E0-43CD-8D54-3191A7902E4E}" dt="2025-02-23T01:42:45.890" v="3219" actId="20577"/>
           <ac:spMkLst>
             <pc:docMk/>
             <pc:sldMk cId="1063259523" sldId="260"/>
             <ac:spMk id="6" creationId="{A00EC9BE-9081-B130-BAED-D85EE92F344B}"/>
+          </ac:spMkLst>
+        </pc:spChg>
+        <pc:spChg chg="add mod">
+          <ac:chgData name="François GLEYZON" userId="a2d04f23f7faf3ef" providerId="LiveId" clId="{1D234A9C-22E0-43CD-8D54-3191A7902E4E}" dt="2025-02-23T02:44:53.424" v="3334" actId="1035"/>
+          <ac:spMkLst>
+            <pc:docMk/>
+            <pc:sldMk cId="1063259523" sldId="260"/>
+            <ac:spMk id="7" creationId="{1862FEC3-64A1-C191-A286-CA41950E3380}"/>
           </ac:spMkLst>
         </pc:spChg>
         <pc:spChg chg="del">
@@ -1614,6 +1486,14 @@
             <pc:docMk/>
             <pc:sldMk cId="1063259523" sldId="260"/>
             <ac:spMk id="10" creationId="{26AB2202-18AC-F301-719D-754BE34A0087}"/>
+          </ac:spMkLst>
+        </pc:spChg>
+        <pc:spChg chg="add mod">
+          <ac:chgData name="François GLEYZON" userId="a2d04f23f7faf3ef" providerId="LiveId" clId="{1D234A9C-22E0-43CD-8D54-3191A7902E4E}" dt="2025-02-23T01:43:27.082" v="3225" actId="1076"/>
+          <ac:spMkLst>
+            <pc:docMk/>
+            <pc:sldMk cId="1063259523" sldId="260"/>
+            <ac:spMk id="11" creationId="{CEE01445-5110-B067-DED9-8FFB49916167}"/>
           </ac:spMkLst>
         </pc:spChg>
         <pc:spChg chg="del">
@@ -1672,12 +1552,20 @@
             <ac:spMk id="17" creationId="{418967CF-1F4B-E249-C88C-988ADBD4981B}"/>
           </ac:spMkLst>
         </pc:spChg>
-        <pc:picChg chg="add mod">
-          <ac:chgData name="François GLEYZON" userId="a2d04f23f7faf3ef" providerId="LiveId" clId="{1D234A9C-22E0-43CD-8D54-3191A7902E4E}" dt="2025-02-22T19:51:17.599" v="2655" actId="1076"/>
+        <pc:picChg chg="add del mod">
+          <ac:chgData name="François GLEYZON" userId="a2d04f23f7faf3ef" providerId="LiveId" clId="{1D234A9C-22E0-43CD-8D54-3191A7902E4E}" dt="2025-02-23T01:42:35.370" v="3166" actId="478"/>
           <ac:picMkLst>
             <pc:docMk/>
             <pc:sldMk cId="1063259523" sldId="260"/>
             <ac:picMk id="8" creationId="{FF444D27-8B34-CCF0-453E-A027C5C9CE53}"/>
+          </ac:picMkLst>
+        </pc:picChg>
+        <pc:picChg chg="add del mod">
+          <ac:chgData name="François GLEYZON" userId="a2d04f23f7faf3ef" providerId="LiveId" clId="{1D234A9C-22E0-43CD-8D54-3191A7902E4E}" dt="2025-02-23T02:44:50.064" v="3311" actId="478"/>
+          <ac:picMkLst>
+            <pc:docMk/>
+            <pc:sldMk cId="1063259523" sldId="260"/>
+            <ac:picMk id="9" creationId="{6353E146-9834-44E8-CF5A-27E3C914CB9C}"/>
           </ac:picMkLst>
         </pc:picChg>
         <pc:picChg chg="del">
@@ -1688,8 +1576,32 @@
             <ac:picMk id="9" creationId="{637A6A04-BF56-1147-EEED-6205E7F093FF}"/>
           </ac:picMkLst>
         </pc:picChg>
+        <pc:picChg chg="add del mod">
+          <ac:chgData name="François GLEYZON" userId="a2d04f23f7faf3ef" providerId="LiveId" clId="{1D234A9C-22E0-43CD-8D54-3191A7902E4E}" dt="2025-02-23T02:44:50.548" v="3312" actId="478"/>
+          <ac:picMkLst>
+            <pc:docMk/>
+            <pc:sldMk cId="1063259523" sldId="260"/>
+            <ac:picMk id="10" creationId="{F45B7187-01A7-B30D-59CC-953188275D11}"/>
+          </ac:picMkLst>
+        </pc:picChg>
         <pc:picChg chg="add mod">
-          <ac:chgData name="François GLEYZON" userId="a2d04f23f7faf3ef" providerId="LiveId" clId="{1D234A9C-22E0-43CD-8D54-3191A7902E4E}" dt="2025-02-22T19:52:08.229" v="2659" actId="14100"/>
+          <ac:chgData name="François GLEYZON" userId="a2d04f23f7faf3ef" providerId="LiveId" clId="{1D234A9C-22E0-43CD-8D54-3191A7902E4E}" dt="2025-02-23T02:45:19.153" v="3340" actId="1076"/>
+          <ac:picMkLst>
+            <pc:docMk/>
+            <pc:sldMk cId="1063259523" sldId="260"/>
+            <ac:picMk id="13" creationId="{419696E6-B824-48E8-3557-8146E42E4256}"/>
+          </ac:picMkLst>
+        </pc:picChg>
+        <pc:picChg chg="add mod">
+          <ac:chgData name="François GLEYZON" userId="a2d04f23f7faf3ef" providerId="LiveId" clId="{1D234A9C-22E0-43CD-8D54-3191A7902E4E}" dt="2025-02-23T02:48:28.717" v="3346" actId="14100"/>
+          <ac:picMkLst>
+            <pc:docMk/>
+            <pc:sldMk cId="1063259523" sldId="260"/>
+            <ac:picMk id="15" creationId="{56AA2CCE-2CE0-7B0A-AC79-BE4AD48986CA}"/>
+          </ac:picMkLst>
+        </pc:picChg>
+        <pc:picChg chg="add del mod">
+          <ac:chgData name="François GLEYZON" userId="a2d04f23f7faf3ef" providerId="LiveId" clId="{1D234A9C-22E0-43CD-8D54-3191A7902E4E}" dt="2025-02-23T01:42:35.610" v="3167" actId="478"/>
           <ac:picMkLst>
             <pc:docMk/>
             <pc:sldMk cId="1063259523" sldId="260"/>
@@ -1992,7 +1904,7 @@
         </pc:grpChg>
       </pc:sldChg>
       <pc:sldChg chg="addSp delSp modSp mod">
-        <pc:chgData name="François GLEYZON" userId="a2d04f23f7faf3ef" providerId="LiveId" clId="{1D234A9C-22E0-43CD-8D54-3191A7902E4E}" dt="2025-02-22T19:53:17.359" v="2710" actId="1076"/>
+        <pc:chgData name="François GLEYZON" userId="a2d04f23f7faf3ef" providerId="LiveId" clId="{1D234A9C-22E0-43CD-8D54-3191A7902E4E}" dt="2025-02-23T02:34:42.590" v="3310" actId="20577"/>
         <pc:sldMkLst>
           <pc:docMk/>
           <pc:sldMk cId="3013734229" sldId="266"/>
@@ -2022,7 +1934,7 @@
           </ac:spMkLst>
         </pc:spChg>
         <pc:spChg chg="add mod">
-          <ac:chgData name="François GLEYZON" userId="a2d04f23f7faf3ef" providerId="LiveId" clId="{1D234A9C-22E0-43CD-8D54-3191A7902E4E}" dt="2025-02-22T19:30:57.614" v="2294"/>
+          <ac:chgData name="François GLEYZON" userId="a2d04f23f7faf3ef" providerId="LiveId" clId="{1D234A9C-22E0-43CD-8D54-3191A7902E4E}" dt="2025-02-23T02:34:20.361" v="3296" actId="20577"/>
           <ac:spMkLst>
             <pc:docMk/>
             <pc:sldMk cId="3013734229" sldId="266"/>
@@ -2046,7 +1958,7 @@
           </ac:spMkLst>
         </pc:spChg>
         <pc:spChg chg="add mod">
-          <ac:chgData name="François GLEYZON" userId="a2d04f23f7faf3ef" providerId="LiveId" clId="{1D234A9C-22E0-43CD-8D54-3191A7902E4E}" dt="2025-02-22T19:31:14.166" v="2296" actId="20577"/>
+          <ac:chgData name="François GLEYZON" userId="a2d04f23f7faf3ef" providerId="LiveId" clId="{1D234A9C-22E0-43CD-8D54-3191A7902E4E}" dt="2025-02-23T02:34:22.390" v="3297" actId="20577"/>
           <ac:spMkLst>
             <pc:docMk/>
             <pc:sldMk cId="3013734229" sldId="266"/>
@@ -2062,7 +1974,7 @@
           </ac:spMkLst>
         </pc:spChg>
         <pc:spChg chg="add mod">
-          <ac:chgData name="François GLEYZON" userId="a2d04f23f7faf3ef" providerId="LiveId" clId="{1D234A9C-22E0-43CD-8D54-3191A7902E4E}" dt="2025-02-22T19:32:57.704" v="2333" actId="1076"/>
+          <ac:chgData name="François GLEYZON" userId="a2d04f23f7faf3ef" providerId="LiveId" clId="{1D234A9C-22E0-43CD-8D54-3191A7902E4E}" dt="2025-02-23T02:31:55.720" v="3267" actId="1076"/>
           <ac:spMkLst>
             <pc:docMk/>
             <pc:sldMk cId="3013734229" sldId="266"/>
@@ -2086,7 +1998,7 @@
           </ac:spMkLst>
         </pc:spChg>
         <pc:spChg chg="add mod">
-          <ac:chgData name="François GLEYZON" userId="a2d04f23f7faf3ef" providerId="LiveId" clId="{1D234A9C-22E0-43CD-8D54-3191A7902E4E}" dt="2025-02-22T19:40:26.599" v="2554" actId="20577"/>
+          <ac:chgData name="François GLEYZON" userId="a2d04f23f7faf3ef" providerId="LiveId" clId="{1D234A9C-22E0-43CD-8D54-3191A7902E4E}" dt="2025-02-23T02:34:42.590" v="3310" actId="20577"/>
           <ac:spMkLst>
             <pc:docMk/>
             <pc:sldMk cId="3013734229" sldId="266"/>
@@ -2094,7 +2006,7 @@
           </ac:spMkLst>
         </pc:spChg>
         <pc:spChg chg="add mod">
-          <ac:chgData name="François GLEYZON" userId="a2d04f23f7faf3ef" providerId="LiveId" clId="{1D234A9C-22E0-43CD-8D54-3191A7902E4E}" dt="2025-02-22T19:35:37.966" v="2422" actId="1076"/>
+          <ac:chgData name="François GLEYZON" userId="a2d04f23f7faf3ef" providerId="LiveId" clId="{1D234A9C-22E0-43CD-8D54-3191A7902E4E}" dt="2025-02-23T02:34:25.870" v="3300" actId="20577"/>
           <ac:spMkLst>
             <pc:docMk/>
             <pc:sldMk cId="3013734229" sldId="266"/>
@@ -2110,7 +2022,7 @@
           </ac:spMkLst>
         </pc:spChg>
         <pc:spChg chg="add mod">
-          <ac:chgData name="François GLEYZON" userId="a2d04f23f7faf3ef" providerId="LiveId" clId="{1D234A9C-22E0-43CD-8D54-3191A7902E4E}" dt="2025-02-22T19:36:54.348" v="2501" actId="1076"/>
+          <ac:chgData name="François GLEYZON" userId="a2d04f23f7faf3ef" providerId="LiveId" clId="{1D234A9C-22E0-43CD-8D54-3191A7902E4E}" dt="2025-02-23T02:34:28.091" v="3301" actId="20577"/>
           <ac:spMkLst>
             <pc:docMk/>
             <pc:sldMk cId="3013734229" sldId="266"/>
@@ -2134,7 +2046,7 @@
           </ac:spMkLst>
         </pc:spChg>
         <pc:spChg chg="add mod">
-          <ac:chgData name="François GLEYZON" userId="a2d04f23f7faf3ef" providerId="LiveId" clId="{1D234A9C-22E0-43CD-8D54-3191A7902E4E}" dt="2025-02-22T19:36:08.531" v="2439" actId="20577"/>
+          <ac:chgData name="François GLEYZON" userId="a2d04f23f7faf3ef" providerId="LiveId" clId="{1D234A9C-22E0-43CD-8D54-3191A7902E4E}" dt="2025-02-23T02:34:29.360" v="3302" actId="20577"/>
           <ac:spMkLst>
             <pc:docMk/>
             <pc:sldMk cId="3013734229" sldId="266"/>
@@ -2183,7 +2095,7 @@
         </pc:cxnChg>
       </pc:sldChg>
       <pc:sldChg chg="addSp delSp modSp add mod">
-        <pc:chgData name="François GLEYZON" userId="a2d04f23f7faf3ef" providerId="LiveId" clId="{1D234A9C-22E0-43CD-8D54-3191A7902E4E}" dt="2025-02-22T19:15:29.829" v="1932" actId="113"/>
+        <pc:chgData name="François GLEYZON" userId="a2d04f23f7faf3ef" providerId="LiveId" clId="{1D234A9C-22E0-43CD-8D54-3191A7902E4E}" dt="2025-02-23T01:32:26.389" v="3149" actId="33524"/>
         <pc:sldMkLst>
           <pc:docMk/>
           <pc:sldMk cId="3012370290" sldId="267"/>
@@ -2205,6 +2117,14 @@
           </ac:spMkLst>
         </pc:spChg>
         <pc:spChg chg="add mod">
+          <ac:chgData name="François GLEYZON" userId="a2d04f23f7faf3ef" providerId="LiveId" clId="{1D234A9C-22E0-43CD-8D54-3191A7902E4E}" dt="2025-02-23T01:32:26.389" v="3149" actId="33524"/>
+          <ac:spMkLst>
+            <pc:docMk/>
+            <pc:sldMk cId="3012370290" sldId="267"/>
+            <ac:spMk id="4" creationId="{6D8734A9-8F30-9BA7-B84D-78C647197FF0}"/>
+          </ac:spMkLst>
+        </pc:spChg>
+        <pc:spChg chg="add mod">
           <ac:chgData name="François GLEYZON" userId="a2d04f23f7faf3ef" providerId="LiveId" clId="{1D234A9C-22E0-43CD-8D54-3191A7902E4E}" dt="2025-02-22T19:07:19.814" v="1610" actId="571"/>
           <ac:spMkLst>
             <pc:docMk/>
@@ -2221,7 +2141,7 @@
           </ac:spMkLst>
         </pc:spChg>
         <pc:spChg chg="add mod">
-          <ac:chgData name="François GLEYZON" userId="a2d04f23f7faf3ef" providerId="LiveId" clId="{1D234A9C-22E0-43CD-8D54-3191A7902E4E}" dt="2025-02-22T19:13:05.085" v="1884" actId="1076"/>
+          <ac:chgData name="François GLEYZON" userId="a2d04f23f7faf3ef" providerId="LiveId" clId="{1D234A9C-22E0-43CD-8D54-3191A7902E4E}" dt="2025-02-23T01:30:34.913" v="2806" actId="1076"/>
           <ac:spMkLst>
             <pc:docMk/>
             <pc:sldMk cId="3012370290" sldId="267"/>
@@ -2310,7 +2230,7 @@
         </pc:cxnChg>
       </pc:sldChg>
       <pc:sldChg chg="addSp delSp modSp add mod">
-        <pc:chgData name="François GLEYZON" userId="a2d04f23f7faf3ef" providerId="LiveId" clId="{1D234A9C-22E0-43CD-8D54-3191A7902E4E}" dt="2025-02-22T19:19:37.159" v="2022" actId="20577"/>
+        <pc:chgData name="François GLEYZON" userId="a2d04f23f7faf3ef" providerId="LiveId" clId="{1D234A9C-22E0-43CD-8D54-3191A7902E4E}" dt="2025-02-23T02:01:04.281" v="3247" actId="1076"/>
         <pc:sldMkLst>
           <pc:docMk/>
           <pc:sldMk cId="3862334454" sldId="268"/>
@@ -2337,6 +2257,14 @@
             <pc:docMk/>
             <pc:sldMk cId="3862334454" sldId="268"/>
             <ac:spMk id="4" creationId="{507E54E7-772F-33D1-E501-E070B7A7F065}"/>
+          </ac:spMkLst>
+        </pc:spChg>
+        <pc:spChg chg="add mod">
+          <ac:chgData name="François GLEYZON" userId="a2d04f23f7faf3ef" providerId="LiveId" clId="{1D234A9C-22E0-43CD-8D54-3191A7902E4E}" dt="2025-02-22T23:51:18.073" v="2752" actId="20577"/>
+          <ac:spMkLst>
+            <pc:docMk/>
+            <pc:sldMk cId="3862334454" sldId="268"/>
+            <ac:spMk id="4" creationId="{EADB7A49-C3D6-2E36-AA84-D62056BEB820}"/>
           </ac:spMkLst>
         </pc:spChg>
         <pc:spChg chg="add del mod">
@@ -2388,7 +2316,7 @@
           </ac:spMkLst>
         </pc:spChg>
         <pc:spChg chg="add mod">
-          <ac:chgData name="François GLEYZON" userId="a2d04f23f7faf3ef" providerId="LiveId" clId="{1D234A9C-22E0-43CD-8D54-3191A7902E4E}" dt="2025-02-22T19:19:19.439" v="1993" actId="20577"/>
+          <ac:chgData name="François GLEYZON" userId="a2d04f23f7faf3ef" providerId="LiveId" clId="{1D234A9C-22E0-43CD-8D54-3191A7902E4E}" dt="2025-02-22T23:51:54.405" v="2803" actId="1076"/>
           <ac:spMkLst>
             <pc:docMk/>
             <pc:sldMk cId="3862334454" sldId="268"/>
@@ -2404,7 +2332,7 @@
           </ac:spMkLst>
         </pc:spChg>
         <pc:spChg chg="mod">
-          <ac:chgData name="François GLEYZON" userId="a2d04f23f7faf3ef" providerId="LiveId" clId="{1D234A9C-22E0-43CD-8D54-3191A7902E4E}" dt="2025-02-22T19:18:39.349" v="1984" actId="1076"/>
+          <ac:chgData name="François GLEYZON" userId="a2d04f23f7faf3ef" providerId="LiveId" clId="{1D234A9C-22E0-43CD-8D54-3191A7902E4E}" dt="2025-02-22T21:52:50.474" v="2715" actId="20577"/>
           <ac:spMkLst>
             <pc:docMk/>
             <pc:sldMk cId="3862334454" sldId="268"/>
@@ -2443,6 +2371,46 @@
             <ac:spMk id="34" creationId="{439648D7-860B-30D7-755D-F3442F917310}"/>
           </ac:spMkLst>
         </pc:spChg>
+        <pc:picChg chg="add del mod ord">
+          <ac:chgData name="François GLEYZON" userId="a2d04f23f7faf3ef" providerId="LiveId" clId="{1D234A9C-22E0-43CD-8D54-3191A7902E4E}" dt="2025-02-23T02:00:11.261" v="3226" actId="478"/>
+          <ac:picMkLst>
+            <pc:docMk/>
+            <pc:sldMk cId="3862334454" sldId="268"/>
+            <ac:picMk id="6" creationId="{D49DD70A-56DF-DFF7-9A82-1F678D2902E3}"/>
+          </ac:picMkLst>
+        </pc:picChg>
+        <pc:picChg chg="add del mod ord">
+          <ac:chgData name="François GLEYZON" userId="a2d04f23f7faf3ef" providerId="LiveId" clId="{1D234A9C-22E0-43CD-8D54-3191A7902E4E}" dt="2025-02-23T02:00:11.641" v="3227" actId="478"/>
+          <ac:picMkLst>
+            <pc:docMk/>
+            <pc:sldMk cId="3862334454" sldId="268"/>
+            <ac:picMk id="8" creationId="{B7B0D597-1395-3CA7-57CA-9933157DDCC4}"/>
+          </ac:picMkLst>
+        </pc:picChg>
+        <pc:picChg chg="add mod ord">
+          <ac:chgData name="François GLEYZON" userId="a2d04f23f7faf3ef" providerId="LiveId" clId="{1D234A9C-22E0-43CD-8D54-3191A7902E4E}" dt="2025-02-23T02:00:44.916" v="3244" actId="1076"/>
+          <ac:picMkLst>
+            <pc:docMk/>
+            <pc:sldMk cId="3862334454" sldId="268"/>
+            <ac:picMk id="10" creationId="{AC6DD530-0AF9-B1D0-451B-C9E0F108AD0B}"/>
+          </ac:picMkLst>
+        </pc:picChg>
+        <pc:picChg chg="add mod ord">
+          <ac:chgData name="François GLEYZON" userId="a2d04f23f7faf3ef" providerId="LiveId" clId="{1D234A9C-22E0-43CD-8D54-3191A7902E4E}" dt="2025-02-23T02:01:04.281" v="3247" actId="1076"/>
+          <ac:picMkLst>
+            <pc:docMk/>
+            <pc:sldMk cId="3862334454" sldId="268"/>
+            <ac:picMk id="13" creationId="{B9EE5A72-7A0D-A32F-F541-ED53CCCE41F1}"/>
+          </ac:picMkLst>
+        </pc:picChg>
+        <pc:picChg chg="add mod ord">
+          <ac:chgData name="François GLEYZON" userId="a2d04f23f7faf3ef" providerId="LiveId" clId="{1D234A9C-22E0-43CD-8D54-3191A7902E4E}" dt="2025-02-23T02:00:50.457" v="3246" actId="1076"/>
+          <ac:picMkLst>
+            <pc:docMk/>
+            <pc:sldMk cId="3862334454" sldId="268"/>
+            <ac:picMk id="16" creationId="{20D04E8D-8DE9-D92B-D7E6-F573568C7C29}"/>
+          </ac:picMkLst>
+        </pc:picChg>
       </pc:sldChg>
       <pc:sldChg chg="new del">
         <pc:chgData name="François GLEYZON" userId="a2d04f23f7faf3ef" providerId="LiveId" clId="{1D234A9C-22E0-43CD-8D54-3191A7902E4E}" dt="2025-02-22T19:38:26.169" v="2519" actId="680"/>
@@ -15117,8 +15085,8 @@
           </a:p>
         </p:txBody>
       </p:sp>
-      <mc:AlternateContent xmlns:mc="http://schemas.openxmlformats.org/markup-compatibility/2006">
-        <mc:Choice xmlns:a14="http://schemas.microsoft.com/office/drawing/2010/main" Requires="a14">
+      <mc:AlternateContent xmlns:mc="http://schemas.openxmlformats.org/markup-compatibility/2006" xmlns:a14="http://schemas.microsoft.com/office/drawing/2010/main">
+        <mc:Choice Requires="a14">
           <p:sp>
             <p:nvSpPr>
               <p:cNvPr id="27" name="TextBox 26">
@@ -15724,7 +15692,7 @@
             </p:txBody>
           </p:sp>
         </mc:Choice>
-        <mc:Fallback>
+        <mc:Fallback xmlns="">
           <p:sp>
             <p:nvSpPr>
               <p:cNvPr id="27" name="TextBox 26">
@@ -15808,8 +15776,8 @@
           </a:p>
         </p:txBody>
       </p:sp>
-      <mc:AlternateContent xmlns:mc="http://schemas.openxmlformats.org/markup-compatibility/2006">
-        <mc:Choice xmlns:a14="http://schemas.microsoft.com/office/drawing/2010/main" Requires="a14">
+      <mc:AlternateContent xmlns:mc="http://schemas.openxmlformats.org/markup-compatibility/2006" xmlns:a14="http://schemas.microsoft.com/office/drawing/2010/main">
+        <mc:Choice Requires="a14">
           <p:sp>
             <p:nvSpPr>
               <p:cNvPr id="30" name="TextBox 29">
@@ -16516,7 +16484,7 @@
             </p:txBody>
           </p:sp>
         </mc:Choice>
-        <mc:Fallback>
+        <mc:Fallback xmlns="">
           <p:sp>
             <p:nvSpPr>
               <p:cNvPr id="30" name="TextBox 29">
@@ -16561,8 +16529,8 @@
           </p:sp>
         </mc:Fallback>
       </mc:AlternateContent>
-      <mc:AlternateContent xmlns:mc="http://schemas.openxmlformats.org/markup-compatibility/2006">
-        <mc:Choice xmlns:a14="http://schemas.microsoft.com/office/drawing/2010/main" Requires="a14">
+      <mc:AlternateContent xmlns:mc="http://schemas.openxmlformats.org/markup-compatibility/2006" xmlns:a14="http://schemas.microsoft.com/office/drawing/2010/main">
+        <mc:Choice Requires="a14">
           <p:sp>
             <p:nvSpPr>
               <p:cNvPr id="31" name="TextBox 30">
@@ -16880,7 +16848,7 @@
                       <m:sSubSup>
                         <m:sSubSupPr>
                           <m:ctrlPr>
-                            <a:rPr lang="fr-FR" sz="1600" b="0" i="0" smtClean="0">
+                            <a:rPr lang="fr-FR" sz="1600" b="0" i="1" smtClean="0">
                               <a:latin typeface="Cambria Math" panose="02040503050406030204" pitchFamily="18" charset="0"/>
                             </a:rPr>
                           </m:ctrlPr>
@@ -16931,7 +16899,7 @@
                       <m:sSubSup>
                         <m:sSubSupPr>
                           <m:ctrlPr>
-                            <a:rPr lang="fr-FR" sz="1600" b="0" i="0" smtClean="0">
+                            <a:rPr lang="fr-FR" sz="1600" b="0" i="1" smtClean="0">
                               <a:latin typeface="Cambria Math" panose="02040503050406030204" pitchFamily="18" charset="0"/>
                             </a:rPr>
                           </m:ctrlPr>
@@ -16982,7 +16950,7 @@
                       <m:sSubSup>
                         <m:sSubSupPr>
                           <m:ctrlPr>
-                            <a:rPr lang="fr-FR" sz="1600" b="0" i="0" smtClean="0">
+                            <a:rPr lang="fr-FR" sz="1600" b="0" i="1" smtClean="0">
                               <a:latin typeface="Cambria Math" panose="02040503050406030204" pitchFamily="18" charset="0"/>
                             </a:rPr>
                           </m:ctrlPr>
@@ -17038,7 +17006,7 @@
             </p:txBody>
           </p:sp>
         </mc:Choice>
-        <mc:Fallback>
+        <mc:Fallback xmlns="">
           <p:sp>
             <p:nvSpPr>
               <p:cNvPr id="31" name="TextBox 30">
@@ -17083,8 +17051,8 @@
           </p:sp>
         </mc:Fallback>
       </mc:AlternateContent>
-      <mc:AlternateContent xmlns:mc="http://schemas.openxmlformats.org/markup-compatibility/2006">
-        <mc:Choice xmlns:a14="http://schemas.microsoft.com/office/drawing/2010/main" Requires="a14">
+      <mc:AlternateContent xmlns:mc="http://schemas.openxmlformats.org/markup-compatibility/2006" xmlns:a14="http://schemas.microsoft.com/office/drawing/2010/main">
+        <mc:Choice Requires="a14">
           <p:sp>
             <p:nvSpPr>
               <p:cNvPr id="32" name="TextBox 31">
@@ -17791,7 +17759,7 @@
             </p:txBody>
           </p:sp>
         </mc:Choice>
-        <mc:Fallback>
+        <mc:Fallback xmlns="">
           <p:sp>
             <p:nvSpPr>
               <p:cNvPr id="32" name="TextBox 31">
@@ -17836,8 +17804,8 @@
           </p:sp>
         </mc:Fallback>
       </mc:AlternateContent>
-      <mc:AlternateContent xmlns:mc="http://schemas.openxmlformats.org/markup-compatibility/2006">
-        <mc:Choice xmlns:a14="http://schemas.microsoft.com/office/drawing/2010/main" Requires="a14">
+      <mc:AlternateContent xmlns:mc="http://schemas.openxmlformats.org/markup-compatibility/2006" xmlns:a14="http://schemas.microsoft.com/office/drawing/2010/main">
+        <mc:Choice Requires="a14">
           <p:sp>
             <p:nvSpPr>
               <p:cNvPr id="33" name="TextBox 32">
@@ -18544,7 +18512,7 @@
             </p:txBody>
           </p:sp>
         </mc:Choice>
-        <mc:Fallback>
+        <mc:Fallback xmlns="">
           <p:sp>
             <p:nvSpPr>
               <p:cNvPr id="33" name="TextBox 32">
@@ -18589,8 +18557,8 @@
           </p:sp>
         </mc:Fallback>
       </mc:AlternateContent>
-      <mc:AlternateContent xmlns:mc="http://schemas.openxmlformats.org/markup-compatibility/2006">
-        <mc:Choice xmlns:a14="http://schemas.microsoft.com/office/drawing/2010/main" Requires="a14">
+      <mc:AlternateContent xmlns:mc="http://schemas.openxmlformats.org/markup-compatibility/2006" xmlns:a14="http://schemas.microsoft.com/office/drawing/2010/main">
+        <mc:Choice Requires="a14">
           <p:sp>
             <p:nvSpPr>
               <p:cNvPr id="34" name="TextBox 33">
@@ -19297,7 +19265,7 @@
             </p:txBody>
           </p:sp>
         </mc:Choice>
-        <mc:Fallback>
+        <mc:Fallback xmlns="">
           <p:sp>
             <p:nvSpPr>
               <p:cNvPr id="34" name="TextBox 33">
@@ -19342,8 +19310,8 @@
           </p:sp>
         </mc:Fallback>
       </mc:AlternateContent>
-      <mc:AlternateContent xmlns:mc="http://schemas.openxmlformats.org/markup-compatibility/2006">
-        <mc:Choice xmlns:a14="http://schemas.microsoft.com/office/drawing/2010/main" Requires="a14">
+      <mc:AlternateContent xmlns:mc="http://schemas.openxmlformats.org/markup-compatibility/2006" xmlns:a14="http://schemas.microsoft.com/office/drawing/2010/main">
+        <mc:Choice Requires="a14">
           <p:sp>
             <p:nvSpPr>
               <p:cNvPr id="6" name="TextBox 5">
@@ -19469,7 +19437,7 @@
             </p:txBody>
           </p:sp>
         </mc:Choice>
-        <mc:Fallback>
+        <mc:Fallback xmlns="">
           <p:sp>
             <p:nvSpPr>
               <p:cNvPr id="6" name="TextBox 5">
@@ -19530,7 +19498,7 @@
             </p:nvSpPr>
             <p:spPr>
               <a:xfrm>
-                <a:off x="101598" y="5394574"/>
+                <a:off x="-1" y="5403466"/>
                 <a:ext cx="9212670" cy="454355"/>
               </a:xfrm>
               <a:prstGeom prst="rect">
@@ -19756,7 +19724,7 @@
             </p:nvSpPr>
             <p:spPr>
               <a:xfrm>
-                <a:off x="101598" y="5394574"/>
+                <a:off x="-1" y="5403466"/>
                 <a:ext cx="9212670" cy="454355"/>
               </a:xfrm>
               <a:prstGeom prst="rect">
@@ -19765,7 +19733,227 @@
               <a:blipFill>
                 <a:blip r:embed="rId9"/>
                 <a:stretch>
-                  <a:fillRect l="-596" t="-8108" b="-2703"/>
+                  <a:fillRect l="-529" t="-6667" b="-1333"/>
+                </a:stretch>
+              </a:blipFill>
+            </p:spPr>
+            <p:txBody>
+              <a:bodyPr/>
+              <a:lstStyle/>
+              <a:p>
+                <a:r>
+                  <a:rPr lang="en-GB">
+                    <a:noFill/>
+                  </a:rPr>
+                  <a:t> </a:t>
+                </a:r>
+              </a:p>
+            </p:txBody>
+          </p:sp>
+        </mc:Fallback>
+      </mc:AlternateContent>
+      <mc:AlternateContent xmlns:mc="http://schemas.openxmlformats.org/markup-compatibility/2006">
+        <mc:Choice xmlns:a14="http://schemas.microsoft.com/office/drawing/2010/main" Requires="a14">
+          <p:sp>
+            <p:nvSpPr>
+              <p:cNvPr id="4" name="TextBox 3">
+                <a:extLst>
+                  <a:ext uri="{FF2B5EF4-FFF2-40B4-BE49-F238E27FC236}">
+                    <a16:creationId xmlns:a16="http://schemas.microsoft.com/office/drawing/2014/main" id="{6D8734A9-8F30-9BA7-B84D-78C647197FF0}"/>
+                  </a:ext>
+                </a:extLst>
+              </p:cNvPr>
+              <p:cNvSpPr txBox="1"/>
+              <p:nvPr/>
+            </p:nvSpPr>
+            <p:spPr>
+              <a:xfrm>
+                <a:off x="-61138" y="5857821"/>
+                <a:ext cx="12253138" cy="1021370"/>
+              </a:xfrm>
+              <a:prstGeom prst="rect">
+                <a:avLst/>
+              </a:prstGeom>
+              <a:noFill/>
+            </p:spPr>
+            <p:txBody>
+              <a:bodyPr wrap="square" rtlCol="0">
+                <a:spAutoFit/>
+              </a:bodyPr>
+              <a:lstStyle/>
+              <a:p>
+                <a:pPr algn="just"/>
+                <a:r>
+                  <a:rPr lang="fr-FR" noProof="0" dirty="0">
+                    <a:latin typeface="Times New Roman" panose="02020603050405020304" pitchFamily="18" charset="0"/>
+                    <a:cs typeface="Times New Roman" panose="02020603050405020304" pitchFamily="18" charset="0"/>
+                  </a:rPr>
+                  <a:t>Comme pour la méthode de </a:t>
+                </a:r>
+                <a:r>
+                  <a:rPr lang="fr-FR" b="1" noProof="0" dirty="0" err="1">
+                    <a:latin typeface="Times New Roman" panose="02020603050405020304" pitchFamily="18" charset="0"/>
+                    <a:cs typeface="Times New Roman" panose="02020603050405020304" pitchFamily="18" charset="0"/>
+                  </a:rPr>
+                  <a:t>Cranck</a:t>
+                </a:r>
+                <a:r>
+                  <a:rPr lang="fr-FR" b="1" dirty="0">
+                    <a:latin typeface="Times New Roman" panose="02020603050405020304" pitchFamily="18" charset="0"/>
+                    <a:cs typeface="Times New Roman" panose="02020603050405020304" pitchFamily="18" charset="0"/>
+                  </a:rPr>
+                  <a:t>-</a:t>
+                </a:r>
+                <a:r>
+                  <a:rPr lang="fr-FR" b="1" dirty="0" err="1">
+                    <a:latin typeface="Times New Roman" panose="02020603050405020304" pitchFamily="18" charset="0"/>
+                    <a:cs typeface="Times New Roman" panose="02020603050405020304" pitchFamily="18" charset="0"/>
+                  </a:rPr>
+                  <a:t>Nickolson</a:t>
+                </a:r>
+                <a:r>
+                  <a:rPr lang="fr-FR" dirty="0">
+                    <a:latin typeface="Times New Roman" panose="02020603050405020304" pitchFamily="18" charset="0"/>
+                    <a:cs typeface="Times New Roman" panose="02020603050405020304" pitchFamily="18" charset="0"/>
+                  </a:rPr>
+                  <a:t> (présenté à la page suivante), on résout à chaque itération de pas de temps </a:t>
+                </a:r>
+                <a14:m>
+                  <m:oMath xmlns:m="http://schemas.openxmlformats.org/officeDocument/2006/math">
+                    <m:sSup>
+                      <m:sSupPr>
+                        <m:ctrlPr>
+                          <a:rPr lang="fr-FR" b="0" i="1" noProof="0" smtClean="0">
+                            <a:latin typeface="Cambria Math" panose="02040503050406030204" pitchFamily="18" charset="0"/>
+                            <a:ea typeface="Cambria Math" panose="02040503050406030204" pitchFamily="18" charset="0"/>
+                            <a:cs typeface="Times New Roman" panose="02020603050405020304" pitchFamily="18" charset="0"/>
+                          </a:rPr>
+                        </m:ctrlPr>
+                      </m:sSupPr>
+                      <m:e>
+                        <m:bar>
+                          <m:barPr>
+                            <m:ctrlPr>
+                              <a:rPr lang="fr-FR" i="1" noProof="0" smtClean="0">
+                                <a:latin typeface="Cambria Math" panose="02040503050406030204" pitchFamily="18" charset="0"/>
+                                <a:ea typeface="Cambria Math" panose="02040503050406030204" pitchFamily="18" charset="0"/>
+                                <a:cs typeface="Times New Roman" panose="02020603050405020304" pitchFamily="18" charset="0"/>
+                              </a:rPr>
+                            </m:ctrlPr>
+                          </m:barPr>
+                          <m:e>
+                            <m:r>
+                              <a:rPr lang="fr-FR" b="0" i="1" noProof="0" smtClean="0">
+                                <a:latin typeface="Cambria Math" panose="02040503050406030204" pitchFamily="18" charset="0"/>
+                                <a:ea typeface="Cambria Math" panose="02040503050406030204" pitchFamily="18" charset="0"/>
+                                <a:cs typeface="Times New Roman" panose="02020603050405020304" pitchFamily="18" charset="0"/>
+                              </a:rPr>
+                              <m:t>𝐶</m:t>
+                            </m:r>
+                          </m:e>
+                        </m:bar>
+                      </m:e>
+                      <m:sup>
+                        <m:r>
+                          <a:rPr lang="fr-FR" b="0" i="1" noProof="0" smtClean="0">
+                            <a:latin typeface="Cambria Math" panose="02040503050406030204" pitchFamily="18" charset="0"/>
+                            <a:ea typeface="Cambria Math" panose="02040503050406030204" pitchFamily="18" charset="0"/>
+                            <a:cs typeface="Times New Roman" panose="02020603050405020304" pitchFamily="18" charset="0"/>
+                          </a:rPr>
+                          <m:t>𝑛</m:t>
+                        </m:r>
+                        <m:r>
+                          <a:rPr lang="fr-FR" b="0" i="1" noProof="0" smtClean="0">
+                            <a:latin typeface="Cambria Math" panose="02040503050406030204" pitchFamily="18" charset="0"/>
+                            <a:ea typeface="Cambria Math" panose="02040503050406030204" pitchFamily="18" charset="0"/>
+                            <a:cs typeface="Times New Roman" panose="02020603050405020304" pitchFamily="18" charset="0"/>
+                          </a:rPr>
+                          <m:t>+1</m:t>
+                        </m:r>
+                      </m:sup>
+                    </m:sSup>
+                  </m:oMath>
+                </a14:m>
+                <a:r>
+                  <a:rPr lang="fr-FR" dirty="0">
+                    <a:latin typeface="Times New Roman" panose="02020603050405020304" pitchFamily="18" charset="0"/>
+                    <a:cs typeface="Times New Roman" panose="02020603050405020304" pitchFamily="18" charset="0"/>
+                  </a:rPr>
+                  <a:t> en inversant la matrice </a:t>
+                </a:r>
+                <a14:m>
+                  <m:oMath xmlns:m="http://schemas.openxmlformats.org/officeDocument/2006/math">
+                    <m:bar>
+                      <m:barPr>
+                        <m:ctrlPr>
+                          <a:rPr lang="fr-FR" i="1">
+                            <a:latin typeface="Cambria Math" panose="02040503050406030204" pitchFamily="18" charset="0"/>
+                            <a:cs typeface="Times New Roman" panose="02020603050405020304" pitchFamily="18" charset="0"/>
+                          </a:rPr>
+                        </m:ctrlPr>
+                      </m:barPr>
+                      <m:e>
+                        <m:bar>
+                          <m:barPr>
+                            <m:ctrlPr>
+                              <a:rPr lang="fr-FR" i="1">
+                                <a:latin typeface="Cambria Math" panose="02040503050406030204" pitchFamily="18" charset="0"/>
+                                <a:cs typeface="Times New Roman" panose="02020603050405020304" pitchFamily="18" charset="0"/>
+                              </a:rPr>
+                            </m:ctrlPr>
+                          </m:barPr>
+                          <m:e>
+                            <m:r>
+                              <a:rPr lang="fr-FR" i="1">
+                                <a:latin typeface="Cambria Math" panose="02040503050406030204" pitchFamily="18" charset="0"/>
+                                <a:cs typeface="Times New Roman" panose="02020603050405020304" pitchFamily="18" charset="0"/>
+                              </a:rPr>
+                              <m:t>𝐴</m:t>
+                            </m:r>
+                          </m:e>
+                        </m:bar>
+                      </m:e>
+                    </m:bar>
+                  </m:oMath>
+                </a14:m>
+                <a:r>
+                  <a:rPr lang="fr-FR" noProof="0" dirty="0">
+                    <a:latin typeface="Times New Roman" panose="02020603050405020304" pitchFamily="18" charset="0"/>
+                    <a:cs typeface="Times New Roman" panose="02020603050405020304" pitchFamily="18" charset="0"/>
+                  </a:rPr>
+                  <a:t>. C’est une spécificité des schémas implicite : plus couteux en termes de calcul (inversion de matrice) mais inconditionnellement stable. </a:t>
+                </a:r>
+              </a:p>
+            </p:txBody>
+          </p:sp>
+        </mc:Choice>
+        <mc:Fallback>
+          <p:sp>
+            <p:nvSpPr>
+              <p:cNvPr id="4" name="TextBox 3">
+                <a:extLst>
+                  <a:ext uri="{FF2B5EF4-FFF2-40B4-BE49-F238E27FC236}">
+                    <a16:creationId xmlns:a16="http://schemas.microsoft.com/office/drawing/2014/main" id="{6D8734A9-8F30-9BA7-B84D-78C647197FF0}"/>
+                  </a:ext>
+                </a:extLst>
+              </p:cNvPr>
+              <p:cNvSpPr txBox="1">
+                <a:spLocks noRot="1" noChangeAspect="1" noMove="1" noResize="1" noEditPoints="1" noAdjustHandles="1" noChangeArrowheads="1" noChangeShapeType="1" noTextEdit="1"/>
+              </p:cNvSpPr>
+              <p:nvPr/>
+            </p:nvSpPr>
+            <p:spPr>
+              <a:xfrm>
+                <a:off x="-61138" y="5857821"/>
+                <a:ext cx="12253138" cy="1021370"/>
+              </a:xfrm>
+              <a:prstGeom prst="rect">
+                <a:avLst/>
+              </a:prstGeom>
+              <a:blipFill>
+                <a:blip r:embed="rId10"/>
+                <a:stretch>
+                  <a:fillRect l="-448" t="-3593" r="-398" b="-8982"/>
                 </a:stretch>
               </a:blipFill>
             </p:spPr>
@@ -19820,6 +20008,114 @@
           <a:chExt cx="0" cy="0"/>
         </a:xfrm>
       </p:grpSpPr>
+      <p:pic>
+        <p:nvPicPr>
+          <p:cNvPr id="10" name="Picture 9" descr="A graph with a line graph&#10;&#10;AI-generated content may be incorrect.">
+            <a:extLst>
+              <a:ext uri="{FF2B5EF4-FFF2-40B4-BE49-F238E27FC236}">
+                <a16:creationId xmlns:a16="http://schemas.microsoft.com/office/drawing/2014/main" id="{AC6DD530-0AF9-B1D0-451B-C9E0F108AD0B}"/>
+              </a:ext>
+            </a:extLst>
+          </p:cNvPr>
+          <p:cNvPicPr>
+            <a:picLocks noChangeAspect="1"/>
+          </p:cNvPicPr>
+          <p:nvPr/>
+        </p:nvPicPr>
+        <p:blipFill>
+          <a:blip r:embed="rId2">
+            <a:extLst>
+              <a:ext uri="{28A0092B-C50C-407E-A947-70E740481C1C}">
+                <a14:useLocalDpi xmlns:a14="http://schemas.microsoft.com/office/drawing/2010/main" val="0"/>
+              </a:ext>
+            </a:extLst>
+          </a:blip>
+          <a:stretch>
+            <a:fillRect/>
+          </a:stretch>
+        </p:blipFill>
+        <p:spPr>
+          <a:xfrm>
+            <a:off x="-1" y="3800045"/>
+            <a:ext cx="4077273" cy="3057955"/>
+          </a:xfrm>
+          <a:prstGeom prst="rect">
+            <a:avLst/>
+          </a:prstGeom>
+        </p:spPr>
+      </p:pic>
+      <p:pic>
+        <p:nvPicPr>
+          <p:cNvPr id="13" name="Picture 12" descr="A graph with a line graph&#10;&#10;AI-generated content may be incorrect.">
+            <a:extLst>
+              <a:ext uri="{FF2B5EF4-FFF2-40B4-BE49-F238E27FC236}">
+                <a16:creationId xmlns:a16="http://schemas.microsoft.com/office/drawing/2014/main" id="{B9EE5A72-7A0D-A32F-F541-ED53CCCE41F1}"/>
+              </a:ext>
+            </a:extLst>
+          </p:cNvPr>
+          <p:cNvPicPr>
+            <a:picLocks noChangeAspect="1"/>
+          </p:cNvPicPr>
+          <p:nvPr/>
+        </p:nvPicPr>
+        <p:blipFill>
+          <a:blip r:embed="rId3">
+            <a:extLst>
+              <a:ext uri="{28A0092B-C50C-407E-A947-70E740481C1C}">
+                <a14:useLocalDpi xmlns:a14="http://schemas.microsoft.com/office/drawing/2010/main" val="0"/>
+              </a:ext>
+            </a:extLst>
+          </a:blip>
+          <a:stretch>
+            <a:fillRect/>
+          </a:stretch>
+        </p:blipFill>
+        <p:spPr>
+          <a:xfrm>
+            <a:off x="3782196" y="3800042"/>
+            <a:ext cx="4077273" cy="3057955"/>
+          </a:xfrm>
+          <a:prstGeom prst="rect">
+            <a:avLst/>
+          </a:prstGeom>
+        </p:spPr>
+      </p:pic>
+      <p:pic>
+        <p:nvPicPr>
+          <p:cNvPr id="16" name="Picture 15" descr="A graph with lines and numbers&#10;&#10;AI-generated content may be incorrect.">
+            <a:extLst>
+              <a:ext uri="{FF2B5EF4-FFF2-40B4-BE49-F238E27FC236}">
+                <a16:creationId xmlns:a16="http://schemas.microsoft.com/office/drawing/2014/main" id="{20D04E8D-8DE9-D92B-D7E6-F573568C7C29}"/>
+              </a:ext>
+            </a:extLst>
+          </p:cNvPr>
+          <p:cNvPicPr>
+            <a:picLocks noChangeAspect="1"/>
+          </p:cNvPicPr>
+          <p:nvPr/>
+        </p:nvPicPr>
+        <p:blipFill>
+          <a:blip r:embed="rId4">
+            <a:extLst>
+              <a:ext uri="{28A0092B-C50C-407E-A947-70E740481C1C}">
+                <a14:useLocalDpi xmlns:a14="http://schemas.microsoft.com/office/drawing/2010/main" val="0"/>
+              </a:ext>
+            </a:extLst>
+          </a:blip>
+          <a:stretch>
+            <a:fillRect/>
+          </a:stretch>
+        </p:blipFill>
+        <p:spPr>
+          <a:xfrm>
+            <a:off x="7564393" y="3800042"/>
+            <a:ext cx="4077273" cy="3057955"/>
+          </a:xfrm>
+          <a:prstGeom prst="rect">
+            <a:avLst/>
+          </a:prstGeom>
+        </p:spPr>
+      </p:pic>
       <p:sp>
         <p:nvSpPr>
           <p:cNvPr id="3" name="TextBox 2">
@@ -20115,8 +20411,8 @@
           </a:p>
         </p:txBody>
       </p:sp>
-      <mc:AlternateContent xmlns:mc="http://schemas.openxmlformats.org/markup-compatibility/2006">
-        <mc:Choice xmlns:a14="http://schemas.microsoft.com/office/drawing/2010/main" Requires="a14">
+      <mc:AlternateContent xmlns:mc="http://schemas.openxmlformats.org/markup-compatibility/2006" xmlns:a14="http://schemas.microsoft.com/office/drawing/2010/main">
+        <mc:Choice Requires="a14">
           <p:sp>
             <p:nvSpPr>
               <p:cNvPr id="27" name="TextBox 26">
@@ -21163,7 +21459,7 @@
             </p:txBody>
           </p:sp>
         </mc:Choice>
-        <mc:Fallback>
+        <mc:Fallback xmlns="">
           <p:sp>
             <p:nvSpPr>
               <p:cNvPr id="27" name="TextBox 26">
@@ -21187,7 +21483,7 @@
                 <a:avLst/>
               </a:prstGeom>
               <a:blipFill>
-                <a:blip r:embed="rId2"/>
+                <a:blip r:embed="rId5"/>
                 <a:stretch>
                   <a:fillRect/>
                 </a:stretch>
@@ -22406,7 +22702,7 @@
                               <a:latin typeface="Cambria Math" panose="02040503050406030204" pitchFamily="18" charset="0"/>
                               <a:ea typeface="Cambria Math" panose="02040503050406030204" pitchFamily="18" charset="0"/>
                             </a:rPr>
-                            <m:t>_</m:t>
+                            <m:t>−</m:t>
                           </m:r>
                           <m:r>
                             <a:rPr lang="fr-FR" sz="1100" i="1">
@@ -22696,7 +22992,7 @@
                 <a:avLst/>
               </a:prstGeom>
               <a:blipFill>
-                <a:blip r:embed="rId3"/>
+                <a:blip r:embed="rId6"/>
                 <a:stretch>
                   <a:fillRect/>
                 </a:stretch>
@@ -22733,7 +23029,7 @@
             </p:nvSpPr>
             <p:spPr>
               <a:xfrm>
-                <a:off x="101598" y="2841720"/>
+                <a:off x="0" y="3258100"/>
                 <a:ext cx="9212670" cy="454355"/>
               </a:xfrm>
               <a:prstGeom prst="rect">
@@ -22998,16 +23294,1560 @@
             </p:nvSpPr>
             <p:spPr>
               <a:xfrm>
-                <a:off x="101598" y="2841720"/>
+                <a:off x="0" y="3258100"/>
                 <a:ext cx="9212670" cy="454355"/>
               </a:xfrm>
               <a:prstGeom prst="rect">
                 <a:avLst/>
               </a:prstGeom>
               <a:blipFill>
-                <a:blip r:embed="rId4"/>
+                <a:blip r:embed="rId7"/>
                 <a:stretch>
-                  <a:fillRect l="-596" t="-6667" b="-1333"/>
+                  <a:fillRect l="-529" t="-6667" b="-1333"/>
+                </a:stretch>
+              </a:blipFill>
+            </p:spPr>
+            <p:txBody>
+              <a:bodyPr/>
+              <a:lstStyle/>
+              <a:p>
+                <a:r>
+                  <a:rPr lang="en-GB">
+                    <a:noFill/>
+                  </a:rPr>
+                  <a:t> </a:t>
+                </a:r>
+              </a:p>
+            </p:txBody>
+          </p:sp>
+        </mc:Fallback>
+      </mc:AlternateContent>
+      <mc:AlternateContent xmlns:mc="http://schemas.openxmlformats.org/markup-compatibility/2006">
+        <mc:Choice xmlns:a14="http://schemas.microsoft.com/office/drawing/2010/main" Requires="a14">
+          <p:sp>
+            <p:nvSpPr>
+              <p:cNvPr id="4" name="TextBox 3">
+                <a:extLst>
+                  <a:ext uri="{FF2B5EF4-FFF2-40B4-BE49-F238E27FC236}">
+                    <a16:creationId xmlns:a16="http://schemas.microsoft.com/office/drawing/2014/main" id="{EADB7A49-C3D6-2E36-AA84-D62056BEB820}"/>
+                  </a:ext>
+                </a:extLst>
+              </p:cNvPr>
+              <p:cNvSpPr txBox="1"/>
+              <p:nvPr/>
+            </p:nvSpPr>
+            <p:spPr>
+              <a:xfrm>
+                <a:off x="95994" y="2762031"/>
+                <a:ext cx="12000012" cy="380361"/>
+              </a:xfrm>
+              <a:prstGeom prst="rect">
+                <a:avLst/>
+              </a:prstGeom>
+              <a:noFill/>
+            </p:spPr>
+            <p:txBody>
+              <a:bodyPr wrap="square" lIns="0" tIns="0" rIns="0" bIns="0" rtlCol="0">
+                <a:spAutoFit/>
+              </a:bodyPr>
+              <a:lstStyle/>
+              <a:p>
+                <a:pPr/>
+                <a14:m>
+                  <m:oMathPara xmlns:m="http://schemas.openxmlformats.org/officeDocument/2006/math">
+                    <m:oMathParaPr>
+                      <m:jc m:val="centerGroup"/>
+                    </m:oMathParaPr>
+                    <m:oMath xmlns:m="http://schemas.openxmlformats.org/officeDocument/2006/math">
+                      <m:sSubSup>
+                        <m:sSubSupPr>
+                          <m:ctrlPr>
+                            <a:rPr lang="fr-FR" sz="1100" i="1" smtClean="0">
+                              <a:latin typeface="Cambria Math" panose="02040503050406030204" pitchFamily="18" charset="0"/>
+                            </a:rPr>
+                          </m:ctrlPr>
+                        </m:sSubSupPr>
+                        <m:e>
+                          <m:r>
+                            <a:rPr lang="fr-FR" sz="1100" i="1">
+                              <a:latin typeface="Cambria Math" panose="02040503050406030204" pitchFamily="18" charset="0"/>
+                            </a:rPr>
+                            <m:t>𝐶</m:t>
+                          </m:r>
+                        </m:e>
+                        <m:sub>
+                          <m:r>
+                            <a:rPr lang="fr-FR" sz="1100" i="1">
+                              <a:latin typeface="Cambria Math" panose="02040503050406030204" pitchFamily="18" charset="0"/>
+                            </a:rPr>
+                            <m:t>𝑖</m:t>
+                          </m:r>
+                          <m:r>
+                            <a:rPr lang="fr-FR" sz="1100" i="1">
+                              <a:latin typeface="Cambria Math" panose="02040503050406030204" pitchFamily="18" charset="0"/>
+                            </a:rPr>
+                            <m:t>−1</m:t>
+                          </m:r>
+                        </m:sub>
+                        <m:sup>
+                          <m:r>
+                            <a:rPr lang="fr-FR" sz="1100" i="1">
+                              <a:latin typeface="Cambria Math" panose="02040503050406030204" pitchFamily="18" charset="0"/>
+                            </a:rPr>
+                            <m:t>𝑛</m:t>
+                          </m:r>
+                          <m:r>
+                            <a:rPr lang="fr-FR" sz="1100" i="1">
+                              <a:latin typeface="Cambria Math" panose="02040503050406030204" pitchFamily="18" charset="0"/>
+                            </a:rPr>
+                            <m:t>+1</m:t>
+                          </m:r>
+                        </m:sup>
+                      </m:sSubSup>
+                      <m:d>
+                        <m:dPr>
+                          <m:begChr m:val="["/>
+                          <m:endChr m:val="]"/>
+                          <m:ctrlPr>
+                            <a:rPr lang="fr-FR" sz="1100" i="1" smtClean="0">
+                              <a:latin typeface="Cambria Math" panose="02040503050406030204" pitchFamily="18" charset="0"/>
+                            </a:rPr>
+                          </m:ctrlPr>
+                        </m:dPr>
+                        <m:e>
+                          <m:sSub>
+                            <m:sSubPr>
+                              <m:ctrlPr>
+                                <a:rPr lang="fr-FR" sz="1100" i="1">
+                                  <a:latin typeface="Cambria Math" panose="02040503050406030204" pitchFamily="18" charset="0"/>
+                                </a:rPr>
+                              </m:ctrlPr>
+                            </m:sSubPr>
+                            <m:e>
+                              <m:f>
+                                <m:fPr>
+                                  <m:ctrlPr>
+                                    <a:rPr lang="fr-FR" sz="1100" b="0" i="1" smtClean="0">
+                                      <a:latin typeface="Cambria Math" panose="02040503050406030204" pitchFamily="18" charset="0"/>
+                                      <a:ea typeface="Cambria Math" panose="02040503050406030204" pitchFamily="18" charset="0"/>
+                                    </a:rPr>
+                                  </m:ctrlPr>
+                                </m:fPr>
+                                <m:num>
+                                  <m:r>
+                                    <a:rPr lang="fr-FR" sz="1100" b="0" i="1" smtClean="0">
+                                      <a:latin typeface="Cambria Math" panose="02040503050406030204" pitchFamily="18" charset="0"/>
+                                      <a:ea typeface="Cambria Math" panose="02040503050406030204" pitchFamily="18" charset="0"/>
+                                    </a:rPr>
+                                    <m:t>1</m:t>
+                                  </m:r>
+                                </m:num>
+                                <m:den>
+                                  <m:r>
+                                    <a:rPr lang="fr-FR" sz="1100" b="0" i="1" smtClean="0">
+                                      <a:latin typeface="Cambria Math" panose="02040503050406030204" pitchFamily="18" charset="0"/>
+                                      <a:ea typeface="Cambria Math" panose="02040503050406030204" pitchFamily="18" charset="0"/>
+                                    </a:rPr>
+                                    <m:t>2</m:t>
+                                  </m:r>
+                                </m:den>
+                              </m:f>
+                              <m:r>
+                                <a:rPr lang="fr-FR" sz="1100" i="1">
+                                  <a:latin typeface="Cambria Math" panose="02040503050406030204" pitchFamily="18" charset="0"/>
+                                  <a:ea typeface="Cambria Math" panose="02040503050406030204" pitchFamily="18" charset="0"/>
+                                </a:rPr>
+                                <m:t>∙</m:t>
+                              </m:r>
+                              <m:r>
+                                <a:rPr lang="fr-FR" sz="1100" i="1">
+                                  <a:latin typeface="Cambria Math" panose="02040503050406030204" pitchFamily="18" charset="0"/>
+                                </a:rPr>
+                                <m:t>𝐷</m:t>
+                              </m:r>
+                            </m:e>
+                            <m:sub>
+                              <m:r>
+                                <a:rPr lang="fr-FR" sz="1100" i="1">
+                                  <a:latin typeface="Cambria Math" panose="02040503050406030204" pitchFamily="18" charset="0"/>
+                                </a:rPr>
+                                <m:t>𝑒𝑓𝑓</m:t>
+                              </m:r>
+                            </m:sub>
+                          </m:sSub>
+                          <m:d>
+                            <m:dPr>
+                              <m:ctrlPr>
+                                <a:rPr lang="fr-FR" sz="1100" i="1">
+                                  <a:latin typeface="Cambria Math" panose="02040503050406030204" pitchFamily="18" charset="0"/>
+                                </a:rPr>
+                              </m:ctrlPr>
+                            </m:dPr>
+                            <m:e>
+                              <m:f>
+                                <m:fPr>
+                                  <m:ctrlPr>
+                                    <a:rPr lang="fr-FR" sz="1100" i="1">
+                                      <a:latin typeface="Cambria Math" panose="02040503050406030204" pitchFamily="18" charset="0"/>
+                                    </a:rPr>
+                                  </m:ctrlPr>
+                                </m:fPr>
+                                <m:num>
+                                  <m:r>
+                                    <a:rPr lang="fr-FR" sz="1100" i="1">
+                                      <a:latin typeface="Cambria Math" panose="02040503050406030204" pitchFamily="18" charset="0"/>
+                                    </a:rPr>
+                                    <m:t>1</m:t>
+                                  </m:r>
+                                </m:num>
+                                <m:den>
+                                  <m:r>
+                                    <a:rPr lang="fr-FR" sz="1100" i="1">
+                                      <a:latin typeface="Cambria Math" panose="02040503050406030204" pitchFamily="18" charset="0"/>
+                                    </a:rPr>
+                                    <m:t>2</m:t>
+                                  </m:r>
+                                  <m:r>
+                                    <a:rPr lang="fr-FR" sz="1100" i="1">
+                                      <a:latin typeface="Cambria Math" panose="02040503050406030204" pitchFamily="18" charset="0"/>
+                                    </a:rPr>
+                                    <m:t>𝑟</m:t>
+                                  </m:r>
+                                  <m:r>
+                                    <a:rPr lang="fr-FR" sz="1100" i="1">
+                                      <a:latin typeface="Cambria Math" panose="02040503050406030204" pitchFamily="18" charset="0"/>
+                                      <a:ea typeface="Cambria Math" panose="02040503050406030204" pitchFamily="18" charset="0"/>
+                                    </a:rPr>
+                                    <m:t>∆</m:t>
+                                  </m:r>
+                                  <m:r>
+                                    <a:rPr lang="fr-FR" sz="1100" i="1">
+                                      <a:latin typeface="Cambria Math" panose="02040503050406030204" pitchFamily="18" charset="0"/>
+                                      <a:ea typeface="Cambria Math" panose="02040503050406030204" pitchFamily="18" charset="0"/>
+                                    </a:rPr>
+                                    <m:t>𝑟</m:t>
+                                  </m:r>
+                                </m:den>
+                              </m:f>
+                              <m:r>
+                                <a:rPr lang="fr-FR" sz="1100" i="1">
+                                  <a:latin typeface="Cambria Math" panose="02040503050406030204" pitchFamily="18" charset="0"/>
+                                </a:rPr>
+                                <m:t>+</m:t>
+                              </m:r>
+                              <m:f>
+                                <m:fPr>
+                                  <m:ctrlPr>
+                                    <a:rPr lang="fr-FR" sz="1100" i="1">
+                                      <a:latin typeface="Cambria Math" panose="02040503050406030204" pitchFamily="18" charset="0"/>
+                                    </a:rPr>
+                                  </m:ctrlPr>
+                                </m:fPr>
+                                <m:num>
+                                  <m:r>
+                                    <a:rPr lang="fr-FR" sz="1100" i="1">
+                                      <a:latin typeface="Cambria Math" panose="02040503050406030204" pitchFamily="18" charset="0"/>
+                                    </a:rPr>
+                                    <m:t>−1</m:t>
+                                  </m:r>
+                                </m:num>
+                                <m:den>
+                                  <m:r>
+                                    <a:rPr lang="fr-FR" sz="1100" i="1">
+                                      <a:latin typeface="Cambria Math" panose="02040503050406030204" pitchFamily="18" charset="0"/>
+                                      <a:ea typeface="Cambria Math" panose="02040503050406030204" pitchFamily="18" charset="0"/>
+                                    </a:rPr>
+                                    <m:t>∆</m:t>
+                                  </m:r>
+                                  <m:sSup>
+                                    <m:sSupPr>
+                                      <m:ctrlPr>
+                                        <a:rPr lang="fr-FR" sz="1100" i="1">
+                                          <a:latin typeface="Cambria Math" panose="02040503050406030204" pitchFamily="18" charset="0"/>
+                                          <a:ea typeface="Cambria Math" panose="02040503050406030204" pitchFamily="18" charset="0"/>
+                                        </a:rPr>
+                                      </m:ctrlPr>
+                                    </m:sSupPr>
+                                    <m:e>
+                                      <m:r>
+                                        <a:rPr lang="fr-FR" sz="1100" i="1">
+                                          <a:latin typeface="Cambria Math" panose="02040503050406030204" pitchFamily="18" charset="0"/>
+                                          <a:ea typeface="Cambria Math" panose="02040503050406030204" pitchFamily="18" charset="0"/>
+                                        </a:rPr>
+                                        <m:t>𝑟</m:t>
+                                      </m:r>
+                                    </m:e>
+                                    <m:sup>
+                                      <m:r>
+                                        <a:rPr lang="fr-FR" sz="1100" i="1">
+                                          <a:latin typeface="Cambria Math" panose="02040503050406030204" pitchFamily="18" charset="0"/>
+                                          <a:ea typeface="Cambria Math" panose="02040503050406030204" pitchFamily="18" charset="0"/>
+                                        </a:rPr>
+                                        <m:t>2</m:t>
+                                      </m:r>
+                                    </m:sup>
+                                  </m:sSup>
+                                </m:den>
+                              </m:f>
+                            </m:e>
+                          </m:d>
+                        </m:e>
+                      </m:d>
+                      <m:r>
+                        <a:rPr lang="fr-FR" sz="1100" b="0" i="1" smtClean="0">
+                          <a:latin typeface="Cambria Math" panose="02040503050406030204" pitchFamily="18" charset="0"/>
+                        </a:rPr>
+                        <m:t>+</m:t>
+                      </m:r>
+                      <m:sSubSup>
+                        <m:sSubSupPr>
+                          <m:ctrlPr>
+                            <a:rPr lang="fr-FR" sz="1100" b="0" i="1" smtClean="0">
+                              <a:latin typeface="Cambria Math" panose="02040503050406030204" pitchFamily="18" charset="0"/>
+                            </a:rPr>
+                          </m:ctrlPr>
+                        </m:sSubSupPr>
+                        <m:e>
+                          <m:r>
+                            <a:rPr lang="fr-FR" sz="1100" b="0" i="1" smtClean="0">
+                              <a:latin typeface="Cambria Math" panose="02040503050406030204" pitchFamily="18" charset="0"/>
+                            </a:rPr>
+                            <m:t>𝐶</m:t>
+                          </m:r>
+                        </m:e>
+                        <m:sub>
+                          <m:r>
+                            <a:rPr lang="fr-FR" sz="1100" b="0" i="1" smtClean="0">
+                              <a:latin typeface="Cambria Math" panose="02040503050406030204" pitchFamily="18" charset="0"/>
+                            </a:rPr>
+                            <m:t>𝑖</m:t>
+                          </m:r>
+                        </m:sub>
+                        <m:sup>
+                          <m:r>
+                            <a:rPr lang="fr-FR" sz="1100" b="0" i="1" smtClean="0">
+                              <a:latin typeface="Cambria Math" panose="02040503050406030204" pitchFamily="18" charset="0"/>
+                            </a:rPr>
+                            <m:t>𝑛</m:t>
+                          </m:r>
+                          <m:r>
+                            <a:rPr lang="fr-FR" sz="1100" b="0" i="1" smtClean="0">
+                              <a:latin typeface="Cambria Math" panose="02040503050406030204" pitchFamily="18" charset="0"/>
+                            </a:rPr>
+                            <m:t>+1</m:t>
+                          </m:r>
+                        </m:sup>
+                      </m:sSubSup>
+                      <m:d>
+                        <m:dPr>
+                          <m:begChr m:val="["/>
+                          <m:endChr m:val="]"/>
+                          <m:ctrlPr>
+                            <a:rPr lang="fr-FR" sz="1100" b="0" i="1" smtClean="0">
+                              <a:latin typeface="Cambria Math" panose="02040503050406030204" pitchFamily="18" charset="0"/>
+                            </a:rPr>
+                          </m:ctrlPr>
+                        </m:dPr>
+                        <m:e>
+                          <m:f>
+                            <m:fPr>
+                              <m:ctrlPr>
+                                <a:rPr lang="fr-FR" sz="1100" b="0" i="1" smtClean="0">
+                                  <a:latin typeface="Cambria Math" panose="02040503050406030204" pitchFamily="18" charset="0"/>
+                                </a:rPr>
+                              </m:ctrlPr>
+                            </m:fPr>
+                            <m:num>
+                              <m:r>
+                                <a:rPr lang="fr-FR" sz="1100" b="0" i="1" smtClean="0">
+                                  <a:latin typeface="Cambria Math" panose="02040503050406030204" pitchFamily="18" charset="0"/>
+                                </a:rPr>
+                                <m:t>1</m:t>
+                              </m:r>
+                            </m:num>
+                            <m:den>
+                              <m:r>
+                                <a:rPr lang="fr-FR" sz="1100" b="0" i="1" smtClean="0">
+                                  <a:latin typeface="Cambria Math" panose="02040503050406030204" pitchFamily="18" charset="0"/>
+                                  <a:ea typeface="Cambria Math" panose="02040503050406030204" pitchFamily="18" charset="0"/>
+                                </a:rPr>
+                                <m:t>∆</m:t>
+                              </m:r>
+                              <m:r>
+                                <a:rPr lang="fr-FR" sz="1100" b="0" i="1" smtClean="0">
+                                  <a:latin typeface="Cambria Math" panose="02040503050406030204" pitchFamily="18" charset="0"/>
+                                  <a:ea typeface="Cambria Math" panose="02040503050406030204" pitchFamily="18" charset="0"/>
+                                </a:rPr>
+                                <m:t>𝑡</m:t>
+                              </m:r>
+                            </m:den>
+                          </m:f>
+                          <m:r>
+                            <a:rPr lang="fr-FR" sz="1100" b="0" i="1" smtClean="0">
+                              <a:latin typeface="Cambria Math" panose="02040503050406030204" pitchFamily="18" charset="0"/>
+                            </a:rPr>
+                            <m:t>+</m:t>
+                          </m:r>
+                          <m:sSub>
+                            <m:sSubPr>
+                              <m:ctrlPr>
+                                <a:rPr lang="fr-FR" sz="1100" i="1">
+                                  <a:latin typeface="Cambria Math" panose="02040503050406030204" pitchFamily="18" charset="0"/>
+                                </a:rPr>
+                              </m:ctrlPr>
+                            </m:sSubPr>
+                            <m:e>
+                              <m:f>
+                                <m:fPr>
+                                  <m:ctrlPr>
+                                    <a:rPr lang="fr-FR" sz="1100" b="0" i="1" smtClean="0">
+                                      <a:latin typeface="Cambria Math" panose="02040503050406030204" pitchFamily="18" charset="0"/>
+                                      <a:ea typeface="Cambria Math" panose="02040503050406030204" pitchFamily="18" charset="0"/>
+                                    </a:rPr>
+                                  </m:ctrlPr>
+                                </m:fPr>
+                                <m:num>
+                                  <m:r>
+                                    <a:rPr lang="fr-FR" sz="1100" b="0" i="1" smtClean="0">
+                                      <a:latin typeface="Cambria Math" panose="02040503050406030204" pitchFamily="18" charset="0"/>
+                                      <a:ea typeface="Cambria Math" panose="02040503050406030204" pitchFamily="18" charset="0"/>
+                                    </a:rPr>
+                                    <m:t>1</m:t>
+                                  </m:r>
+                                </m:num>
+                                <m:den>
+                                  <m:r>
+                                    <a:rPr lang="fr-FR" sz="1100" b="0" i="1" smtClean="0">
+                                      <a:latin typeface="Cambria Math" panose="02040503050406030204" pitchFamily="18" charset="0"/>
+                                      <a:ea typeface="Cambria Math" panose="02040503050406030204" pitchFamily="18" charset="0"/>
+                                    </a:rPr>
+                                    <m:t>2</m:t>
+                                  </m:r>
+                                </m:den>
+                              </m:f>
+                              <m:r>
+                                <a:rPr lang="fr-FR" sz="1100" i="1">
+                                  <a:latin typeface="Cambria Math" panose="02040503050406030204" pitchFamily="18" charset="0"/>
+                                  <a:ea typeface="Cambria Math" panose="02040503050406030204" pitchFamily="18" charset="0"/>
+                                </a:rPr>
+                                <m:t>∙</m:t>
+                              </m:r>
+                              <m:r>
+                                <a:rPr lang="fr-FR" sz="1100" i="1">
+                                  <a:latin typeface="Cambria Math" panose="02040503050406030204" pitchFamily="18" charset="0"/>
+                                </a:rPr>
+                                <m:t>𝐷</m:t>
+                              </m:r>
+                            </m:e>
+                            <m:sub>
+                              <m:r>
+                                <a:rPr lang="fr-FR" sz="1100" i="1">
+                                  <a:latin typeface="Cambria Math" panose="02040503050406030204" pitchFamily="18" charset="0"/>
+                                </a:rPr>
+                                <m:t>𝑒𝑓𝑓</m:t>
+                              </m:r>
+                            </m:sub>
+                          </m:sSub>
+                          <m:f>
+                            <m:fPr>
+                              <m:ctrlPr>
+                                <a:rPr lang="fr-FR" sz="1100" i="1">
+                                  <a:latin typeface="Cambria Math" panose="02040503050406030204" pitchFamily="18" charset="0"/>
+                                </a:rPr>
+                              </m:ctrlPr>
+                            </m:fPr>
+                            <m:num>
+                              <m:r>
+                                <a:rPr lang="fr-FR" sz="1100" b="0" i="1" smtClean="0">
+                                  <a:latin typeface="Cambria Math" panose="02040503050406030204" pitchFamily="18" charset="0"/>
+                                </a:rPr>
+                                <m:t>2</m:t>
+                              </m:r>
+                            </m:num>
+                            <m:den>
+                              <m:r>
+                                <a:rPr lang="fr-FR" sz="1100" i="1">
+                                  <a:latin typeface="Cambria Math" panose="02040503050406030204" pitchFamily="18" charset="0"/>
+                                  <a:ea typeface="Cambria Math" panose="02040503050406030204" pitchFamily="18" charset="0"/>
+                                </a:rPr>
+                                <m:t>∆</m:t>
+                              </m:r>
+                              <m:sSup>
+                                <m:sSupPr>
+                                  <m:ctrlPr>
+                                    <a:rPr lang="fr-FR" sz="1100" i="1">
+                                      <a:latin typeface="Cambria Math" panose="02040503050406030204" pitchFamily="18" charset="0"/>
+                                      <a:ea typeface="Cambria Math" panose="02040503050406030204" pitchFamily="18" charset="0"/>
+                                    </a:rPr>
+                                  </m:ctrlPr>
+                                </m:sSupPr>
+                                <m:e>
+                                  <m:r>
+                                    <a:rPr lang="fr-FR" sz="1100" i="1">
+                                      <a:latin typeface="Cambria Math" panose="02040503050406030204" pitchFamily="18" charset="0"/>
+                                      <a:ea typeface="Cambria Math" panose="02040503050406030204" pitchFamily="18" charset="0"/>
+                                    </a:rPr>
+                                    <m:t>𝑟</m:t>
+                                  </m:r>
+                                </m:e>
+                                <m:sup>
+                                  <m:r>
+                                    <a:rPr lang="fr-FR" sz="1100" i="1">
+                                      <a:latin typeface="Cambria Math" panose="02040503050406030204" pitchFamily="18" charset="0"/>
+                                      <a:ea typeface="Cambria Math" panose="02040503050406030204" pitchFamily="18" charset="0"/>
+                                    </a:rPr>
+                                    <m:t>2</m:t>
+                                  </m:r>
+                                </m:sup>
+                              </m:sSup>
+                            </m:den>
+                          </m:f>
+                          <m:r>
+                            <a:rPr lang="fr-FR" sz="1100" b="0" i="1" smtClean="0">
+                              <a:latin typeface="Cambria Math" panose="02040503050406030204" pitchFamily="18" charset="0"/>
+                              <a:ea typeface="Cambria Math" panose="02040503050406030204" pitchFamily="18" charset="0"/>
+                            </a:rPr>
+                            <m:t>+</m:t>
+                          </m:r>
+                          <m:f>
+                            <m:fPr>
+                              <m:ctrlPr>
+                                <a:rPr lang="fr-FR" sz="1100" b="0" i="1" smtClean="0">
+                                  <a:latin typeface="Cambria Math" panose="02040503050406030204" pitchFamily="18" charset="0"/>
+                                  <a:ea typeface="Cambria Math" panose="02040503050406030204" pitchFamily="18" charset="0"/>
+                                </a:rPr>
+                              </m:ctrlPr>
+                            </m:fPr>
+                            <m:num>
+                              <m:r>
+                                <a:rPr lang="fr-FR" sz="1100" b="0" i="1" smtClean="0">
+                                  <a:latin typeface="Cambria Math" panose="02040503050406030204" pitchFamily="18" charset="0"/>
+                                  <a:ea typeface="Cambria Math" panose="02040503050406030204" pitchFamily="18" charset="0"/>
+                                </a:rPr>
+                                <m:t>𝑘</m:t>
+                              </m:r>
+                            </m:num>
+                            <m:den>
+                              <m:r>
+                                <a:rPr lang="fr-FR" sz="1100" b="0" i="1" smtClean="0">
+                                  <a:latin typeface="Cambria Math" panose="02040503050406030204" pitchFamily="18" charset="0"/>
+                                  <a:ea typeface="Cambria Math" panose="02040503050406030204" pitchFamily="18" charset="0"/>
+                                </a:rPr>
+                                <m:t>∆</m:t>
+                              </m:r>
+                              <m:r>
+                                <a:rPr lang="fr-FR" sz="1100" b="0" i="1" smtClean="0">
+                                  <a:latin typeface="Cambria Math" panose="02040503050406030204" pitchFamily="18" charset="0"/>
+                                  <a:ea typeface="Cambria Math" panose="02040503050406030204" pitchFamily="18" charset="0"/>
+                                </a:rPr>
+                                <m:t>𝑡</m:t>
+                              </m:r>
+                            </m:den>
+                          </m:f>
+                        </m:e>
+                      </m:d>
+                      <m:r>
+                        <a:rPr lang="fr-FR" sz="1100" b="0" i="1" smtClean="0">
+                          <a:latin typeface="Cambria Math" panose="02040503050406030204" pitchFamily="18" charset="0"/>
+                        </a:rPr>
+                        <m:t>+</m:t>
+                      </m:r>
+                      <m:sSubSup>
+                        <m:sSubSupPr>
+                          <m:ctrlPr>
+                            <a:rPr lang="fr-FR" sz="1100" i="1">
+                              <a:latin typeface="Cambria Math" panose="02040503050406030204" pitchFamily="18" charset="0"/>
+                            </a:rPr>
+                          </m:ctrlPr>
+                        </m:sSubSupPr>
+                        <m:e>
+                          <m:r>
+                            <a:rPr lang="fr-FR" sz="1100" i="1">
+                              <a:latin typeface="Cambria Math" panose="02040503050406030204" pitchFamily="18" charset="0"/>
+                            </a:rPr>
+                            <m:t>𝐶</m:t>
+                          </m:r>
+                        </m:e>
+                        <m:sub>
+                          <m:r>
+                            <a:rPr lang="fr-FR" sz="1100" i="1">
+                              <a:latin typeface="Cambria Math" panose="02040503050406030204" pitchFamily="18" charset="0"/>
+                            </a:rPr>
+                            <m:t>𝑖</m:t>
+                          </m:r>
+                          <m:r>
+                            <a:rPr lang="fr-FR" sz="1100" i="1">
+                              <a:latin typeface="Cambria Math" panose="02040503050406030204" pitchFamily="18" charset="0"/>
+                            </a:rPr>
+                            <m:t>+1</m:t>
+                          </m:r>
+                        </m:sub>
+                        <m:sup>
+                          <m:r>
+                            <a:rPr lang="fr-FR" sz="1100" i="1">
+                              <a:latin typeface="Cambria Math" panose="02040503050406030204" pitchFamily="18" charset="0"/>
+                            </a:rPr>
+                            <m:t>𝑛</m:t>
+                          </m:r>
+                          <m:r>
+                            <a:rPr lang="fr-FR" sz="1100" i="1">
+                              <a:latin typeface="Cambria Math" panose="02040503050406030204" pitchFamily="18" charset="0"/>
+                            </a:rPr>
+                            <m:t>+1</m:t>
+                          </m:r>
+                        </m:sup>
+                      </m:sSubSup>
+                      <m:d>
+                        <m:dPr>
+                          <m:begChr m:val="["/>
+                          <m:endChr m:val="]"/>
+                          <m:ctrlPr>
+                            <a:rPr lang="fr-FR" sz="1100" i="1" smtClean="0">
+                              <a:latin typeface="Cambria Math" panose="02040503050406030204" pitchFamily="18" charset="0"/>
+                            </a:rPr>
+                          </m:ctrlPr>
+                        </m:dPr>
+                        <m:e>
+                          <m:sSub>
+                            <m:sSubPr>
+                              <m:ctrlPr>
+                                <a:rPr lang="fr-FR" sz="1100" i="1">
+                                  <a:latin typeface="Cambria Math" panose="02040503050406030204" pitchFamily="18" charset="0"/>
+                                </a:rPr>
+                              </m:ctrlPr>
+                            </m:sSubPr>
+                            <m:e>
+                              <m:f>
+                                <m:fPr>
+                                  <m:ctrlPr>
+                                    <a:rPr lang="fr-FR" sz="1100" b="0" i="1" smtClean="0">
+                                      <a:latin typeface="Cambria Math" panose="02040503050406030204" pitchFamily="18" charset="0"/>
+                                      <a:ea typeface="Cambria Math" panose="02040503050406030204" pitchFamily="18" charset="0"/>
+                                    </a:rPr>
+                                  </m:ctrlPr>
+                                </m:fPr>
+                                <m:num>
+                                  <m:r>
+                                    <a:rPr lang="fr-FR" sz="1100" b="0" i="1" smtClean="0">
+                                      <a:latin typeface="Cambria Math" panose="02040503050406030204" pitchFamily="18" charset="0"/>
+                                      <a:ea typeface="Cambria Math" panose="02040503050406030204" pitchFamily="18" charset="0"/>
+                                    </a:rPr>
+                                    <m:t>1</m:t>
+                                  </m:r>
+                                </m:num>
+                                <m:den>
+                                  <m:r>
+                                    <a:rPr lang="fr-FR" sz="1100" b="0" i="1" smtClean="0">
+                                      <a:latin typeface="Cambria Math" panose="02040503050406030204" pitchFamily="18" charset="0"/>
+                                      <a:ea typeface="Cambria Math" panose="02040503050406030204" pitchFamily="18" charset="0"/>
+                                    </a:rPr>
+                                    <m:t>2</m:t>
+                                  </m:r>
+                                </m:den>
+                              </m:f>
+                              <m:r>
+                                <a:rPr lang="fr-FR" sz="1100" i="1">
+                                  <a:latin typeface="Cambria Math" panose="02040503050406030204" pitchFamily="18" charset="0"/>
+                                  <a:ea typeface="Cambria Math" panose="02040503050406030204" pitchFamily="18" charset="0"/>
+                                </a:rPr>
+                                <m:t>∙</m:t>
+                              </m:r>
+                              <m:r>
+                                <a:rPr lang="fr-FR" sz="1100" i="1">
+                                  <a:latin typeface="Cambria Math" panose="02040503050406030204" pitchFamily="18" charset="0"/>
+                                </a:rPr>
+                                <m:t>𝐷</m:t>
+                              </m:r>
+                            </m:e>
+                            <m:sub>
+                              <m:r>
+                                <a:rPr lang="fr-FR" sz="1100" i="1">
+                                  <a:latin typeface="Cambria Math" panose="02040503050406030204" pitchFamily="18" charset="0"/>
+                                </a:rPr>
+                                <m:t>𝑒𝑓𝑓</m:t>
+                              </m:r>
+                            </m:sub>
+                          </m:sSub>
+                          <m:d>
+                            <m:dPr>
+                              <m:ctrlPr>
+                                <a:rPr lang="fr-FR" sz="1100" i="1" smtClean="0">
+                                  <a:latin typeface="Cambria Math" panose="02040503050406030204" pitchFamily="18" charset="0"/>
+                                </a:rPr>
+                              </m:ctrlPr>
+                            </m:dPr>
+                            <m:e>
+                              <m:f>
+                                <m:fPr>
+                                  <m:ctrlPr>
+                                    <a:rPr lang="fr-FR" sz="1100" i="1">
+                                      <a:latin typeface="Cambria Math" panose="02040503050406030204" pitchFamily="18" charset="0"/>
+                                    </a:rPr>
+                                  </m:ctrlPr>
+                                </m:fPr>
+                                <m:num>
+                                  <m:r>
+                                    <a:rPr lang="fr-FR" sz="1100" b="0" i="1" smtClean="0">
+                                      <a:latin typeface="Cambria Math" panose="02040503050406030204" pitchFamily="18" charset="0"/>
+                                    </a:rPr>
+                                    <m:t>−1</m:t>
+                                  </m:r>
+                                </m:num>
+                                <m:den>
+                                  <m:r>
+                                    <a:rPr lang="fr-FR" sz="1100" i="1">
+                                      <a:latin typeface="Cambria Math" panose="02040503050406030204" pitchFamily="18" charset="0"/>
+                                    </a:rPr>
+                                    <m:t>2</m:t>
+                                  </m:r>
+                                  <m:r>
+                                    <a:rPr lang="fr-FR" sz="1100" i="1">
+                                      <a:latin typeface="Cambria Math" panose="02040503050406030204" pitchFamily="18" charset="0"/>
+                                    </a:rPr>
+                                    <m:t>𝑟</m:t>
+                                  </m:r>
+                                  <m:r>
+                                    <a:rPr lang="fr-FR" sz="1100" i="1">
+                                      <a:latin typeface="Cambria Math" panose="02040503050406030204" pitchFamily="18" charset="0"/>
+                                      <a:ea typeface="Cambria Math" panose="02040503050406030204" pitchFamily="18" charset="0"/>
+                                    </a:rPr>
+                                    <m:t>∆</m:t>
+                                  </m:r>
+                                  <m:r>
+                                    <a:rPr lang="fr-FR" sz="1100" i="1">
+                                      <a:latin typeface="Cambria Math" panose="02040503050406030204" pitchFamily="18" charset="0"/>
+                                      <a:ea typeface="Cambria Math" panose="02040503050406030204" pitchFamily="18" charset="0"/>
+                                    </a:rPr>
+                                    <m:t>𝑟</m:t>
+                                  </m:r>
+                                </m:den>
+                              </m:f>
+                              <m:r>
+                                <a:rPr lang="fr-FR" sz="1100" i="1">
+                                  <a:latin typeface="Cambria Math" panose="02040503050406030204" pitchFamily="18" charset="0"/>
+                                </a:rPr>
+                                <m:t>+</m:t>
+                              </m:r>
+                              <m:f>
+                                <m:fPr>
+                                  <m:ctrlPr>
+                                    <a:rPr lang="fr-FR" sz="1100" i="1">
+                                      <a:latin typeface="Cambria Math" panose="02040503050406030204" pitchFamily="18" charset="0"/>
+                                    </a:rPr>
+                                  </m:ctrlPr>
+                                </m:fPr>
+                                <m:num>
+                                  <m:r>
+                                    <a:rPr lang="fr-FR" sz="1100" b="0" i="1" smtClean="0">
+                                      <a:latin typeface="Cambria Math" panose="02040503050406030204" pitchFamily="18" charset="0"/>
+                                    </a:rPr>
+                                    <m:t>−1</m:t>
+                                  </m:r>
+                                </m:num>
+                                <m:den>
+                                  <m:r>
+                                    <a:rPr lang="fr-FR" sz="1100" i="1" smtClean="0">
+                                      <a:latin typeface="Cambria Math" panose="02040503050406030204" pitchFamily="18" charset="0"/>
+                                      <a:ea typeface="Cambria Math" panose="02040503050406030204" pitchFamily="18" charset="0"/>
+                                    </a:rPr>
+                                    <m:t>∆</m:t>
+                                  </m:r>
+                                  <m:sSup>
+                                    <m:sSupPr>
+                                      <m:ctrlPr>
+                                        <a:rPr lang="fr-FR" sz="1100" b="0" i="1" smtClean="0">
+                                          <a:latin typeface="Cambria Math" panose="02040503050406030204" pitchFamily="18" charset="0"/>
+                                          <a:ea typeface="Cambria Math" panose="02040503050406030204" pitchFamily="18" charset="0"/>
+                                        </a:rPr>
+                                      </m:ctrlPr>
+                                    </m:sSupPr>
+                                    <m:e>
+                                      <m:r>
+                                        <a:rPr lang="fr-FR" sz="1100" b="0" i="1" smtClean="0">
+                                          <a:latin typeface="Cambria Math" panose="02040503050406030204" pitchFamily="18" charset="0"/>
+                                          <a:ea typeface="Cambria Math" panose="02040503050406030204" pitchFamily="18" charset="0"/>
+                                        </a:rPr>
+                                        <m:t>𝑟</m:t>
+                                      </m:r>
+                                    </m:e>
+                                    <m:sup>
+                                      <m:r>
+                                        <a:rPr lang="fr-FR" sz="1100" b="0" i="1" smtClean="0">
+                                          <a:latin typeface="Cambria Math" panose="02040503050406030204" pitchFamily="18" charset="0"/>
+                                          <a:ea typeface="Cambria Math" panose="02040503050406030204" pitchFamily="18" charset="0"/>
+                                        </a:rPr>
+                                        <m:t>2</m:t>
+                                      </m:r>
+                                    </m:sup>
+                                  </m:sSup>
+                                </m:den>
+                              </m:f>
+                            </m:e>
+                          </m:d>
+                        </m:e>
+                      </m:d>
+                      <m:r>
+                        <a:rPr lang="fr-FR" sz="1100" b="0" i="1" smtClean="0">
+                          <a:latin typeface="Cambria Math" panose="02040503050406030204" pitchFamily="18" charset="0"/>
+                        </a:rPr>
+                        <m:t>=</m:t>
+                      </m:r>
+                      <m:sSubSup>
+                        <m:sSubSupPr>
+                          <m:ctrlPr>
+                            <a:rPr lang="fr-FR" sz="1100" i="1">
+                              <a:latin typeface="Cambria Math" panose="02040503050406030204" pitchFamily="18" charset="0"/>
+                            </a:rPr>
+                          </m:ctrlPr>
+                        </m:sSubSupPr>
+                        <m:e>
+                          <m:r>
+                            <a:rPr lang="fr-FR" sz="1100" i="1">
+                              <a:latin typeface="Cambria Math" panose="02040503050406030204" pitchFamily="18" charset="0"/>
+                            </a:rPr>
+                            <m:t>𝐶</m:t>
+                          </m:r>
+                        </m:e>
+                        <m:sub>
+                          <m:r>
+                            <a:rPr lang="fr-FR" sz="1100" i="1">
+                              <a:latin typeface="Cambria Math" panose="02040503050406030204" pitchFamily="18" charset="0"/>
+                            </a:rPr>
+                            <m:t>𝑖</m:t>
+                          </m:r>
+                          <m:r>
+                            <a:rPr lang="fr-FR" sz="1100" i="1">
+                              <a:latin typeface="Cambria Math" panose="02040503050406030204" pitchFamily="18" charset="0"/>
+                            </a:rPr>
+                            <m:t>−1</m:t>
+                          </m:r>
+                        </m:sub>
+                        <m:sup>
+                          <m:r>
+                            <a:rPr lang="fr-FR" sz="1100" i="1">
+                              <a:latin typeface="Cambria Math" panose="02040503050406030204" pitchFamily="18" charset="0"/>
+                            </a:rPr>
+                            <m:t>𝑛</m:t>
+                          </m:r>
+                        </m:sup>
+                      </m:sSubSup>
+                      <m:d>
+                        <m:dPr>
+                          <m:begChr m:val="["/>
+                          <m:endChr m:val="]"/>
+                          <m:ctrlPr>
+                            <a:rPr lang="fr-FR" sz="1100" i="1">
+                              <a:latin typeface="Cambria Math" panose="02040503050406030204" pitchFamily="18" charset="0"/>
+                            </a:rPr>
+                          </m:ctrlPr>
+                        </m:dPr>
+                        <m:e>
+                          <m:sSub>
+                            <m:sSubPr>
+                              <m:ctrlPr>
+                                <a:rPr lang="fr-FR" sz="1100" i="1">
+                                  <a:latin typeface="Cambria Math" panose="02040503050406030204" pitchFamily="18" charset="0"/>
+                                </a:rPr>
+                              </m:ctrlPr>
+                            </m:sSubPr>
+                            <m:e>
+                              <m:f>
+                                <m:fPr>
+                                  <m:ctrlPr>
+                                    <a:rPr lang="fr-FR" sz="1100" i="1">
+                                      <a:latin typeface="Cambria Math" panose="02040503050406030204" pitchFamily="18" charset="0"/>
+                                      <a:ea typeface="Cambria Math" panose="02040503050406030204" pitchFamily="18" charset="0"/>
+                                    </a:rPr>
+                                  </m:ctrlPr>
+                                </m:fPr>
+                                <m:num>
+                                  <m:r>
+                                    <a:rPr lang="fr-FR" sz="1100" b="0" i="1" smtClean="0">
+                                      <a:latin typeface="Cambria Math" panose="02040503050406030204" pitchFamily="18" charset="0"/>
+                                      <a:ea typeface="Cambria Math" panose="02040503050406030204" pitchFamily="18" charset="0"/>
+                                    </a:rPr>
+                                    <m:t>1</m:t>
+                                  </m:r>
+                                </m:num>
+                                <m:den>
+                                  <m:r>
+                                    <a:rPr lang="fr-FR" sz="1100" i="1">
+                                      <a:latin typeface="Cambria Math" panose="02040503050406030204" pitchFamily="18" charset="0"/>
+                                      <a:ea typeface="Cambria Math" panose="02040503050406030204" pitchFamily="18" charset="0"/>
+                                    </a:rPr>
+                                    <m:t>2</m:t>
+                                  </m:r>
+                                </m:den>
+                              </m:f>
+                              <m:r>
+                                <a:rPr lang="fr-FR" sz="1100" i="1">
+                                  <a:latin typeface="Cambria Math" panose="02040503050406030204" pitchFamily="18" charset="0"/>
+                                  <a:ea typeface="Cambria Math" panose="02040503050406030204" pitchFamily="18" charset="0"/>
+                                </a:rPr>
+                                <m:t>∙</m:t>
+                              </m:r>
+                              <m:r>
+                                <a:rPr lang="fr-FR" sz="1100" i="1">
+                                  <a:latin typeface="Cambria Math" panose="02040503050406030204" pitchFamily="18" charset="0"/>
+                                </a:rPr>
+                                <m:t>𝐷</m:t>
+                              </m:r>
+                            </m:e>
+                            <m:sub>
+                              <m:r>
+                                <a:rPr lang="fr-FR" sz="1100" i="1">
+                                  <a:latin typeface="Cambria Math" panose="02040503050406030204" pitchFamily="18" charset="0"/>
+                                </a:rPr>
+                                <m:t>𝑒𝑓𝑓</m:t>
+                              </m:r>
+                            </m:sub>
+                          </m:sSub>
+                          <m:d>
+                            <m:dPr>
+                              <m:ctrlPr>
+                                <a:rPr lang="fr-FR" sz="1100" i="1">
+                                  <a:latin typeface="Cambria Math" panose="02040503050406030204" pitchFamily="18" charset="0"/>
+                                </a:rPr>
+                              </m:ctrlPr>
+                            </m:dPr>
+                            <m:e>
+                              <m:f>
+                                <m:fPr>
+                                  <m:ctrlPr>
+                                    <a:rPr lang="fr-FR" sz="1100" i="1">
+                                      <a:latin typeface="Cambria Math" panose="02040503050406030204" pitchFamily="18" charset="0"/>
+                                    </a:rPr>
+                                  </m:ctrlPr>
+                                </m:fPr>
+                                <m:num>
+                                  <m:r>
+                                    <a:rPr lang="fr-FR" sz="1100" b="0" i="1" smtClean="0">
+                                      <a:latin typeface="Cambria Math" panose="02040503050406030204" pitchFamily="18" charset="0"/>
+                                    </a:rPr>
+                                    <m:t>−</m:t>
+                                  </m:r>
+                                  <m:r>
+                                    <a:rPr lang="fr-FR" sz="1100" i="1">
+                                      <a:latin typeface="Cambria Math" panose="02040503050406030204" pitchFamily="18" charset="0"/>
+                                    </a:rPr>
+                                    <m:t>1</m:t>
+                                  </m:r>
+                                </m:num>
+                                <m:den>
+                                  <m:r>
+                                    <a:rPr lang="fr-FR" sz="1100" i="1">
+                                      <a:latin typeface="Cambria Math" panose="02040503050406030204" pitchFamily="18" charset="0"/>
+                                    </a:rPr>
+                                    <m:t>2</m:t>
+                                  </m:r>
+                                  <m:r>
+                                    <a:rPr lang="fr-FR" sz="1100" i="1">
+                                      <a:latin typeface="Cambria Math" panose="02040503050406030204" pitchFamily="18" charset="0"/>
+                                    </a:rPr>
+                                    <m:t>𝑟</m:t>
+                                  </m:r>
+                                  <m:r>
+                                    <a:rPr lang="fr-FR" sz="1100" i="1">
+                                      <a:latin typeface="Cambria Math" panose="02040503050406030204" pitchFamily="18" charset="0"/>
+                                      <a:ea typeface="Cambria Math" panose="02040503050406030204" pitchFamily="18" charset="0"/>
+                                    </a:rPr>
+                                    <m:t>∆</m:t>
+                                  </m:r>
+                                  <m:r>
+                                    <a:rPr lang="fr-FR" sz="1100" i="1">
+                                      <a:latin typeface="Cambria Math" panose="02040503050406030204" pitchFamily="18" charset="0"/>
+                                      <a:ea typeface="Cambria Math" panose="02040503050406030204" pitchFamily="18" charset="0"/>
+                                    </a:rPr>
+                                    <m:t>𝑟</m:t>
+                                  </m:r>
+                                </m:den>
+                              </m:f>
+                              <m:r>
+                                <a:rPr lang="fr-FR" sz="1100" i="1">
+                                  <a:latin typeface="Cambria Math" panose="02040503050406030204" pitchFamily="18" charset="0"/>
+                                </a:rPr>
+                                <m:t>+</m:t>
+                              </m:r>
+                              <m:f>
+                                <m:fPr>
+                                  <m:ctrlPr>
+                                    <a:rPr lang="fr-FR" sz="1100" i="1">
+                                      <a:latin typeface="Cambria Math" panose="02040503050406030204" pitchFamily="18" charset="0"/>
+                                    </a:rPr>
+                                  </m:ctrlPr>
+                                </m:fPr>
+                                <m:num>
+                                  <m:r>
+                                    <a:rPr lang="fr-FR" sz="1100" i="1">
+                                      <a:latin typeface="Cambria Math" panose="02040503050406030204" pitchFamily="18" charset="0"/>
+                                    </a:rPr>
+                                    <m:t>1</m:t>
+                                  </m:r>
+                                </m:num>
+                                <m:den>
+                                  <m:r>
+                                    <a:rPr lang="fr-FR" sz="1100" i="1">
+                                      <a:latin typeface="Cambria Math" panose="02040503050406030204" pitchFamily="18" charset="0"/>
+                                      <a:ea typeface="Cambria Math" panose="02040503050406030204" pitchFamily="18" charset="0"/>
+                                    </a:rPr>
+                                    <m:t>∆</m:t>
+                                  </m:r>
+                                  <m:sSup>
+                                    <m:sSupPr>
+                                      <m:ctrlPr>
+                                        <a:rPr lang="fr-FR" sz="1100" i="1">
+                                          <a:latin typeface="Cambria Math" panose="02040503050406030204" pitchFamily="18" charset="0"/>
+                                          <a:ea typeface="Cambria Math" panose="02040503050406030204" pitchFamily="18" charset="0"/>
+                                        </a:rPr>
+                                      </m:ctrlPr>
+                                    </m:sSupPr>
+                                    <m:e>
+                                      <m:r>
+                                        <a:rPr lang="fr-FR" sz="1100" i="1">
+                                          <a:latin typeface="Cambria Math" panose="02040503050406030204" pitchFamily="18" charset="0"/>
+                                          <a:ea typeface="Cambria Math" panose="02040503050406030204" pitchFamily="18" charset="0"/>
+                                        </a:rPr>
+                                        <m:t>𝑟</m:t>
+                                      </m:r>
+                                    </m:e>
+                                    <m:sup>
+                                      <m:r>
+                                        <a:rPr lang="fr-FR" sz="1100" i="1">
+                                          <a:latin typeface="Cambria Math" panose="02040503050406030204" pitchFamily="18" charset="0"/>
+                                          <a:ea typeface="Cambria Math" panose="02040503050406030204" pitchFamily="18" charset="0"/>
+                                        </a:rPr>
+                                        <m:t>2</m:t>
+                                      </m:r>
+                                    </m:sup>
+                                  </m:sSup>
+                                </m:den>
+                              </m:f>
+                            </m:e>
+                          </m:d>
+                        </m:e>
+                      </m:d>
+                      <m:r>
+                        <a:rPr lang="fr-FR" sz="1100" i="1">
+                          <a:latin typeface="Cambria Math" panose="02040503050406030204" pitchFamily="18" charset="0"/>
+                        </a:rPr>
+                        <m:t>+</m:t>
+                      </m:r>
+                      <m:sSubSup>
+                        <m:sSubSupPr>
+                          <m:ctrlPr>
+                            <a:rPr lang="fr-FR" sz="1100" i="1">
+                              <a:latin typeface="Cambria Math" panose="02040503050406030204" pitchFamily="18" charset="0"/>
+                            </a:rPr>
+                          </m:ctrlPr>
+                        </m:sSubSupPr>
+                        <m:e>
+                          <m:r>
+                            <a:rPr lang="fr-FR" sz="1100" i="1">
+                              <a:latin typeface="Cambria Math" panose="02040503050406030204" pitchFamily="18" charset="0"/>
+                            </a:rPr>
+                            <m:t>𝐶</m:t>
+                          </m:r>
+                        </m:e>
+                        <m:sub>
+                          <m:r>
+                            <a:rPr lang="fr-FR" sz="1100" i="1">
+                              <a:latin typeface="Cambria Math" panose="02040503050406030204" pitchFamily="18" charset="0"/>
+                            </a:rPr>
+                            <m:t>𝑖</m:t>
+                          </m:r>
+                        </m:sub>
+                        <m:sup>
+                          <m:r>
+                            <a:rPr lang="fr-FR" sz="1100" i="1">
+                              <a:latin typeface="Cambria Math" panose="02040503050406030204" pitchFamily="18" charset="0"/>
+                            </a:rPr>
+                            <m:t>𝑛</m:t>
+                          </m:r>
+                        </m:sup>
+                      </m:sSubSup>
+                      <m:d>
+                        <m:dPr>
+                          <m:begChr m:val="["/>
+                          <m:endChr m:val="]"/>
+                          <m:ctrlPr>
+                            <a:rPr lang="fr-FR" sz="1100" i="1">
+                              <a:latin typeface="Cambria Math" panose="02040503050406030204" pitchFamily="18" charset="0"/>
+                            </a:rPr>
+                          </m:ctrlPr>
+                        </m:dPr>
+                        <m:e>
+                          <m:f>
+                            <m:fPr>
+                              <m:ctrlPr>
+                                <a:rPr lang="fr-FR" sz="1100" b="0" i="1" smtClean="0">
+                                  <a:latin typeface="Cambria Math" panose="02040503050406030204" pitchFamily="18" charset="0"/>
+                                </a:rPr>
+                              </m:ctrlPr>
+                            </m:fPr>
+                            <m:num>
+                              <m:r>
+                                <a:rPr lang="fr-FR" sz="1100" i="1">
+                                  <a:latin typeface="Cambria Math" panose="02040503050406030204" pitchFamily="18" charset="0"/>
+                                </a:rPr>
+                                <m:t>1</m:t>
+                              </m:r>
+                            </m:num>
+                            <m:den>
+                              <m:r>
+                                <a:rPr lang="fr-FR" sz="1100" b="0" i="1" smtClean="0">
+                                  <a:latin typeface="Cambria Math" panose="02040503050406030204" pitchFamily="18" charset="0"/>
+                                  <a:ea typeface="Cambria Math" panose="02040503050406030204" pitchFamily="18" charset="0"/>
+                                </a:rPr>
+                                <m:t>∆</m:t>
+                              </m:r>
+                              <m:r>
+                                <a:rPr lang="fr-FR" sz="1100" b="0" i="1" smtClean="0">
+                                  <a:latin typeface="Cambria Math" panose="02040503050406030204" pitchFamily="18" charset="0"/>
+                                  <a:ea typeface="Cambria Math" panose="02040503050406030204" pitchFamily="18" charset="0"/>
+                                </a:rPr>
+                                <m:t>𝑡</m:t>
+                              </m:r>
+                            </m:den>
+                          </m:f>
+                          <m:r>
+                            <a:rPr lang="fr-FR" sz="1100" b="0" i="1" smtClean="0">
+                              <a:latin typeface="Cambria Math" panose="02040503050406030204" pitchFamily="18" charset="0"/>
+                            </a:rPr>
+                            <m:t>−</m:t>
+                          </m:r>
+                          <m:sSub>
+                            <m:sSubPr>
+                              <m:ctrlPr>
+                                <a:rPr lang="fr-FR" sz="1100" i="1">
+                                  <a:latin typeface="Cambria Math" panose="02040503050406030204" pitchFamily="18" charset="0"/>
+                                </a:rPr>
+                              </m:ctrlPr>
+                            </m:sSubPr>
+                            <m:e>
+                              <m:f>
+                                <m:fPr>
+                                  <m:ctrlPr>
+                                    <a:rPr lang="fr-FR" sz="1100" i="1">
+                                      <a:latin typeface="Cambria Math" panose="02040503050406030204" pitchFamily="18" charset="0"/>
+                                      <a:ea typeface="Cambria Math" panose="02040503050406030204" pitchFamily="18" charset="0"/>
+                                    </a:rPr>
+                                  </m:ctrlPr>
+                                </m:fPr>
+                                <m:num>
+                                  <m:r>
+                                    <a:rPr lang="fr-FR" sz="1100" b="0" i="1" smtClean="0">
+                                      <a:latin typeface="Cambria Math" panose="02040503050406030204" pitchFamily="18" charset="0"/>
+                                      <a:ea typeface="Cambria Math" panose="02040503050406030204" pitchFamily="18" charset="0"/>
+                                    </a:rPr>
+                                    <m:t>1</m:t>
+                                  </m:r>
+                                </m:num>
+                                <m:den>
+                                  <m:r>
+                                    <a:rPr lang="fr-FR" sz="1100" i="1">
+                                      <a:latin typeface="Cambria Math" panose="02040503050406030204" pitchFamily="18" charset="0"/>
+                                      <a:ea typeface="Cambria Math" panose="02040503050406030204" pitchFamily="18" charset="0"/>
+                                    </a:rPr>
+                                    <m:t>2</m:t>
+                                  </m:r>
+                                </m:den>
+                              </m:f>
+                              <m:r>
+                                <a:rPr lang="fr-FR" sz="1100" i="1">
+                                  <a:latin typeface="Cambria Math" panose="02040503050406030204" pitchFamily="18" charset="0"/>
+                                  <a:ea typeface="Cambria Math" panose="02040503050406030204" pitchFamily="18" charset="0"/>
+                                </a:rPr>
+                                <m:t>∙</m:t>
+                              </m:r>
+                              <m:r>
+                                <a:rPr lang="fr-FR" sz="1100" i="1">
+                                  <a:latin typeface="Cambria Math" panose="02040503050406030204" pitchFamily="18" charset="0"/>
+                                </a:rPr>
+                                <m:t>𝐷</m:t>
+                              </m:r>
+                            </m:e>
+                            <m:sub>
+                              <m:r>
+                                <a:rPr lang="fr-FR" sz="1100" i="1">
+                                  <a:latin typeface="Cambria Math" panose="02040503050406030204" pitchFamily="18" charset="0"/>
+                                </a:rPr>
+                                <m:t>𝑒𝑓𝑓</m:t>
+                              </m:r>
+                            </m:sub>
+                          </m:sSub>
+                          <m:f>
+                            <m:fPr>
+                              <m:ctrlPr>
+                                <a:rPr lang="fr-FR" sz="1100" i="1">
+                                  <a:latin typeface="Cambria Math" panose="02040503050406030204" pitchFamily="18" charset="0"/>
+                                </a:rPr>
+                              </m:ctrlPr>
+                            </m:fPr>
+                            <m:num>
+                              <m:r>
+                                <a:rPr lang="fr-FR" sz="1100" i="1">
+                                  <a:latin typeface="Cambria Math" panose="02040503050406030204" pitchFamily="18" charset="0"/>
+                                </a:rPr>
+                                <m:t>2</m:t>
+                              </m:r>
+                            </m:num>
+                            <m:den>
+                              <m:r>
+                                <a:rPr lang="fr-FR" sz="1100" i="1">
+                                  <a:latin typeface="Cambria Math" panose="02040503050406030204" pitchFamily="18" charset="0"/>
+                                  <a:ea typeface="Cambria Math" panose="02040503050406030204" pitchFamily="18" charset="0"/>
+                                </a:rPr>
+                                <m:t>∆</m:t>
+                              </m:r>
+                              <m:sSup>
+                                <m:sSupPr>
+                                  <m:ctrlPr>
+                                    <a:rPr lang="fr-FR" sz="1100" i="1">
+                                      <a:latin typeface="Cambria Math" panose="02040503050406030204" pitchFamily="18" charset="0"/>
+                                      <a:ea typeface="Cambria Math" panose="02040503050406030204" pitchFamily="18" charset="0"/>
+                                    </a:rPr>
+                                  </m:ctrlPr>
+                                </m:sSupPr>
+                                <m:e>
+                                  <m:r>
+                                    <a:rPr lang="fr-FR" sz="1100" i="1">
+                                      <a:latin typeface="Cambria Math" panose="02040503050406030204" pitchFamily="18" charset="0"/>
+                                      <a:ea typeface="Cambria Math" panose="02040503050406030204" pitchFamily="18" charset="0"/>
+                                    </a:rPr>
+                                    <m:t>𝑟</m:t>
+                                  </m:r>
+                                </m:e>
+                                <m:sup>
+                                  <m:r>
+                                    <a:rPr lang="fr-FR" sz="1100" i="1">
+                                      <a:latin typeface="Cambria Math" panose="02040503050406030204" pitchFamily="18" charset="0"/>
+                                      <a:ea typeface="Cambria Math" panose="02040503050406030204" pitchFamily="18" charset="0"/>
+                                    </a:rPr>
+                                    <m:t>2</m:t>
+                                  </m:r>
+                                </m:sup>
+                              </m:sSup>
+                            </m:den>
+                          </m:f>
+                          <m:r>
+                            <a:rPr lang="fr-FR" sz="1100" b="0" i="1" smtClean="0">
+                              <a:latin typeface="Cambria Math" panose="02040503050406030204" pitchFamily="18" charset="0"/>
+                              <a:ea typeface="Cambria Math" panose="02040503050406030204" pitchFamily="18" charset="0"/>
+                            </a:rPr>
+                            <m:t>−</m:t>
+                          </m:r>
+                          <m:f>
+                            <m:fPr>
+                              <m:ctrlPr>
+                                <a:rPr lang="fr-FR" sz="1100" b="0" i="1" smtClean="0">
+                                  <a:latin typeface="Cambria Math" panose="02040503050406030204" pitchFamily="18" charset="0"/>
+                                  <a:ea typeface="Cambria Math" panose="02040503050406030204" pitchFamily="18" charset="0"/>
+                                </a:rPr>
+                              </m:ctrlPr>
+                            </m:fPr>
+                            <m:num>
+                              <m:r>
+                                <a:rPr lang="fr-FR" sz="1100" i="1">
+                                  <a:latin typeface="Cambria Math" panose="02040503050406030204" pitchFamily="18" charset="0"/>
+                                  <a:ea typeface="Cambria Math" panose="02040503050406030204" pitchFamily="18" charset="0"/>
+                                </a:rPr>
+                                <m:t>𝑘</m:t>
+                              </m:r>
+                            </m:num>
+                            <m:den>
+                              <m:r>
+                                <a:rPr lang="fr-FR" sz="1100" b="0" i="1" smtClean="0">
+                                  <a:latin typeface="Cambria Math" panose="02040503050406030204" pitchFamily="18" charset="0"/>
+                                  <a:ea typeface="Cambria Math" panose="02040503050406030204" pitchFamily="18" charset="0"/>
+                                </a:rPr>
+                                <m:t>∆</m:t>
+                              </m:r>
+                              <m:r>
+                                <a:rPr lang="fr-FR" sz="1100" b="0" i="1" smtClean="0">
+                                  <a:latin typeface="Cambria Math" panose="02040503050406030204" pitchFamily="18" charset="0"/>
+                                  <a:ea typeface="Cambria Math" panose="02040503050406030204" pitchFamily="18" charset="0"/>
+                                </a:rPr>
+                                <m:t>𝑡</m:t>
+                              </m:r>
+                            </m:den>
+                          </m:f>
+                        </m:e>
+                      </m:d>
+                      <m:r>
+                        <a:rPr lang="fr-FR" sz="1100" i="1">
+                          <a:latin typeface="Cambria Math" panose="02040503050406030204" pitchFamily="18" charset="0"/>
+                        </a:rPr>
+                        <m:t>+</m:t>
+                      </m:r>
+                      <m:sSubSup>
+                        <m:sSubSupPr>
+                          <m:ctrlPr>
+                            <a:rPr lang="fr-FR" sz="1100" i="1">
+                              <a:latin typeface="Cambria Math" panose="02040503050406030204" pitchFamily="18" charset="0"/>
+                            </a:rPr>
+                          </m:ctrlPr>
+                        </m:sSubSupPr>
+                        <m:e>
+                          <m:r>
+                            <a:rPr lang="fr-FR" sz="1100" i="1">
+                              <a:latin typeface="Cambria Math" panose="02040503050406030204" pitchFamily="18" charset="0"/>
+                            </a:rPr>
+                            <m:t>𝐶</m:t>
+                          </m:r>
+                        </m:e>
+                        <m:sub>
+                          <m:r>
+                            <a:rPr lang="fr-FR" sz="1100" i="1">
+                              <a:latin typeface="Cambria Math" panose="02040503050406030204" pitchFamily="18" charset="0"/>
+                            </a:rPr>
+                            <m:t>𝑖</m:t>
+                          </m:r>
+                          <m:r>
+                            <a:rPr lang="fr-FR" sz="1100" i="1">
+                              <a:latin typeface="Cambria Math" panose="02040503050406030204" pitchFamily="18" charset="0"/>
+                            </a:rPr>
+                            <m:t>+1</m:t>
+                          </m:r>
+                        </m:sub>
+                        <m:sup>
+                          <m:r>
+                            <a:rPr lang="fr-FR" sz="1100" i="1">
+                              <a:latin typeface="Cambria Math" panose="02040503050406030204" pitchFamily="18" charset="0"/>
+                            </a:rPr>
+                            <m:t>𝑛</m:t>
+                          </m:r>
+                          <m:r>
+                            <a:rPr lang="fr-FR" sz="1100" i="1">
+                              <a:latin typeface="Cambria Math" panose="02040503050406030204" pitchFamily="18" charset="0"/>
+                            </a:rPr>
+                            <m:t>+1</m:t>
+                          </m:r>
+                        </m:sup>
+                      </m:sSubSup>
+                      <m:d>
+                        <m:dPr>
+                          <m:begChr m:val="["/>
+                          <m:endChr m:val="]"/>
+                          <m:ctrlPr>
+                            <a:rPr lang="fr-FR" sz="1100" i="1">
+                              <a:latin typeface="Cambria Math" panose="02040503050406030204" pitchFamily="18" charset="0"/>
+                            </a:rPr>
+                          </m:ctrlPr>
+                        </m:dPr>
+                        <m:e>
+                          <m:sSub>
+                            <m:sSubPr>
+                              <m:ctrlPr>
+                                <a:rPr lang="fr-FR" sz="1100" i="1">
+                                  <a:latin typeface="Cambria Math" panose="02040503050406030204" pitchFamily="18" charset="0"/>
+                                </a:rPr>
+                              </m:ctrlPr>
+                            </m:sSubPr>
+                            <m:e>
+                              <m:f>
+                                <m:fPr>
+                                  <m:ctrlPr>
+                                    <a:rPr lang="fr-FR" sz="1100" i="1">
+                                      <a:latin typeface="Cambria Math" panose="02040503050406030204" pitchFamily="18" charset="0"/>
+                                      <a:ea typeface="Cambria Math" panose="02040503050406030204" pitchFamily="18" charset="0"/>
+                                    </a:rPr>
+                                  </m:ctrlPr>
+                                </m:fPr>
+                                <m:num>
+                                  <m:r>
+                                    <a:rPr lang="fr-FR" sz="1100" b="0" i="1" smtClean="0">
+                                      <a:latin typeface="Cambria Math" panose="02040503050406030204" pitchFamily="18" charset="0"/>
+                                      <a:ea typeface="Cambria Math" panose="02040503050406030204" pitchFamily="18" charset="0"/>
+                                    </a:rPr>
+                                    <m:t>1</m:t>
+                                  </m:r>
+                                </m:num>
+                                <m:den>
+                                  <m:r>
+                                    <a:rPr lang="fr-FR" sz="1100" i="1">
+                                      <a:latin typeface="Cambria Math" panose="02040503050406030204" pitchFamily="18" charset="0"/>
+                                      <a:ea typeface="Cambria Math" panose="02040503050406030204" pitchFamily="18" charset="0"/>
+                                    </a:rPr>
+                                    <m:t>2</m:t>
+                                  </m:r>
+                                </m:den>
+                              </m:f>
+                              <m:r>
+                                <a:rPr lang="fr-FR" sz="1100" i="1">
+                                  <a:latin typeface="Cambria Math" panose="02040503050406030204" pitchFamily="18" charset="0"/>
+                                  <a:ea typeface="Cambria Math" panose="02040503050406030204" pitchFamily="18" charset="0"/>
+                                </a:rPr>
+                                <m:t>∙</m:t>
+                              </m:r>
+                              <m:r>
+                                <a:rPr lang="fr-FR" sz="1100" i="1">
+                                  <a:latin typeface="Cambria Math" panose="02040503050406030204" pitchFamily="18" charset="0"/>
+                                </a:rPr>
+                                <m:t>𝐷</m:t>
+                              </m:r>
+                            </m:e>
+                            <m:sub>
+                              <m:r>
+                                <a:rPr lang="fr-FR" sz="1100" i="1">
+                                  <a:latin typeface="Cambria Math" panose="02040503050406030204" pitchFamily="18" charset="0"/>
+                                </a:rPr>
+                                <m:t>𝑒𝑓𝑓</m:t>
+                              </m:r>
+                            </m:sub>
+                          </m:sSub>
+                          <m:d>
+                            <m:dPr>
+                              <m:ctrlPr>
+                                <a:rPr lang="fr-FR" sz="1100" i="1">
+                                  <a:latin typeface="Cambria Math" panose="02040503050406030204" pitchFamily="18" charset="0"/>
+                                </a:rPr>
+                              </m:ctrlPr>
+                            </m:dPr>
+                            <m:e>
+                              <m:f>
+                                <m:fPr>
+                                  <m:ctrlPr>
+                                    <a:rPr lang="fr-FR" sz="1100" i="1">
+                                      <a:latin typeface="Cambria Math" panose="02040503050406030204" pitchFamily="18" charset="0"/>
+                                    </a:rPr>
+                                  </m:ctrlPr>
+                                </m:fPr>
+                                <m:num>
+                                  <m:r>
+                                    <a:rPr lang="fr-FR" sz="1100" i="1">
+                                      <a:latin typeface="Cambria Math" panose="02040503050406030204" pitchFamily="18" charset="0"/>
+                                    </a:rPr>
+                                    <m:t>1</m:t>
+                                  </m:r>
+                                </m:num>
+                                <m:den>
+                                  <m:r>
+                                    <a:rPr lang="fr-FR" sz="1100" i="1">
+                                      <a:latin typeface="Cambria Math" panose="02040503050406030204" pitchFamily="18" charset="0"/>
+                                    </a:rPr>
+                                    <m:t>2</m:t>
+                                  </m:r>
+                                  <m:r>
+                                    <a:rPr lang="fr-FR" sz="1100" i="1">
+                                      <a:latin typeface="Cambria Math" panose="02040503050406030204" pitchFamily="18" charset="0"/>
+                                    </a:rPr>
+                                    <m:t>𝑟</m:t>
+                                  </m:r>
+                                  <m:r>
+                                    <a:rPr lang="fr-FR" sz="1100" i="1">
+                                      <a:latin typeface="Cambria Math" panose="02040503050406030204" pitchFamily="18" charset="0"/>
+                                      <a:ea typeface="Cambria Math" panose="02040503050406030204" pitchFamily="18" charset="0"/>
+                                    </a:rPr>
+                                    <m:t>∆</m:t>
+                                  </m:r>
+                                  <m:r>
+                                    <a:rPr lang="fr-FR" sz="1100" i="1">
+                                      <a:latin typeface="Cambria Math" panose="02040503050406030204" pitchFamily="18" charset="0"/>
+                                      <a:ea typeface="Cambria Math" panose="02040503050406030204" pitchFamily="18" charset="0"/>
+                                    </a:rPr>
+                                    <m:t>𝑟</m:t>
+                                  </m:r>
+                                </m:den>
+                              </m:f>
+                              <m:r>
+                                <a:rPr lang="fr-FR" sz="1100" i="1">
+                                  <a:latin typeface="Cambria Math" panose="02040503050406030204" pitchFamily="18" charset="0"/>
+                                </a:rPr>
+                                <m:t>+</m:t>
+                              </m:r>
+                              <m:f>
+                                <m:fPr>
+                                  <m:ctrlPr>
+                                    <a:rPr lang="fr-FR" sz="1100" i="1">
+                                      <a:latin typeface="Cambria Math" panose="02040503050406030204" pitchFamily="18" charset="0"/>
+                                    </a:rPr>
+                                  </m:ctrlPr>
+                                </m:fPr>
+                                <m:num>
+                                  <m:r>
+                                    <a:rPr lang="fr-FR" sz="1100" i="1">
+                                      <a:latin typeface="Cambria Math" panose="02040503050406030204" pitchFamily="18" charset="0"/>
+                                    </a:rPr>
+                                    <m:t>1</m:t>
+                                  </m:r>
+                                </m:num>
+                                <m:den>
+                                  <m:r>
+                                    <a:rPr lang="fr-FR" sz="1100" i="1">
+                                      <a:latin typeface="Cambria Math" panose="02040503050406030204" pitchFamily="18" charset="0"/>
+                                      <a:ea typeface="Cambria Math" panose="02040503050406030204" pitchFamily="18" charset="0"/>
+                                    </a:rPr>
+                                    <m:t>∆</m:t>
+                                  </m:r>
+                                  <m:sSup>
+                                    <m:sSupPr>
+                                      <m:ctrlPr>
+                                        <a:rPr lang="fr-FR" sz="1100" i="1">
+                                          <a:latin typeface="Cambria Math" panose="02040503050406030204" pitchFamily="18" charset="0"/>
+                                          <a:ea typeface="Cambria Math" panose="02040503050406030204" pitchFamily="18" charset="0"/>
+                                        </a:rPr>
+                                      </m:ctrlPr>
+                                    </m:sSupPr>
+                                    <m:e>
+                                      <m:r>
+                                        <a:rPr lang="fr-FR" sz="1100" i="1">
+                                          <a:latin typeface="Cambria Math" panose="02040503050406030204" pitchFamily="18" charset="0"/>
+                                          <a:ea typeface="Cambria Math" panose="02040503050406030204" pitchFamily="18" charset="0"/>
+                                        </a:rPr>
+                                        <m:t>𝑟</m:t>
+                                      </m:r>
+                                    </m:e>
+                                    <m:sup>
+                                      <m:r>
+                                        <a:rPr lang="fr-FR" sz="1100" i="1">
+                                          <a:latin typeface="Cambria Math" panose="02040503050406030204" pitchFamily="18" charset="0"/>
+                                          <a:ea typeface="Cambria Math" panose="02040503050406030204" pitchFamily="18" charset="0"/>
+                                        </a:rPr>
+                                        <m:t>2</m:t>
+                                      </m:r>
+                                    </m:sup>
+                                  </m:sSup>
+                                </m:den>
+                              </m:f>
+                            </m:e>
+                          </m:d>
+                        </m:e>
+                      </m:d>
+                    </m:oMath>
+                  </m:oMathPara>
+                </a14:m>
+                <a:endParaRPr lang="en-GB" sz="1100" dirty="0"/>
+              </a:p>
+            </p:txBody>
+          </p:sp>
+        </mc:Choice>
+        <mc:Fallback>
+          <p:sp>
+            <p:nvSpPr>
+              <p:cNvPr id="4" name="TextBox 3">
+                <a:extLst>
+                  <a:ext uri="{FF2B5EF4-FFF2-40B4-BE49-F238E27FC236}">
+                    <a16:creationId xmlns:a16="http://schemas.microsoft.com/office/drawing/2014/main" id="{EADB7A49-C3D6-2E36-AA84-D62056BEB820}"/>
+                  </a:ext>
+                </a:extLst>
+              </p:cNvPr>
+              <p:cNvSpPr txBox="1">
+                <a:spLocks noRot="1" noChangeAspect="1" noMove="1" noResize="1" noEditPoints="1" noAdjustHandles="1" noChangeArrowheads="1" noChangeShapeType="1" noTextEdit="1"/>
+              </p:cNvSpPr>
+              <p:nvPr/>
+            </p:nvSpPr>
+            <p:spPr>
+              <a:xfrm>
+                <a:off x="95994" y="2762031"/>
+                <a:ext cx="12000012" cy="380361"/>
+              </a:xfrm>
+              <a:prstGeom prst="rect">
+                <a:avLst/>
+              </a:prstGeom>
+              <a:blipFill>
+                <a:blip r:embed="rId8"/>
+                <a:stretch>
+                  <a:fillRect/>
                 </a:stretch>
               </a:blipFill>
             </p:spPr>
@@ -23303,7 +25143,7 @@
             <p:spPr>
               <a:xfrm>
                 <a:off x="4575101" y="1163593"/>
-                <a:ext cx="2602059" cy="633891"/>
+                <a:ext cx="2588594" cy="633891"/>
               </a:xfrm>
               <a:prstGeom prst="rect">
                 <a:avLst/>
@@ -23316,6 +25156,7 @@
               </a:bodyPr>
               <a:lstStyle/>
               <a:p>
+                <a:pPr/>
                 <a14:m>
                   <m:oMathPara xmlns:m="http://schemas.openxmlformats.org/officeDocument/2006/math">
                     <m:oMathParaPr>
@@ -23475,7 +25316,7 @@
                           <a:latin typeface="Cambria Math" panose="02040503050406030204" pitchFamily="18" charset="0"/>
                           <a:ea typeface="Cambria Math" panose="02040503050406030204" pitchFamily="18" charset="0"/>
                         </a:rPr>
-                        <m:t>𝑠𝑖𝑛</m:t>
+                        <m:t>𝑒𝑥𝑝</m:t>
                       </m:r>
                       <m:d>
                         <m:dPr>
@@ -23497,13 +25338,6 @@
                               </m:ctrlPr>
                             </m:fPr>
                             <m:num>
-                              <m:r>
-                                <a:rPr lang="fr-FR" b="0" i="1" smtClean="0">
-                                  <a:latin typeface="Cambria Math" panose="02040503050406030204" pitchFamily="18" charset="0"/>
-                                  <a:ea typeface="Cambria Math" panose="02040503050406030204" pitchFamily="18" charset="0"/>
-                                </a:rPr>
-                                <m:t>𝜋</m:t>
-                              </m:r>
                               <m:r>
                                 <a:rPr lang="fr-FR" b="0" i="1" smtClean="0">
                                   <a:latin typeface="Cambria Math" panose="02040503050406030204" pitchFamily="18" charset="0"/>
@@ -23571,7 +25405,7 @@
             <p:spPr>
               <a:xfrm>
                 <a:off x="4575101" y="1163593"/>
-                <a:ext cx="2602059" cy="633891"/>
+                <a:ext cx="2588594" cy="633891"/>
               </a:xfrm>
               <a:prstGeom prst="rect">
                 <a:avLst/>
@@ -23654,7 +25488,7 @@
             <p:spPr>
               <a:xfrm>
                 <a:off x="177419" y="2449184"/>
-                <a:ext cx="4799071" cy="628249"/>
+                <a:ext cx="4849213" cy="628249"/>
               </a:xfrm>
               <a:prstGeom prst="rect">
                 <a:avLst/>
@@ -23667,6 +25501,7 @@
               </a:bodyPr>
               <a:lstStyle/>
               <a:p>
+                <a:pPr/>
                 <a14:m>
                   <m:oMathPara xmlns:m="http://schemas.openxmlformats.org/officeDocument/2006/math">
                     <m:oMathParaPr>
@@ -23879,7 +25714,7 @@
                           <a:latin typeface="Cambria Math" panose="02040503050406030204" pitchFamily="18" charset="0"/>
                           <a:ea typeface="Cambria Math" panose="02040503050406030204" pitchFamily="18" charset="0"/>
                         </a:rPr>
-                        <m:t>𝑠𝑖𝑛</m:t>
+                        <m:t>𝑒𝑥𝑝</m:t>
                       </m:r>
                       <m:d>
                         <m:dPr>
@@ -23901,13 +25736,6 @@
                               </m:ctrlPr>
                             </m:fPr>
                             <m:num>
-                              <m:r>
-                                <a:rPr lang="fr-FR" b="0" i="1" smtClean="0">
-                                  <a:latin typeface="Cambria Math" panose="02040503050406030204" pitchFamily="18" charset="0"/>
-                                  <a:ea typeface="Cambria Math" panose="02040503050406030204" pitchFamily="18" charset="0"/>
-                                </a:rPr>
-                                <m:t>𝜋</m:t>
-                              </m:r>
                               <m:r>
                                 <a:rPr lang="fr-FR" b="0" i="1" smtClean="0">
                                   <a:latin typeface="Cambria Math" panose="02040503050406030204" pitchFamily="18" charset="0"/>
@@ -23975,7 +25803,7 @@
             <p:spPr>
               <a:xfrm>
                 <a:off x="177419" y="2449184"/>
-                <a:ext cx="4799071" cy="628249"/>
+                <a:ext cx="4849213" cy="628249"/>
               </a:xfrm>
               <a:prstGeom prst="rect">
                 <a:avLst/>
@@ -24002,8 +25830,8 @@
           </p:sp>
         </mc:Fallback>
       </mc:AlternateContent>
-      <mc:AlternateContent xmlns:mc="http://schemas.openxmlformats.org/markup-compatibility/2006">
-        <mc:Choice xmlns:a14="http://schemas.microsoft.com/office/drawing/2010/main" Requires="a14">
+      <mc:AlternateContent xmlns:mc="http://schemas.openxmlformats.org/markup-compatibility/2006" xmlns:a14="http://schemas.microsoft.com/office/drawing/2010/main">
+        <mc:Choice Requires="a14">
           <p:sp>
             <p:nvSpPr>
               <p:cNvPr id="14" name="TextBox 13">
@@ -24032,6 +25860,7 @@
               </a:bodyPr>
               <a:lstStyle/>
               <a:p>
+                <a:pPr/>
                 <a14:m>
                   <m:oMathPara xmlns:m="http://schemas.openxmlformats.org/officeDocument/2006/math">
                     <m:oMathParaPr>
@@ -24240,7 +26069,7 @@
             </p:txBody>
           </p:sp>
         </mc:Choice>
-        <mc:Fallback>
+        <mc:Fallback xmlns="">
           <p:sp>
             <p:nvSpPr>
               <p:cNvPr id="14" name="TextBox 13">
@@ -24301,8 +26130,8 @@
             </p:nvSpPr>
             <p:spPr>
               <a:xfrm>
-                <a:off x="177418" y="4149557"/>
-                <a:ext cx="3852914" cy="286425"/>
+                <a:off x="177418" y="3941667"/>
+                <a:ext cx="4255011" cy="553998"/>
               </a:xfrm>
               <a:prstGeom prst="rect">
                 <a:avLst/>
@@ -24315,6 +26144,7 @@
               </a:bodyPr>
               <a:lstStyle/>
               <a:p>
+                <a:pPr/>
                 <a14:m>
                   <m:oMathPara xmlns:m="http://schemas.openxmlformats.org/officeDocument/2006/math">
                     <m:oMathParaPr>
@@ -24428,8 +26258,96 @@
                           <a:latin typeface="Cambria Math" panose="02040503050406030204" pitchFamily="18" charset="0"/>
                           <a:ea typeface="Cambria Math" panose="02040503050406030204" pitchFamily="18" charset="0"/>
                         </a:rPr>
-                        <m:t>=0)=0</m:t>
+                        <m:t>=0)=</m:t>
                       </m:r>
+                      <m:sSub>
+                        <m:sSubPr>
+                          <m:ctrlPr>
+                            <a:rPr lang="fr-FR" i="1">
+                              <a:latin typeface="Cambria Math" panose="02040503050406030204" pitchFamily="18" charset="0"/>
+                            </a:rPr>
+                          </m:ctrlPr>
+                        </m:sSubPr>
+                        <m:e>
+                          <m:r>
+                            <a:rPr lang="fr-FR" i="1">
+                              <a:latin typeface="Cambria Math" panose="02040503050406030204" pitchFamily="18" charset="0"/>
+                            </a:rPr>
+                            <m:t>𝐶</m:t>
+                          </m:r>
+                        </m:e>
+                        <m:sub>
+                          <m:r>
+                            <a:rPr lang="fr-FR" i="1">
+                              <a:latin typeface="Cambria Math" panose="02040503050406030204" pitchFamily="18" charset="0"/>
+                            </a:rPr>
+                            <m:t>𝑒</m:t>
+                          </m:r>
+                        </m:sub>
+                      </m:sSub>
+                      <m:f>
+                        <m:fPr>
+                          <m:ctrlPr>
+                            <a:rPr lang="fr-FR" i="1">
+                              <a:latin typeface="Cambria Math" panose="02040503050406030204" pitchFamily="18" charset="0"/>
+                            </a:rPr>
+                          </m:ctrlPr>
+                        </m:fPr>
+                        <m:num>
+                          <m:sSup>
+                            <m:sSupPr>
+                              <m:ctrlPr>
+                                <a:rPr lang="fr-FR" i="1">
+                                  <a:latin typeface="Cambria Math" panose="02040503050406030204" pitchFamily="18" charset="0"/>
+                                </a:rPr>
+                              </m:ctrlPr>
+                            </m:sSupPr>
+                            <m:e>
+                              <m:r>
+                                <a:rPr lang="fr-FR" i="1">
+                                  <a:latin typeface="Cambria Math" panose="02040503050406030204" pitchFamily="18" charset="0"/>
+                                </a:rPr>
+                                <m:t>𝑟</m:t>
+                              </m:r>
+                            </m:e>
+                            <m:sup>
+                              <m:r>
+                                <a:rPr lang="fr-FR" i="1">
+                                  <a:latin typeface="Cambria Math" panose="02040503050406030204" pitchFamily="18" charset="0"/>
+                                </a:rPr>
+                                <m:t>2</m:t>
+                              </m:r>
+                            </m:sup>
+                          </m:sSup>
+                        </m:num>
+                        <m:den>
+                          <m:sSup>
+                            <m:sSupPr>
+                              <m:ctrlPr>
+                                <a:rPr lang="fr-FR" i="1">
+                                  <a:latin typeface="Cambria Math" panose="02040503050406030204" pitchFamily="18" charset="0"/>
+                                </a:rPr>
+                              </m:ctrlPr>
+                            </m:sSupPr>
+                            <m:e>
+                              <m:r>
+                                <a:rPr lang="fr-FR" i="1">
+                                  <a:latin typeface="Cambria Math" panose="02040503050406030204" pitchFamily="18" charset="0"/>
+                                </a:rPr>
+                                <m:t>𝑅</m:t>
+                              </m:r>
+                            </m:e>
+                            <m:sup>
+                              <m:r>
+                                <a:rPr lang="fr-FR" i="1">
+                                  <a:latin typeface="Cambria Math" panose="02040503050406030204" pitchFamily="18" charset="0"/>
+                                </a:rPr>
+                                <m:t>2</m:t>
+                              </m:r>
+                            </m:sup>
+                          </m:sSup>
+                        </m:den>
+                      </m:f>
                     </m:oMath>
                   </m:oMathPara>
                 </a14:m>
@@ -24455,8 +26373,8 @@
             </p:nvSpPr>
             <p:spPr>
               <a:xfrm>
-                <a:off x="177418" y="4149557"/>
-                <a:ext cx="3852914" cy="286425"/>
+                <a:off x="177418" y="3941667"/>
+                <a:ext cx="4255011" cy="553998"/>
               </a:xfrm>
               <a:prstGeom prst="rect">
                 <a:avLst/>
@@ -24464,7 +26382,7 @@
               <a:blipFill>
                 <a:blip r:embed="rId5"/>
                 <a:stretch>
-                  <a:fillRect l="-949" t="-27660" r="-1108" b="-34043"/>
+                  <a:fillRect/>
                 </a:stretch>
               </a:blipFill>
             </p:spPr>
@@ -24577,7 +26495,7 @@
             <p:spPr>
               <a:xfrm>
                 <a:off x="177418" y="5204010"/>
-                <a:ext cx="9830063" cy="1328569"/>
+                <a:ext cx="9957278" cy="1328569"/>
               </a:xfrm>
               <a:prstGeom prst="rect">
                 <a:avLst/>
@@ -24974,11 +26892,10 @@
                         </m:fPr>
                         <m:num>
                           <m:r>
-                            <a:rPr lang="fr-FR" i="1">
-                              <a:latin typeface="Cambria Math" panose="02040503050406030204" pitchFamily="18" charset="0"/>
-                              <a:ea typeface="Cambria Math" panose="02040503050406030204" pitchFamily="18" charset="0"/>
-                            </a:rPr>
-                            <m:t>𝜋</m:t>
+                            <a:rPr lang="fr-FR" b="0" i="1" smtClean="0">
+                              <a:latin typeface="Cambria Math" panose="02040503050406030204" pitchFamily="18" charset="0"/>
+                            </a:rPr>
+                            <m:t>1</m:t>
                           </m:r>
                         </m:num>
                         <m:den>
@@ -25017,11 +26934,11 @@
                         <m:t>∙</m:t>
                       </m:r>
                       <m:r>
-                        <a:rPr lang="fr-FR" i="1">
+                        <a:rPr lang="fr-FR" b="0" i="1" smtClean="0">
                           <a:latin typeface="Cambria Math" panose="02040503050406030204" pitchFamily="18" charset="0"/>
                           <a:ea typeface="Cambria Math" panose="02040503050406030204" pitchFamily="18" charset="0"/>
                         </a:rPr>
-                        <m:t>𝑐𝑜𝑠</m:t>
+                        <m:t>𝑒𝑥𝑝</m:t>
                       </m:r>
                       <m:d>
                         <m:dPr>
@@ -25043,13 +26960,6 @@
                               </m:ctrlPr>
                             </m:fPr>
                             <m:num>
-                              <m:r>
-                                <a:rPr lang="fr-FR" i="1">
-                                  <a:latin typeface="Cambria Math" panose="02040503050406030204" pitchFamily="18" charset="0"/>
-                                  <a:ea typeface="Cambria Math" panose="02040503050406030204" pitchFamily="18" charset="0"/>
-                                </a:rPr>
-                                <m:t>𝜋</m:t>
-                              </m:r>
                               <m:r>
                                 <a:rPr lang="fr-FR" i="1">
                                   <a:latin typeface="Cambria Math" panose="02040503050406030204" pitchFamily="18" charset="0"/>
@@ -25210,11 +27120,11 @@
                             <m:t>∙</m:t>
                           </m:r>
                           <m:r>
-                            <a:rPr lang="fr-FR" i="1">
+                            <a:rPr lang="fr-FR" b="0" i="1" smtClean="0">
                               <a:latin typeface="Cambria Math" panose="02040503050406030204" pitchFamily="18" charset="0"/>
                               <a:ea typeface="Cambria Math" panose="02040503050406030204" pitchFamily="18" charset="0"/>
                             </a:rPr>
-                            <m:t>𝑠𝑖𝑛</m:t>
+                            <m:t>𝑒𝑥𝑝</m:t>
                           </m:r>
                           <m:d>
                             <m:dPr>
@@ -25236,13 +27146,6 @@
                                   </m:ctrlPr>
                                 </m:fPr>
                                 <m:num>
-                                  <m:r>
-                                    <a:rPr lang="fr-FR" i="1">
-                                      <a:latin typeface="Cambria Math" panose="02040503050406030204" pitchFamily="18" charset="0"/>
-                                      <a:ea typeface="Cambria Math" panose="02040503050406030204" pitchFamily="18" charset="0"/>
-                                    </a:rPr>
-                                    <m:t>𝜋</m:t>
-                                  </m:r>
                                   <m:r>
                                     <a:rPr lang="fr-FR" i="1">
                                       <a:latin typeface="Cambria Math" panose="02040503050406030204" pitchFamily="18" charset="0"/>
@@ -25403,11 +27306,11 @@
                         <m:t>∙</m:t>
                       </m:r>
                       <m:r>
-                        <a:rPr lang="fr-FR" i="1">
+                        <a:rPr lang="fr-FR" b="0" i="1" smtClean="0">
                           <a:latin typeface="Cambria Math" panose="02040503050406030204" pitchFamily="18" charset="0"/>
                           <a:ea typeface="Cambria Math" panose="02040503050406030204" pitchFamily="18" charset="0"/>
                         </a:rPr>
-                        <m:t>𝑠𝑖𝑛</m:t>
+                        <m:t>𝑒𝑥𝑝</m:t>
                       </m:r>
                       <m:d>
                         <m:dPr>
@@ -25429,13 +27332,6 @@
                               </m:ctrlPr>
                             </m:fPr>
                             <m:num>
-                              <m:r>
-                                <a:rPr lang="fr-FR" i="1">
-                                  <a:latin typeface="Cambria Math" panose="02040503050406030204" pitchFamily="18" charset="0"/>
-                                  <a:ea typeface="Cambria Math" panose="02040503050406030204" pitchFamily="18" charset="0"/>
-                                </a:rPr>
-                                <m:t>𝜋</m:t>
-                              </m:r>
                               <m:r>
                                 <a:rPr lang="fr-FR" i="1">
                                   <a:latin typeface="Cambria Math" panose="02040503050406030204" pitchFamily="18" charset="0"/>
@@ -25858,34 +27754,29 @@
                           </m:sSup>
                         </m:den>
                       </m:f>
+                      <m:r>
+                        <a:rPr lang="fr-FR" i="1">
+                          <a:latin typeface="Cambria Math" panose="02040503050406030204" pitchFamily="18" charset="0"/>
+                          <a:ea typeface="Cambria Math" panose="02040503050406030204" pitchFamily="18" charset="0"/>
+                        </a:rPr>
+                        <m:t>𝑒𝑥𝑝</m:t>
+                      </m:r>
                       <m:d>
                         <m:dPr>
-                          <m:begChr m:val="["/>
-                          <m:endChr m:val="]"/>
                           <m:ctrlPr>
-                            <a:rPr lang="fr-FR" b="0" i="1" smtClean="0">
-                              <a:latin typeface="Cambria Math" panose="02040503050406030204" pitchFamily="18" charset="0"/>
+                            <a:rPr lang="fr-FR" i="1">
+                              <a:latin typeface="Cambria Math" panose="02040503050406030204" pitchFamily="18" charset="0"/>
+                              <a:ea typeface="Cambria Math" panose="02040503050406030204" pitchFamily="18" charset="0"/>
                             </a:rPr>
                           </m:ctrlPr>
                         </m:dPr>
                         <m:e>
-                          <m:r>
-                            <a:rPr lang="fr-FR" b="0" i="1" smtClean="0">
-                              <a:latin typeface="Cambria Math" panose="02040503050406030204" pitchFamily="18" charset="0"/>
-                            </a:rPr>
-                            <m:t>𝑟</m:t>
-                          </m:r>
-                          <m:r>
-                            <a:rPr lang="fr-FR" b="0" i="1" smtClean="0">
-                              <a:latin typeface="Cambria Math" panose="02040503050406030204" pitchFamily="18" charset="0"/>
-                            </a:rPr>
-                            <m:t>²</m:t>
-                          </m:r>
                           <m:f>
                             <m:fPr>
                               <m:ctrlPr>
                                 <a:rPr lang="fr-FR" i="1">
                                   <a:latin typeface="Cambria Math" panose="02040503050406030204" pitchFamily="18" charset="0"/>
+                                  <a:ea typeface="Cambria Math" panose="02040503050406030204" pitchFamily="18" charset="0"/>
                                 </a:rPr>
                               </m:ctrlPr>
                             </m:fPr>
@@ -25895,7 +27786,7 @@
                                   <a:latin typeface="Cambria Math" panose="02040503050406030204" pitchFamily="18" charset="0"/>
                                   <a:ea typeface="Cambria Math" panose="02040503050406030204" pitchFamily="18" charset="0"/>
                                 </a:rPr>
-                                <m:t>𝜋</m:t>
+                                <m:t>𝑡</m:t>
                               </m:r>
                             </m:num>
                             <m:den>
@@ -25904,6 +27795,7 @@
                                   <m:ctrlPr>
                                     <a:rPr lang="fr-FR" i="1">
                                       <a:latin typeface="Cambria Math" panose="02040503050406030204" pitchFamily="18" charset="0"/>
+                                      <a:ea typeface="Cambria Math" panose="02040503050406030204" pitchFamily="18" charset="0"/>
                                     </a:rPr>
                                   </m:ctrlPr>
                                 </m:sSubPr>
@@ -25911,6 +27803,7 @@
                                   <m:r>
                                     <a:rPr lang="fr-FR" i="1">
                                       <a:latin typeface="Cambria Math" panose="02040503050406030204" pitchFamily="18" charset="0"/>
+                                      <a:ea typeface="Cambria Math" panose="02040503050406030204" pitchFamily="18" charset="0"/>
                                     </a:rPr>
                                     <m:t>𝑡</m:t>
                                   </m:r>
@@ -25919,6 +27812,7 @@
                                   <m:r>
                                     <a:rPr lang="fr-FR" i="1">
                                       <a:latin typeface="Cambria Math" panose="02040503050406030204" pitchFamily="18" charset="0"/>
+                                      <a:ea typeface="Cambria Math" panose="02040503050406030204" pitchFamily="18" charset="0"/>
                                     </a:rPr>
                                     <m:t>𝑓</m:t>
                                   </m:r>
@@ -25926,88 +27820,75 @@
                               </m:sSub>
                             </m:den>
                           </m:f>
-                          <m:r>
-                            <a:rPr lang="fr-FR" i="1">
-                              <a:latin typeface="Cambria Math" panose="02040503050406030204" pitchFamily="18" charset="0"/>
-                              <a:ea typeface="Cambria Math" panose="02040503050406030204" pitchFamily="18" charset="0"/>
-                            </a:rPr>
-                            <m:t>∙</m:t>
-                          </m:r>
-                          <m:r>
-                            <a:rPr lang="fr-FR" i="1">
-                              <a:latin typeface="Cambria Math" panose="02040503050406030204" pitchFamily="18" charset="0"/>
-                              <a:ea typeface="Cambria Math" panose="02040503050406030204" pitchFamily="18" charset="0"/>
-                            </a:rPr>
-                            <m:t>𝑐𝑜𝑠</m:t>
-                          </m:r>
-                          <m:d>
-                            <m:dPr>
+                        </m:e>
+                      </m:d>
+                      <m:d>
+                        <m:dPr>
+                          <m:begChr m:val="["/>
+                          <m:endChr m:val="]"/>
+                          <m:ctrlPr>
+                            <a:rPr lang="fr-FR" b="0" i="1" smtClean="0">
+                              <a:latin typeface="Cambria Math" panose="02040503050406030204" pitchFamily="18" charset="0"/>
+                            </a:rPr>
+                          </m:ctrlPr>
+                        </m:dPr>
+                        <m:e>
+                          <m:r>
+                            <a:rPr lang="fr-FR" b="0" i="1" smtClean="0">
+                              <a:latin typeface="Cambria Math" panose="02040503050406030204" pitchFamily="18" charset="0"/>
+                            </a:rPr>
+                            <m:t>𝑟</m:t>
+                          </m:r>
+                          <m:r>
+                            <a:rPr lang="fr-FR" b="0" i="1" smtClean="0">
+                              <a:latin typeface="Cambria Math" panose="02040503050406030204" pitchFamily="18" charset="0"/>
+                            </a:rPr>
+                            <m:t>²</m:t>
+                          </m:r>
+                          <m:f>
+                            <m:fPr>
                               <m:ctrlPr>
                                 <a:rPr lang="fr-FR" i="1">
                                   <a:latin typeface="Cambria Math" panose="02040503050406030204" pitchFamily="18" charset="0"/>
-                                  <a:ea typeface="Cambria Math" panose="02040503050406030204" pitchFamily="18" charset="0"/>
                                 </a:rPr>
                               </m:ctrlPr>
-                            </m:dPr>
-                            <m:e>
-                              <m:f>
-                                <m:fPr>
+                            </m:fPr>
+                            <m:num>
+                              <m:r>
+                                <a:rPr lang="fr-FR" b="0" i="1" smtClean="0">
+                                  <a:latin typeface="Cambria Math" panose="02040503050406030204" pitchFamily="18" charset="0"/>
+                                </a:rPr>
+                                <m:t>1</m:t>
+                              </m:r>
+                            </m:num>
+                            <m:den>
+                              <m:sSub>
+                                <m:sSubPr>
                                   <m:ctrlPr>
                                     <a:rPr lang="fr-FR" i="1">
                                       <a:latin typeface="Cambria Math" panose="02040503050406030204" pitchFamily="18" charset="0"/>
-                                      <a:ea typeface="Cambria Math" panose="02040503050406030204" pitchFamily="18" charset="0"/>
                                     </a:rPr>
                                   </m:ctrlPr>
-                                </m:fPr>
-                                <m:num>
+                                </m:sSubPr>
+                                <m:e>
                                   <m:r>
                                     <a:rPr lang="fr-FR" i="1">
                                       <a:latin typeface="Cambria Math" panose="02040503050406030204" pitchFamily="18" charset="0"/>
-                                      <a:ea typeface="Cambria Math" panose="02040503050406030204" pitchFamily="18" charset="0"/>
-                                    </a:rPr>
-                                    <m:t>𝜋</m:t>
+                                    </a:rPr>
+                                    <m:t>𝑡</m:t>
                                   </m:r>
+                                </m:e>
+                                <m:sub>
                                   <m:r>
                                     <a:rPr lang="fr-FR" i="1">
                                       <a:latin typeface="Cambria Math" panose="02040503050406030204" pitchFamily="18" charset="0"/>
-                                      <a:ea typeface="Cambria Math" panose="02040503050406030204" pitchFamily="18" charset="0"/>
-                                    </a:rPr>
-                                    <m:t>𝑡</m:t>
+                                    </a:rPr>
+                                    <m:t>𝑓</m:t>
                                   </m:r>
-                                </m:num>
-                                <m:den>
-                                  <m:sSub>
-                                    <m:sSubPr>
-                                      <m:ctrlPr>
-                                        <a:rPr lang="fr-FR" i="1">
-                                          <a:latin typeface="Cambria Math" panose="02040503050406030204" pitchFamily="18" charset="0"/>
-                                          <a:ea typeface="Cambria Math" panose="02040503050406030204" pitchFamily="18" charset="0"/>
-                                        </a:rPr>
-                                      </m:ctrlPr>
-                                    </m:sSubPr>
-                                    <m:e>
-                                      <m:r>
-                                        <a:rPr lang="fr-FR" i="1">
-                                          <a:latin typeface="Cambria Math" panose="02040503050406030204" pitchFamily="18" charset="0"/>
-                                          <a:ea typeface="Cambria Math" panose="02040503050406030204" pitchFamily="18" charset="0"/>
-                                        </a:rPr>
-                                        <m:t>𝑡</m:t>
-                                      </m:r>
-                                    </m:e>
-                                    <m:sub>
-                                      <m:r>
-                                        <a:rPr lang="fr-FR" i="1">
-                                          <a:latin typeface="Cambria Math" panose="02040503050406030204" pitchFamily="18" charset="0"/>
-                                          <a:ea typeface="Cambria Math" panose="02040503050406030204" pitchFamily="18" charset="0"/>
-                                        </a:rPr>
-                                        <m:t>𝑓</m:t>
-                                      </m:r>
-                                    </m:sub>
-                                  </m:sSub>
-                                </m:den>
-                              </m:f>
-                            </m:e>
-                          </m:d>
+                                </m:sub>
+                              </m:sSub>
+                            </m:den>
+                          </m:f>
                           <m:r>
                             <a:rPr lang="fr-FR" b="0" i="1" smtClean="0">
                               <a:latin typeface="Cambria Math" panose="02040503050406030204" pitchFamily="18" charset="0"/>
@@ -26015,81 +27896,6 @@
                             </a:rPr>
                             <m:t>+</m:t>
                           </m:r>
-                          <m:r>
-                            <a:rPr lang="fr-FR" i="1">
-                              <a:latin typeface="Cambria Math" panose="02040503050406030204" pitchFamily="18" charset="0"/>
-                              <a:ea typeface="Cambria Math" panose="02040503050406030204" pitchFamily="18" charset="0"/>
-                            </a:rPr>
-                            <m:t>𝑠𝑖𝑛</m:t>
-                          </m:r>
-                          <m:d>
-                            <m:dPr>
-                              <m:ctrlPr>
-                                <a:rPr lang="fr-FR" i="1">
-                                  <a:latin typeface="Cambria Math" panose="02040503050406030204" pitchFamily="18" charset="0"/>
-                                  <a:ea typeface="Cambria Math" panose="02040503050406030204" pitchFamily="18" charset="0"/>
-                                </a:rPr>
-                              </m:ctrlPr>
-                            </m:dPr>
-                            <m:e>
-                              <m:f>
-                                <m:fPr>
-                                  <m:ctrlPr>
-                                    <a:rPr lang="fr-FR" i="1">
-                                      <a:latin typeface="Cambria Math" panose="02040503050406030204" pitchFamily="18" charset="0"/>
-                                      <a:ea typeface="Cambria Math" panose="02040503050406030204" pitchFamily="18" charset="0"/>
-                                    </a:rPr>
-                                  </m:ctrlPr>
-                                </m:fPr>
-                                <m:num>
-                                  <m:r>
-                                    <a:rPr lang="fr-FR" i="1">
-                                      <a:latin typeface="Cambria Math" panose="02040503050406030204" pitchFamily="18" charset="0"/>
-                                      <a:ea typeface="Cambria Math" panose="02040503050406030204" pitchFamily="18" charset="0"/>
-                                    </a:rPr>
-                                    <m:t>𝜋</m:t>
-                                  </m:r>
-                                  <m:r>
-                                    <a:rPr lang="fr-FR" i="1">
-                                      <a:latin typeface="Cambria Math" panose="02040503050406030204" pitchFamily="18" charset="0"/>
-                                      <a:ea typeface="Cambria Math" panose="02040503050406030204" pitchFamily="18" charset="0"/>
-                                    </a:rPr>
-                                    <m:t>𝑡</m:t>
-                                  </m:r>
-                                </m:num>
-                                <m:den>
-                                  <m:sSub>
-                                    <m:sSubPr>
-                                      <m:ctrlPr>
-                                        <a:rPr lang="fr-FR" i="1">
-                                          <a:latin typeface="Cambria Math" panose="02040503050406030204" pitchFamily="18" charset="0"/>
-                                          <a:ea typeface="Cambria Math" panose="02040503050406030204" pitchFamily="18" charset="0"/>
-                                        </a:rPr>
-                                      </m:ctrlPr>
-                                    </m:sSubPr>
-                                    <m:e>
-                                      <m:r>
-                                        <a:rPr lang="fr-FR" i="1">
-                                          <a:latin typeface="Cambria Math" panose="02040503050406030204" pitchFamily="18" charset="0"/>
-                                          <a:ea typeface="Cambria Math" panose="02040503050406030204" pitchFamily="18" charset="0"/>
-                                        </a:rPr>
-                                        <m:t>𝑡</m:t>
-                                      </m:r>
-                                    </m:e>
-                                    <m:sub>
-                                      <m:r>
-                                        <a:rPr lang="fr-FR" i="1">
-                                          <a:latin typeface="Cambria Math" panose="02040503050406030204" pitchFamily="18" charset="0"/>
-                                          <a:ea typeface="Cambria Math" panose="02040503050406030204" pitchFamily="18" charset="0"/>
-                                        </a:rPr>
-                                        <m:t>𝑓</m:t>
-                                      </m:r>
-                                    </m:sub>
-                                  </m:sSub>
-                                </m:den>
-                              </m:f>
-                            </m:e>
-                          </m:d>
                           <m:d>
                             <m:dPr>
                               <m:ctrlPr>
@@ -26212,7 +28018,7 @@
             <p:spPr>
               <a:xfrm>
                 <a:off x="177418" y="5204010"/>
-                <a:ext cx="9830063" cy="1328569"/>
+                <a:ext cx="9957278" cy="1328569"/>
               </a:xfrm>
               <a:prstGeom prst="rect">
                 <a:avLst/>
@@ -26256,7 +28062,7 @@
             <p:spPr>
               <a:xfrm>
                 <a:off x="6318620" y="2431019"/>
-                <a:ext cx="2434064" cy="644151"/>
+                <a:ext cx="2460995" cy="644151"/>
               </a:xfrm>
               <a:prstGeom prst="rect">
                 <a:avLst/>
@@ -26269,6 +28075,7 @@
               </a:bodyPr>
               <a:lstStyle/>
               <a:p>
+                <a:pPr/>
                 <a14:m>
                   <m:oMathPara xmlns:m="http://schemas.openxmlformats.org/officeDocument/2006/math">
                     <m:oMathParaPr>
@@ -26428,11 +28235,10 @@
                         </m:fPr>
                         <m:num>
                           <m:r>
-                            <a:rPr lang="fr-FR" i="1" smtClean="0">
-                              <a:latin typeface="Cambria Math" panose="02040503050406030204" pitchFamily="18" charset="0"/>
-                              <a:ea typeface="Cambria Math" panose="02040503050406030204" pitchFamily="18" charset="0"/>
-                            </a:rPr>
-                            <m:t>𝜋</m:t>
+                            <a:rPr lang="fr-FR" b="0" i="1" smtClean="0">
+                              <a:latin typeface="Cambria Math" panose="02040503050406030204" pitchFamily="18" charset="0"/>
+                            </a:rPr>
+                            <m:t>1</m:t>
                           </m:r>
                         </m:num>
                         <m:den>
@@ -26475,7 +28281,7 @@
                           <a:latin typeface="Cambria Math" panose="02040503050406030204" pitchFamily="18" charset="0"/>
                           <a:ea typeface="Cambria Math" panose="02040503050406030204" pitchFamily="18" charset="0"/>
                         </a:rPr>
-                        <m:t>𝑐𝑜𝑠</m:t>
+                        <m:t>𝑒𝑥𝑝</m:t>
                       </m:r>
                       <m:d>
                         <m:dPr>
@@ -26497,13 +28303,6 @@
                               </m:ctrlPr>
                             </m:fPr>
                             <m:num>
-                              <m:r>
-                                <a:rPr lang="fr-FR" i="1">
-                                  <a:latin typeface="Cambria Math" panose="02040503050406030204" pitchFamily="18" charset="0"/>
-                                  <a:ea typeface="Cambria Math" panose="02040503050406030204" pitchFamily="18" charset="0"/>
-                                </a:rPr>
-                                <m:t>𝜋</m:t>
-                              </m:r>
                               <m:r>
                                 <a:rPr lang="fr-FR" i="1">
                                   <a:latin typeface="Cambria Math" panose="02040503050406030204" pitchFamily="18" charset="0"/>
@@ -26571,7 +28370,7 @@
             <p:spPr>
               <a:xfrm>
                 <a:off x="6318620" y="2431019"/>
-                <a:ext cx="2434064" cy="644151"/>
+                <a:ext cx="2460995" cy="644151"/>
               </a:xfrm>
               <a:prstGeom prst="rect">
                 <a:avLst/>
@@ -26615,7 +28414,7 @@
             <p:spPr>
               <a:xfrm>
                 <a:off x="6318620" y="3184446"/>
-                <a:ext cx="2183290" cy="644151"/>
+                <a:ext cx="2233432" cy="644151"/>
               </a:xfrm>
               <a:prstGeom prst="rect">
                 <a:avLst/>
@@ -26628,6 +28427,7 @@
               </a:bodyPr>
               <a:lstStyle/>
               <a:p>
+                <a:pPr/>
                 <a14:m>
                   <m:oMathPara xmlns:m="http://schemas.openxmlformats.org/officeDocument/2006/math">
                     <m:oMathParaPr>
@@ -26772,11 +28572,11 @@
                         <m:t>∙</m:t>
                       </m:r>
                       <m:r>
-                        <a:rPr lang="fr-FR" i="1">
+                        <a:rPr lang="fr-FR" b="0" i="1" smtClean="0">
                           <a:latin typeface="Cambria Math" panose="02040503050406030204" pitchFamily="18" charset="0"/>
                           <a:ea typeface="Cambria Math" panose="02040503050406030204" pitchFamily="18" charset="0"/>
                         </a:rPr>
-                        <m:t>𝑠𝑖𝑛</m:t>
+                        <m:t>𝑒𝑥𝑝</m:t>
                       </m:r>
                       <m:d>
                         <m:dPr>
@@ -26798,13 +28598,6 @@
                               </m:ctrlPr>
                             </m:fPr>
                             <m:num>
-                              <m:r>
-                                <a:rPr lang="fr-FR" i="1">
-                                  <a:latin typeface="Cambria Math" panose="02040503050406030204" pitchFamily="18" charset="0"/>
-                                  <a:ea typeface="Cambria Math" panose="02040503050406030204" pitchFamily="18" charset="0"/>
-                                </a:rPr>
-                                <m:t>𝜋</m:t>
-                              </m:r>
                               <m:r>
                                 <a:rPr lang="fr-FR" i="1">
                                   <a:latin typeface="Cambria Math" panose="02040503050406030204" pitchFamily="18" charset="0"/>
@@ -26872,7 +28665,7 @@
             <p:spPr>
               <a:xfrm>
                 <a:off x="6318620" y="3184446"/>
-                <a:ext cx="2183290" cy="644151"/>
+                <a:ext cx="2233432" cy="644151"/>
               </a:xfrm>
               <a:prstGeom prst="rect">
                 <a:avLst/>
@@ -26916,7 +28709,7 @@
             <p:spPr>
               <a:xfrm>
                 <a:off x="6318620" y="3941667"/>
-                <a:ext cx="2272032" cy="644151"/>
+                <a:ext cx="2322174" cy="644151"/>
               </a:xfrm>
               <a:prstGeom prst="rect">
                 <a:avLst/>
@@ -26929,6 +28722,7 @@
               </a:bodyPr>
               <a:lstStyle/>
               <a:p>
+                <a:pPr/>
                 <a14:m>
                   <m:oMathPara xmlns:m="http://schemas.openxmlformats.org/officeDocument/2006/math">
                     <m:oMathParaPr>
@@ -27079,11 +28873,11 @@
                         <m:t>∙</m:t>
                       </m:r>
                       <m:r>
-                        <a:rPr lang="fr-FR" i="1">
+                        <a:rPr lang="fr-FR" b="0" i="1" smtClean="0">
                           <a:latin typeface="Cambria Math" panose="02040503050406030204" pitchFamily="18" charset="0"/>
                           <a:ea typeface="Cambria Math" panose="02040503050406030204" pitchFamily="18" charset="0"/>
                         </a:rPr>
-                        <m:t>𝑠𝑖𝑛</m:t>
+                        <m:t>𝑒𝑥𝑝</m:t>
                       </m:r>
                       <m:d>
                         <m:dPr>
@@ -27105,13 +28899,6 @@
                               </m:ctrlPr>
                             </m:fPr>
                             <m:num>
-                              <m:r>
-                                <a:rPr lang="fr-FR" i="1">
-                                  <a:latin typeface="Cambria Math" panose="02040503050406030204" pitchFamily="18" charset="0"/>
-                                  <a:ea typeface="Cambria Math" panose="02040503050406030204" pitchFamily="18" charset="0"/>
-                                </a:rPr>
-                                <m:t>𝜋</m:t>
-                              </m:r>
                               <m:r>
                                 <a:rPr lang="fr-FR" i="1">
                                   <a:latin typeface="Cambria Math" panose="02040503050406030204" pitchFamily="18" charset="0"/>
@@ -27179,7 +28966,7 @@
             <p:spPr>
               <a:xfrm>
                 <a:off x="6318620" y="3941667"/>
-                <a:ext cx="2272032" cy="644151"/>
+                <a:ext cx="2322174" cy="644151"/>
               </a:xfrm>
               <a:prstGeom prst="rect">
                 <a:avLst/>
@@ -27206,8 +28993,8 @@
           </p:sp>
         </mc:Fallback>
       </mc:AlternateContent>
-      <mc:AlternateContent xmlns:mc="http://schemas.openxmlformats.org/markup-compatibility/2006">
-        <mc:Choice xmlns:a14="http://schemas.microsoft.com/office/drawing/2010/main" Requires="a14">
+      <mc:AlternateContent xmlns:mc="http://schemas.openxmlformats.org/markup-compatibility/2006" xmlns:a14="http://schemas.microsoft.com/office/drawing/2010/main">
+        <mc:Choice Requires="a14">
           <p:sp>
             <p:nvSpPr>
               <p:cNvPr id="27" name="TextBox 26">
@@ -27271,7 +29058,7 @@
             </p:txBody>
           </p:sp>
         </mc:Choice>
-        <mc:Fallback>
+        <mc:Fallback xmlns="">
           <p:sp>
             <p:nvSpPr>
               <p:cNvPr id="27" name="TextBox 26">
@@ -27618,7 +29405,7 @@
                 <a:latin typeface="Times New Roman" panose="02020603050405020304" pitchFamily="18" charset="0"/>
                 <a:cs typeface="Times New Roman" panose="02020603050405020304" pitchFamily="18" charset="0"/>
               </a:rPr>
-              <a:t>On peut représenter la fonction MMS et le terme source S dans des graphiques tel que : </a:t>
+              <a:t>Maintenant, il faut donc que nous résolvions : </a:t>
             </a:r>
           </a:p>
         </p:txBody>
@@ -27662,12 +29449,762 @@
           </a:p>
         </p:txBody>
       </p:sp>
+      <p:sp>
+        <p:nvSpPr>
+          <p:cNvPr id="7" name="TextBox 6">
+            <a:extLst>
+              <a:ext uri="{FF2B5EF4-FFF2-40B4-BE49-F238E27FC236}">
+                <a16:creationId xmlns:a16="http://schemas.microsoft.com/office/drawing/2014/main" id="{1862FEC3-64A1-C191-A286-CA41950E3380}"/>
+              </a:ext>
+            </a:extLst>
+          </p:cNvPr>
+          <p:cNvSpPr txBox="1"/>
+          <p:nvPr/>
+        </p:nvSpPr>
+        <p:spPr>
+          <a:xfrm>
+            <a:off x="0" y="1929913"/>
+            <a:ext cx="12192001" cy="369332"/>
+          </a:xfrm>
+          <a:prstGeom prst="rect">
+            <a:avLst/>
+          </a:prstGeom>
+          <a:noFill/>
+        </p:spPr>
+        <p:txBody>
+          <a:bodyPr wrap="square" rtlCol="0">
+            <a:spAutoFit/>
+          </a:bodyPr>
+          <a:lstStyle/>
+          <a:p>
+            <a:pPr algn="just"/>
+            <a:r>
+              <a:rPr lang="fr-FR" noProof="0" dirty="0">
+                <a:latin typeface="Times New Roman" panose="02020603050405020304" pitchFamily="18" charset="0"/>
+                <a:cs typeface="Times New Roman" panose="02020603050405020304" pitchFamily="18" charset="0"/>
+              </a:rPr>
+              <a:t>On peut représenter la fonction MMS et le terme source S dans des graphiques tel que : </a:t>
+            </a:r>
+          </a:p>
+        </p:txBody>
+      </p:sp>
+      <mc:AlternateContent xmlns:mc="http://schemas.openxmlformats.org/markup-compatibility/2006">
+        <mc:Choice xmlns:a14="http://schemas.microsoft.com/office/drawing/2010/main" Requires="a14">
+          <p:sp>
+            <p:nvSpPr>
+              <p:cNvPr id="11" name="TextBox 10">
+                <a:extLst>
+                  <a:ext uri="{FF2B5EF4-FFF2-40B4-BE49-F238E27FC236}">
+                    <a16:creationId xmlns:a16="http://schemas.microsoft.com/office/drawing/2014/main" id="{CEE01445-5110-B067-DED9-8FFB49916167}"/>
+                  </a:ext>
+                </a:extLst>
+              </p:cNvPr>
+              <p:cNvSpPr txBox="1"/>
+              <p:nvPr/>
+            </p:nvSpPr>
+            <p:spPr>
+              <a:xfrm>
+                <a:off x="1996478" y="991510"/>
+                <a:ext cx="8199039" cy="631840"/>
+              </a:xfrm>
+              <a:prstGeom prst="rect">
+                <a:avLst/>
+              </a:prstGeom>
+              <a:noFill/>
+            </p:spPr>
+            <p:txBody>
+              <a:bodyPr wrap="none" lIns="0" tIns="0" rIns="0" bIns="0" rtlCol="0">
+                <a:spAutoFit/>
+              </a:bodyPr>
+              <a:lstStyle/>
+              <a:p>
+                <a:pPr/>
+                <a14:m>
+                  <m:oMathPara xmlns:m="http://schemas.openxmlformats.org/officeDocument/2006/math">
+                    <m:oMathParaPr>
+                      <m:jc m:val="centerGroup"/>
+                    </m:oMathParaPr>
+                    <m:oMath xmlns:m="http://schemas.openxmlformats.org/officeDocument/2006/math">
+                      <m:r>
+                        <a:rPr lang="fr-FR" i="1" smtClean="0">
+                          <a:latin typeface="Cambria Math" panose="02040503050406030204" pitchFamily="18" charset="0"/>
+                        </a:rPr>
+                        <m:t>⇒</m:t>
+                      </m:r>
+                      <m:f>
+                        <m:fPr>
+                          <m:ctrlPr>
+                            <a:rPr lang="fr-FR" i="1" smtClean="0">
+                              <a:latin typeface="Cambria Math" panose="02040503050406030204" pitchFamily="18" charset="0"/>
+                            </a:rPr>
+                          </m:ctrlPr>
+                        </m:fPr>
+                        <m:num>
+                          <m:r>
+                            <a:rPr lang="fr-FR" i="1">
+                              <a:latin typeface="Cambria Math" panose="02040503050406030204" pitchFamily="18" charset="0"/>
+                            </a:rPr>
+                            <m:t>𝜕</m:t>
+                          </m:r>
+                          <m:r>
+                            <a:rPr lang="fr-FR" i="1">
+                              <a:latin typeface="Cambria Math" panose="02040503050406030204" pitchFamily="18" charset="0"/>
+                            </a:rPr>
+                            <m:t>𝐶</m:t>
+                          </m:r>
+                        </m:num>
+                        <m:den>
+                          <m:r>
+                            <a:rPr lang="fr-FR" i="1">
+                              <a:latin typeface="Cambria Math" panose="02040503050406030204" pitchFamily="18" charset="0"/>
+                            </a:rPr>
+                            <m:t>𝜕</m:t>
+                          </m:r>
+                          <m:r>
+                            <a:rPr lang="fr-FR" i="1">
+                              <a:latin typeface="Cambria Math" panose="02040503050406030204" pitchFamily="18" charset="0"/>
+                            </a:rPr>
+                            <m:t>𝑡</m:t>
+                          </m:r>
+                        </m:den>
+                      </m:f>
+                      <m:r>
+                        <a:rPr lang="fr-FR" b="0" i="1" noProof="0" smtClean="0">
+                          <a:latin typeface="Cambria Math" panose="02040503050406030204" pitchFamily="18" charset="0"/>
+                        </a:rPr>
+                        <m:t>=</m:t>
+                      </m:r>
+                      <m:sSub>
+                        <m:sSubPr>
+                          <m:ctrlPr>
+                            <a:rPr lang="fr-FR" i="1">
+                              <a:latin typeface="Cambria Math" panose="02040503050406030204" pitchFamily="18" charset="0"/>
+                            </a:rPr>
+                          </m:ctrlPr>
+                        </m:sSubPr>
+                        <m:e>
+                          <m:r>
+                            <a:rPr lang="fr-FR" i="1">
+                              <a:latin typeface="Cambria Math" panose="02040503050406030204" pitchFamily="18" charset="0"/>
+                            </a:rPr>
+                            <m:t>𝐷</m:t>
+                          </m:r>
+                        </m:e>
+                        <m:sub>
+                          <m:r>
+                            <a:rPr lang="fr-FR" i="1">
+                              <a:latin typeface="Cambria Math" panose="02040503050406030204" pitchFamily="18" charset="0"/>
+                            </a:rPr>
+                            <m:t>𝑒𝑓𝑓</m:t>
+                          </m:r>
+                        </m:sub>
+                      </m:sSub>
+                      <m:d>
+                        <m:dPr>
+                          <m:begChr m:val="["/>
+                          <m:endChr m:val="]"/>
+                          <m:ctrlPr>
+                            <a:rPr lang="fr-FR" i="1" smtClean="0">
+                              <a:latin typeface="Cambria Math" panose="02040503050406030204" pitchFamily="18" charset="0"/>
+                            </a:rPr>
+                          </m:ctrlPr>
+                        </m:dPr>
+                        <m:e>
+                          <m:f>
+                            <m:fPr>
+                              <m:ctrlPr>
+                                <a:rPr lang="fr-FR" i="1">
+                                  <a:latin typeface="Cambria Math" panose="02040503050406030204" pitchFamily="18" charset="0"/>
+                                </a:rPr>
+                              </m:ctrlPr>
+                            </m:fPr>
+                            <m:num>
+                              <m:r>
+                                <a:rPr lang="fr-FR" i="1">
+                                  <a:latin typeface="Cambria Math" panose="02040503050406030204" pitchFamily="18" charset="0"/>
+                                </a:rPr>
+                                <m:t>1</m:t>
+                              </m:r>
+                            </m:num>
+                            <m:den>
+                              <m:r>
+                                <a:rPr lang="fr-FR" i="1">
+                                  <a:latin typeface="Cambria Math" panose="02040503050406030204" pitchFamily="18" charset="0"/>
+                                </a:rPr>
+                                <m:t>𝑟</m:t>
+                              </m:r>
+                            </m:den>
+                          </m:f>
+                          <m:f>
+                            <m:fPr>
+                              <m:ctrlPr>
+                                <a:rPr lang="fr-FR" i="1">
+                                  <a:latin typeface="Cambria Math" panose="02040503050406030204" pitchFamily="18" charset="0"/>
+                                </a:rPr>
+                              </m:ctrlPr>
+                            </m:fPr>
+                            <m:num>
+                              <m:r>
+                                <a:rPr lang="fr-FR" i="1">
+                                  <a:latin typeface="Cambria Math" panose="02040503050406030204" pitchFamily="18" charset="0"/>
+                                </a:rPr>
+                                <m:t>𝜕</m:t>
+                              </m:r>
+                              <m:r>
+                                <a:rPr lang="fr-FR" i="1">
+                                  <a:latin typeface="Cambria Math" panose="02040503050406030204" pitchFamily="18" charset="0"/>
+                                </a:rPr>
+                                <m:t>𝐶</m:t>
+                              </m:r>
+                            </m:num>
+                            <m:den>
+                              <m:r>
+                                <a:rPr lang="fr-FR" i="1">
+                                  <a:latin typeface="Cambria Math" panose="02040503050406030204" pitchFamily="18" charset="0"/>
+                                </a:rPr>
+                                <m:t>𝜕</m:t>
+                              </m:r>
+                              <m:r>
+                                <a:rPr lang="fr-FR" i="1">
+                                  <a:latin typeface="Cambria Math" panose="02040503050406030204" pitchFamily="18" charset="0"/>
+                                </a:rPr>
+                                <m:t>𝑟</m:t>
+                              </m:r>
+                            </m:den>
+                          </m:f>
+                          <m:r>
+                            <a:rPr lang="fr-FR" i="1">
+                              <a:latin typeface="Cambria Math" panose="02040503050406030204" pitchFamily="18" charset="0"/>
+                            </a:rPr>
+                            <m:t>+</m:t>
+                          </m:r>
+                          <m:f>
+                            <m:fPr>
+                              <m:ctrlPr>
+                                <a:rPr lang="fr-FR" i="1">
+                                  <a:latin typeface="Cambria Math" panose="02040503050406030204" pitchFamily="18" charset="0"/>
+                                </a:rPr>
+                              </m:ctrlPr>
+                            </m:fPr>
+                            <m:num>
+                              <m:r>
+                                <a:rPr lang="fr-FR" i="1">
+                                  <a:latin typeface="Cambria Math" panose="02040503050406030204" pitchFamily="18" charset="0"/>
+                                </a:rPr>
+                                <m:t>𝜕</m:t>
+                              </m:r>
+                              <m:r>
+                                <a:rPr lang="fr-FR" i="1">
+                                  <a:latin typeface="Cambria Math" panose="02040503050406030204" pitchFamily="18" charset="0"/>
+                                </a:rPr>
+                                <m:t>²</m:t>
+                              </m:r>
+                              <m:r>
+                                <a:rPr lang="fr-FR" i="1">
+                                  <a:latin typeface="Cambria Math" panose="02040503050406030204" pitchFamily="18" charset="0"/>
+                                </a:rPr>
+                                <m:t>𝐶</m:t>
+                              </m:r>
+                            </m:num>
+                            <m:den>
+                              <m:r>
+                                <a:rPr lang="fr-FR" i="1">
+                                  <a:latin typeface="Cambria Math" panose="02040503050406030204" pitchFamily="18" charset="0"/>
+                                </a:rPr>
+                                <m:t>𝜕</m:t>
+                              </m:r>
+                              <m:r>
+                                <a:rPr lang="fr-FR" i="1">
+                                  <a:latin typeface="Cambria Math" panose="02040503050406030204" pitchFamily="18" charset="0"/>
+                                </a:rPr>
+                                <m:t>𝑟</m:t>
+                              </m:r>
+                              <m:r>
+                                <a:rPr lang="fr-FR" i="1">
+                                  <a:latin typeface="Cambria Math" panose="02040503050406030204" pitchFamily="18" charset="0"/>
+                                </a:rPr>
+                                <m:t>²</m:t>
+                              </m:r>
+                            </m:den>
+                          </m:f>
+                        </m:e>
+                      </m:d>
+                      <m:r>
+                        <a:rPr lang="fr-FR" i="1">
+                          <a:latin typeface="Cambria Math" panose="02040503050406030204" pitchFamily="18" charset="0"/>
+                          <a:ea typeface="Cambria Math" panose="02040503050406030204" pitchFamily="18" charset="0"/>
+                        </a:rPr>
+                        <m:t>−</m:t>
+                      </m:r>
+                      <m:r>
+                        <a:rPr lang="fr-FR" i="1">
+                          <a:latin typeface="Cambria Math" panose="02040503050406030204" pitchFamily="18" charset="0"/>
+                          <a:cs typeface="Times New Roman" panose="02020603050405020304" pitchFamily="18" charset="0"/>
+                        </a:rPr>
+                        <m:t>𝑘</m:t>
+                      </m:r>
+                      <m:r>
+                        <a:rPr lang="fr-FR" i="1">
+                          <a:latin typeface="Cambria Math" panose="02040503050406030204" pitchFamily="18" charset="0"/>
+                          <a:ea typeface="Cambria Math" panose="02040503050406030204" pitchFamily="18" charset="0"/>
+                          <a:cs typeface="Times New Roman" panose="02020603050405020304" pitchFamily="18" charset="0"/>
+                        </a:rPr>
+                        <m:t>∙</m:t>
+                      </m:r>
+                      <m:r>
+                        <a:rPr lang="fr-FR" i="1">
+                          <a:latin typeface="Cambria Math" panose="02040503050406030204" pitchFamily="18" charset="0"/>
+                          <a:ea typeface="Cambria Math" panose="02040503050406030204" pitchFamily="18" charset="0"/>
+                          <a:cs typeface="Times New Roman" panose="02020603050405020304" pitchFamily="18" charset="0"/>
+                        </a:rPr>
+                        <m:t>𝐶</m:t>
+                      </m:r>
+                      <m:r>
+                        <a:rPr lang="fr-FR" b="0" i="1" smtClean="0">
+                          <a:latin typeface="Cambria Math" panose="02040503050406030204" pitchFamily="18" charset="0"/>
+                          <a:ea typeface="Cambria Math" panose="02040503050406030204" pitchFamily="18" charset="0"/>
+                          <a:cs typeface="Times New Roman" panose="02020603050405020304" pitchFamily="18" charset="0"/>
+                        </a:rPr>
+                        <m:t>+</m:t>
+                      </m:r>
+                      <m:f>
+                        <m:fPr>
+                          <m:ctrlPr>
+                            <a:rPr lang="fr-FR" i="1">
+                              <a:latin typeface="Cambria Math" panose="02040503050406030204" pitchFamily="18" charset="0"/>
+                            </a:rPr>
+                          </m:ctrlPr>
+                        </m:fPr>
+                        <m:num>
+                          <m:sSub>
+                            <m:sSubPr>
+                              <m:ctrlPr>
+                                <a:rPr lang="fr-FR" i="1">
+                                  <a:latin typeface="Cambria Math" panose="02040503050406030204" pitchFamily="18" charset="0"/>
+                                </a:rPr>
+                              </m:ctrlPr>
+                            </m:sSubPr>
+                            <m:e>
+                              <m:r>
+                                <a:rPr lang="fr-FR" i="1">
+                                  <a:latin typeface="Cambria Math" panose="02040503050406030204" pitchFamily="18" charset="0"/>
+                                </a:rPr>
+                                <m:t>𝐶</m:t>
+                              </m:r>
+                            </m:e>
+                            <m:sub>
+                              <m:r>
+                                <a:rPr lang="fr-FR" i="1">
+                                  <a:latin typeface="Cambria Math" panose="02040503050406030204" pitchFamily="18" charset="0"/>
+                                </a:rPr>
+                                <m:t>𝑒</m:t>
+                              </m:r>
+                            </m:sub>
+                          </m:sSub>
+                        </m:num>
+                        <m:den>
+                          <m:sSup>
+                            <m:sSupPr>
+                              <m:ctrlPr>
+                                <a:rPr lang="fr-FR" i="1">
+                                  <a:latin typeface="Cambria Math" panose="02040503050406030204" pitchFamily="18" charset="0"/>
+                                </a:rPr>
+                              </m:ctrlPr>
+                            </m:sSupPr>
+                            <m:e>
+                              <m:r>
+                                <a:rPr lang="fr-FR" i="1">
+                                  <a:latin typeface="Cambria Math" panose="02040503050406030204" pitchFamily="18" charset="0"/>
+                                </a:rPr>
+                                <m:t>𝑅</m:t>
+                              </m:r>
+                            </m:e>
+                            <m:sup>
+                              <m:r>
+                                <a:rPr lang="fr-FR" i="1">
+                                  <a:latin typeface="Cambria Math" panose="02040503050406030204" pitchFamily="18" charset="0"/>
+                                </a:rPr>
+                                <m:t>2</m:t>
+                              </m:r>
+                            </m:sup>
+                          </m:sSup>
+                        </m:den>
+                      </m:f>
+                      <m:d>
+                        <m:dPr>
+                          <m:begChr m:val="["/>
+                          <m:endChr m:val="]"/>
+                          <m:ctrlPr>
+                            <a:rPr lang="fr-FR" i="1">
+                              <a:latin typeface="Cambria Math" panose="02040503050406030204" pitchFamily="18" charset="0"/>
+                            </a:rPr>
+                          </m:ctrlPr>
+                        </m:dPr>
+                        <m:e>
+                          <m:r>
+                            <a:rPr lang="fr-FR" i="1">
+                              <a:latin typeface="Cambria Math" panose="02040503050406030204" pitchFamily="18" charset="0"/>
+                            </a:rPr>
+                            <m:t>𝑟</m:t>
+                          </m:r>
+                          <m:r>
+                            <a:rPr lang="fr-FR" i="1">
+                              <a:latin typeface="Cambria Math" panose="02040503050406030204" pitchFamily="18" charset="0"/>
+                            </a:rPr>
+                            <m:t>²</m:t>
+                          </m:r>
+                          <m:f>
+                            <m:fPr>
+                              <m:ctrlPr>
+                                <a:rPr lang="fr-FR" i="1">
+                                  <a:latin typeface="Cambria Math" panose="02040503050406030204" pitchFamily="18" charset="0"/>
+                                </a:rPr>
+                              </m:ctrlPr>
+                            </m:fPr>
+                            <m:num>
+                              <m:r>
+                                <a:rPr lang="fr-FR" i="1">
+                                  <a:latin typeface="Cambria Math" panose="02040503050406030204" pitchFamily="18" charset="0"/>
+                                  <a:ea typeface="Cambria Math" panose="02040503050406030204" pitchFamily="18" charset="0"/>
+                                </a:rPr>
+                                <m:t>𝜋</m:t>
+                              </m:r>
+                            </m:num>
+                            <m:den>
+                              <m:sSub>
+                                <m:sSubPr>
+                                  <m:ctrlPr>
+                                    <a:rPr lang="fr-FR" i="1">
+                                      <a:latin typeface="Cambria Math" panose="02040503050406030204" pitchFamily="18" charset="0"/>
+                                    </a:rPr>
+                                  </m:ctrlPr>
+                                </m:sSubPr>
+                                <m:e>
+                                  <m:r>
+                                    <a:rPr lang="fr-FR" i="1">
+                                      <a:latin typeface="Cambria Math" panose="02040503050406030204" pitchFamily="18" charset="0"/>
+                                    </a:rPr>
+                                    <m:t>𝑡</m:t>
+                                  </m:r>
+                                </m:e>
+                                <m:sub>
+                                  <m:r>
+                                    <a:rPr lang="fr-FR" i="1">
+                                      <a:latin typeface="Cambria Math" panose="02040503050406030204" pitchFamily="18" charset="0"/>
+                                    </a:rPr>
+                                    <m:t>𝑓</m:t>
+                                  </m:r>
+                                </m:sub>
+                              </m:sSub>
+                            </m:den>
+                          </m:f>
+                          <m:r>
+                            <a:rPr lang="fr-FR" i="1">
+                              <a:latin typeface="Cambria Math" panose="02040503050406030204" pitchFamily="18" charset="0"/>
+                              <a:ea typeface="Cambria Math" panose="02040503050406030204" pitchFamily="18" charset="0"/>
+                            </a:rPr>
+                            <m:t>∙</m:t>
+                          </m:r>
+                          <m:r>
+                            <a:rPr lang="fr-FR" i="1">
+                              <a:latin typeface="Cambria Math" panose="02040503050406030204" pitchFamily="18" charset="0"/>
+                              <a:ea typeface="Cambria Math" panose="02040503050406030204" pitchFamily="18" charset="0"/>
+                            </a:rPr>
+                            <m:t>𝑐𝑜𝑠</m:t>
+                          </m:r>
+                          <m:d>
+                            <m:dPr>
+                              <m:ctrlPr>
+                                <a:rPr lang="fr-FR" i="1">
+                                  <a:latin typeface="Cambria Math" panose="02040503050406030204" pitchFamily="18" charset="0"/>
+                                  <a:ea typeface="Cambria Math" panose="02040503050406030204" pitchFamily="18" charset="0"/>
+                                </a:rPr>
+                              </m:ctrlPr>
+                            </m:dPr>
+                            <m:e>
+                              <m:f>
+                                <m:fPr>
+                                  <m:ctrlPr>
+                                    <a:rPr lang="fr-FR" i="1">
+                                      <a:latin typeface="Cambria Math" panose="02040503050406030204" pitchFamily="18" charset="0"/>
+                                      <a:ea typeface="Cambria Math" panose="02040503050406030204" pitchFamily="18" charset="0"/>
+                                    </a:rPr>
+                                  </m:ctrlPr>
+                                </m:fPr>
+                                <m:num>
+                                  <m:r>
+                                    <a:rPr lang="fr-FR" i="1">
+                                      <a:latin typeface="Cambria Math" panose="02040503050406030204" pitchFamily="18" charset="0"/>
+                                      <a:ea typeface="Cambria Math" panose="02040503050406030204" pitchFamily="18" charset="0"/>
+                                    </a:rPr>
+                                    <m:t>𝜋</m:t>
+                                  </m:r>
+                                  <m:r>
+                                    <a:rPr lang="fr-FR" i="1">
+                                      <a:latin typeface="Cambria Math" panose="02040503050406030204" pitchFamily="18" charset="0"/>
+                                      <a:ea typeface="Cambria Math" panose="02040503050406030204" pitchFamily="18" charset="0"/>
+                                    </a:rPr>
+                                    <m:t>𝑡</m:t>
+                                  </m:r>
+                                </m:num>
+                                <m:den>
+                                  <m:sSub>
+                                    <m:sSubPr>
+                                      <m:ctrlPr>
+                                        <a:rPr lang="fr-FR" i="1">
+                                          <a:latin typeface="Cambria Math" panose="02040503050406030204" pitchFamily="18" charset="0"/>
+                                          <a:ea typeface="Cambria Math" panose="02040503050406030204" pitchFamily="18" charset="0"/>
+                                        </a:rPr>
+                                      </m:ctrlPr>
+                                    </m:sSubPr>
+                                    <m:e>
+                                      <m:r>
+                                        <a:rPr lang="fr-FR" i="1">
+                                          <a:latin typeface="Cambria Math" panose="02040503050406030204" pitchFamily="18" charset="0"/>
+                                          <a:ea typeface="Cambria Math" panose="02040503050406030204" pitchFamily="18" charset="0"/>
+                                        </a:rPr>
+                                        <m:t>𝑡</m:t>
+                                      </m:r>
+                                    </m:e>
+                                    <m:sub>
+                                      <m:r>
+                                        <a:rPr lang="fr-FR" i="1">
+                                          <a:latin typeface="Cambria Math" panose="02040503050406030204" pitchFamily="18" charset="0"/>
+                                          <a:ea typeface="Cambria Math" panose="02040503050406030204" pitchFamily="18" charset="0"/>
+                                        </a:rPr>
+                                        <m:t>𝑓</m:t>
+                                      </m:r>
+                                    </m:sub>
+                                  </m:sSub>
+                                </m:den>
+                              </m:f>
+                            </m:e>
+                          </m:d>
+                          <m:r>
+                            <a:rPr lang="fr-FR" i="1">
+                              <a:latin typeface="Cambria Math" panose="02040503050406030204" pitchFamily="18" charset="0"/>
+                              <a:ea typeface="Cambria Math" panose="02040503050406030204" pitchFamily="18" charset="0"/>
+                            </a:rPr>
+                            <m:t>+</m:t>
+                          </m:r>
+                          <m:r>
+                            <a:rPr lang="fr-FR" i="1">
+                              <a:latin typeface="Cambria Math" panose="02040503050406030204" pitchFamily="18" charset="0"/>
+                              <a:ea typeface="Cambria Math" panose="02040503050406030204" pitchFamily="18" charset="0"/>
+                            </a:rPr>
+                            <m:t>𝑠𝑖𝑛</m:t>
+                          </m:r>
+                          <m:d>
+                            <m:dPr>
+                              <m:ctrlPr>
+                                <a:rPr lang="fr-FR" i="1">
+                                  <a:latin typeface="Cambria Math" panose="02040503050406030204" pitchFamily="18" charset="0"/>
+                                  <a:ea typeface="Cambria Math" panose="02040503050406030204" pitchFamily="18" charset="0"/>
+                                </a:rPr>
+                              </m:ctrlPr>
+                            </m:dPr>
+                            <m:e>
+                              <m:f>
+                                <m:fPr>
+                                  <m:ctrlPr>
+                                    <a:rPr lang="fr-FR" i="1">
+                                      <a:latin typeface="Cambria Math" panose="02040503050406030204" pitchFamily="18" charset="0"/>
+                                      <a:ea typeface="Cambria Math" panose="02040503050406030204" pitchFamily="18" charset="0"/>
+                                    </a:rPr>
+                                  </m:ctrlPr>
+                                </m:fPr>
+                                <m:num>
+                                  <m:r>
+                                    <a:rPr lang="fr-FR" i="1">
+                                      <a:latin typeface="Cambria Math" panose="02040503050406030204" pitchFamily="18" charset="0"/>
+                                      <a:ea typeface="Cambria Math" panose="02040503050406030204" pitchFamily="18" charset="0"/>
+                                    </a:rPr>
+                                    <m:t>𝜋</m:t>
+                                  </m:r>
+                                  <m:r>
+                                    <a:rPr lang="fr-FR" i="1">
+                                      <a:latin typeface="Cambria Math" panose="02040503050406030204" pitchFamily="18" charset="0"/>
+                                      <a:ea typeface="Cambria Math" panose="02040503050406030204" pitchFamily="18" charset="0"/>
+                                    </a:rPr>
+                                    <m:t>𝑡</m:t>
+                                  </m:r>
+                                </m:num>
+                                <m:den>
+                                  <m:sSub>
+                                    <m:sSubPr>
+                                      <m:ctrlPr>
+                                        <a:rPr lang="fr-FR" i="1">
+                                          <a:latin typeface="Cambria Math" panose="02040503050406030204" pitchFamily="18" charset="0"/>
+                                          <a:ea typeface="Cambria Math" panose="02040503050406030204" pitchFamily="18" charset="0"/>
+                                        </a:rPr>
+                                      </m:ctrlPr>
+                                    </m:sSubPr>
+                                    <m:e>
+                                      <m:r>
+                                        <a:rPr lang="fr-FR" i="1">
+                                          <a:latin typeface="Cambria Math" panose="02040503050406030204" pitchFamily="18" charset="0"/>
+                                          <a:ea typeface="Cambria Math" panose="02040503050406030204" pitchFamily="18" charset="0"/>
+                                        </a:rPr>
+                                        <m:t>𝑡</m:t>
+                                      </m:r>
+                                    </m:e>
+                                    <m:sub>
+                                      <m:r>
+                                        <a:rPr lang="fr-FR" i="1">
+                                          <a:latin typeface="Cambria Math" panose="02040503050406030204" pitchFamily="18" charset="0"/>
+                                          <a:ea typeface="Cambria Math" panose="02040503050406030204" pitchFamily="18" charset="0"/>
+                                        </a:rPr>
+                                        <m:t>𝑓</m:t>
+                                      </m:r>
+                                    </m:sub>
+                                  </m:sSub>
+                                </m:den>
+                              </m:f>
+                            </m:e>
+                          </m:d>
+                          <m:d>
+                            <m:dPr>
+                              <m:ctrlPr>
+                                <a:rPr lang="fr-FR" i="1">
+                                  <a:latin typeface="Cambria Math" panose="02040503050406030204" pitchFamily="18" charset="0"/>
+                                  <a:ea typeface="Cambria Math" panose="02040503050406030204" pitchFamily="18" charset="0"/>
+                                </a:rPr>
+                              </m:ctrlPr>
+                            </m:dPr>
+                            <m:e>
+                              <m:r>
+                                <a:rPr lang="fr-FR" i="1">
+                                  <a:latin typeface="Cambria Math" panose="02040503050406030204" pitchFamily="18" charset="0"/>
+                                  <a:ea typeface="Cambria Math" panose="02040503050406030204" pitchFamily="18" charset="0"/>
+                                </a:rPr>
+                                <m:t>𝑘</m:t>
+                              </m:r>
+                              <m:sSup>
+                                <m:sSupPr>
+                                  <m:ctrlPr>
+                                    <a:rPr lang="fr-FR" i="1">
+                                      <a:latin typeface="Cambria Math" panose="02040503050406030204" pitchFamily="18" charset="0"/>
+                                      <a:ea typeface="Cambria Math" panose="02040503050406030204" pitchFamily="18" charset="0"/>
+                                    </a:rPr>
+                                  </m:ctrlPr>
+                                </m:sSupPr>
+                                <m:e>
+                                  <m:r>
+                                    <a:rPr lang="fr-FR" i="1">
+                                      <a:latin typeface="Cambria Math" panose="02040503050406030204" pitchFamily="18" charset="0"/>
+                                    </a:rPr>
+                                    <m:t>𝑟</m:t>
+                                  </m:r>
+                                </m:e>
+                                <m:sup>
+                                  <m:r>
+                                    <a:rPr lang="fr-FR" i="1">
+                                      <a:latin typeface="Cambria Math" panose="02040503050406030204" pitchFamily="18" charset="0"/>
+                                    </a:rPr>
+                                    <m:t>2</m:t>
+                                  </m:r>
+                                </m:sup>
+                              </m:sSup>
+                              <m:r>
+                                <a:rPr lang="fr-FR" i="1">
+                                  <a:latin typeface="Cambria Math" panose="02040503050406030204" pitchFamily="18" charset="0"/>
+                                </a:rPr>
+                                <m:t>−</m:t>
+                              </m:r>
+                              <m:sSub>
+                                <m:sSubPr>
+                                  <m:ctrlPr>
+                                    <a:rPr lang="fr-FR" i="1">
+                                      <a:latin typeface="Cambria Math" panose="02040503050406030204" pitchFamily="18" charset="0"/>
+                                    </a:rPr>
+                                  </m:ctrlPr>
+                                </m:sSubPr>
+                                <m:e>
+                                  <m:r>
+                                    <a:rPr lang="fr-FR" i="1">
+                                      <a:latin typeface="Cambria Math" panose="02040503050406030204" pitchFamily="18" charset="0"/>
+                                    </a:rPr>
+                                    <m:t>4</m:t>
+                                  </m:r>
+                                  <m:r>
+                                    <a:rPr lang="fr-FR" i="1">
+                                      <a:latin typeface="Cambria Math" panose="02040503050406030204" pitchFamily="18" charset="0"/>
+                                    </a:rPr>
+                                    <m:t>𝐷</m:t>
+                                  </m:r>
+                                </m:e>
+                                <m:sub>
+                                  <m:r>
+                                    <a:rPr lang="fr-FR" i="1">
+                                      <a:latin typeface="Cambria Math" panose="02040503050406030204" pitchFamily="18" charset="0"/>
+                                    </a:rPr>
+                                    <m:t>𝑒𝑓𝑓</m:t>
+                                  </m:r>
+                                </m:sub>
+                              </m:sSub>
+                            </m:e>
+                          </m:d>
+                        </m:e>
+                      </m:d>
+                    </m:oMath>
+                  </m:oMathPara>
+                </a14:m>
+                <a:endParaRPr lang="fr-FR" noProof="0" dirty="0"/>
+              </a:p>
+            </p:txBody>
+          </p:sp>
+        </mc:Choice>
+        <mc:Fallback>
+          <p:sp>
+            <p:nvSpPr>
+              <p:cNvPr id="11" name="TextBox 10">
+                <a:extLst>
+                  <a:ext uri="{FF2B5EF4-FFF2-40B4-BE49-F238E27FC236}">
+                    <a16:creationId xmlns:a16="http://schemas.microsoft.com/office/drawing/2014/main" id="{CEE01445-5110-B067-DED9-8FFB49916167}"/>
+                  </a:ext>
+                </a:extLst>
+              </p:cNvPr>
+              <p:cNvSpPr txBox="1">
+                <a:spLocks noRot="1" noChangeAspect="1" noMove="1" noResize="1" noEditPoints="1" noAdjustHandles="1" noChangeArrowheads="1" noChangeShapeType="1" noTextEdit="1"/>
+              </p:cNvSpPr>
+              <p:nvPr/>
+            </p:nvSpPr>
+            <p:spPr>
+              <a:xfrm>
+                <a:off x="1996478" y="991510"/>
+                <a:ext cx="8199039" cy="631840"/>
+              </a:xfrm>
+              <a:prstGeom prst="rect">
+                <a:avLst/>
+              </a:prstGeom>
+              <a:blipFill>
+                <a:blip r:embed="rId2"/>
+                <a:stretch>
+                  <a:fillRect b="-971"/>
+                </a:stretch>
+              </a:blipFill>
+            </p:spPr>
+            <p:txBody>
+              <a:bodyPr/>
+              <a:lstStyle/>
+              <a:p>
+                <a:r>
+                  <a:rPr lang="en-GB">
+                    <a:noFill/>
+                  </a:rPr>
+                  <a:t> </a:t>
+                </a:r>
+              </a:p>
+            </p:txBody>
+          </p:sp>
+        </mc:Fallback>
+      </mc:AlternateContent>
       <p:pic>
         <p:nvPicPr>
-          <p:cNvPr id="8" name="Picture 7">
+          <p:cNvPr id="13" name="Picture 12" descr="A graph with different colored lines&#10;&#10;AI-generated content may be incorrect.">
             <a:extLst>
               <a:ext uri="{FF2B5EF4-FFF2-40B4-BE49-F238E27FC236}">
-                <a16:creationId xmlns:a16="http://schemas.microsoft.com/office/drawing/2014/main" id="{FF444D27-8B34-CCF0-453E-A027C5C9CE53}"/>
+                <a16:creationId xmlns:a16="http://schemas.microsoft.com/office/drawing/2014/main" id="{419696E6-B824-48E8-3557-8146E42E4256}"/>
               </a:ext>
             </a:extLst>
           </p:cNvPr>
@@ -27677,15 +30214,21 @@
           <p:nvPr/>
         </p:nvPicPr>
         <p:blipFill>
-          <a:blip r:embed="rId2"/>
+          <a:blip r:embed="rId3">
+            <a:extLst>
+              <a:ext uri="{28A0092B-C50C-407E-A947-70E740481C1C}">
+                <a14:useLocalDpi xmlns:a14="http://schemas.microsoft.com/office/drawing/2010/main" val="0"/>
+              </a:ext>
+            </a:extLst>
+          </a:blip>
           <a:stretch>
             <a:fillRect/>
           </a:stretch>
         </p:blipFill>
         <p:spPr>
           <a:xfrm>
-            <a:off x="1644221" y="1072338"/>
-            <a:ext cx="4451777" cy="3414052"/>
+            <a:off x="458793" y="2299245"/>
+            <a:ext cx="5637204" cy="4227903"/>
           </a:xfrm>
           <a:prstGeom prst="rect">
             <a:avLst/>
@@ -27694,10 +30237,10 @@
       </p:pic>
       <p:pic>
         <p:nvPicPr>
-          <p:cNvPr id="19" name="Picture 18">
+          <p:cNvPr id="15" name="Picture 14" descr="A graph with different colored lines&#10;&#10;AI-generated content may be incorrect.">
             <a:extLst>
               <a:ext uri="{FF2B5EF4-FFF2-40B4-BE49-F238E27FC236}">
-                <a16:creationId xmlns:a16="http://schemas.microsoft.com/office/drawing/2014/main" id="{92D1AD73-0F5F-8BF0-CBFA-CED3B8D450B9}"/>
+                <a16:creationId xmlns:a16="http://schemas.microsoft.com/office/drawing/2014/main" id="{56AA2CCE-2CE0-7B0A-AC79-BE4AD48986CA}"/>
               </a:ext>
             </a:extLst>
           </p:cNvPr>
@@ -27707,15 +30250,21 @@
           <p:nvPr/>
         </p:nvPicPr>
         <p:blipFill>
-          <a:blip r:embed="rId3"/>
+          <a:blip r:embed="rId4">
+            <a:extLst>
+              <a:ext uri="{28A0092B-C50C-407E-A947-70E740481C1C}">
+                <a14:useLocalDpi xmlns:a14="http://schemas.microsoft.com/office/drawing/2010/main" val="0"/>
+              </a:ext>
+            </a:extLst>
+          </a:blip>
           <a:stretch>
             <a:fillRect/>
           </a:stretch>
         </p:blipFill>
         <p:spPr>
           <a:xfrm>
-            <a:off x="6095998" y="1072338"/>
-            <a:ext cx="4346258" cy="3414052"/>
+            <a:off x="6095996" y="2299245"/>
+            <a:ext cx="5637203" cy="4227902"/>
           </a:xfrm>
           <a:prstGeom prst="rect">
             <a:avLst/>

</xml_diff>

<commit_message>
Maj Modif Soon To Come
</commit_message>
<xml_diff>
--- a/doc/Rapport_Devoir2.pptx
+++ b/doc/Rapport_Devoir2.pptx
@@ -134,7 +134,7 @@
 <file path=ppt/revisionInfo.xml><?xml version="1.0" encoding="utf-8"?>
 <p1510:revInfo xmlns:a="http://schemas.openxmlformats.org/drawingml/2006/main" xmlns:r="http://schemas.openxmlformats.org/officeDocument/2006/relationships" xmlns:p1510="http://schemas.microsoft.com/office/powerpoint/2015/10/main">
   <p1510:revLst>
-    <p1510:client id="{1D234A9C-22E0-43CD-8D54-3191A7902E4E}" v="1444" dt="2025-02-27T00:52:17.103"/>
+    <p1510:client id="{1D234A9C-22E0-43CD-8D54-3191A7902E4E}" v="1462" dt="2025-02-28T01:46:18.378"/>
   </p1510:revLst>
 </p1510:revInfo>
 </file>
@@ -899,7 +899,7 @@
   <pc:docChgLst>
     <pc:chgData name="François GLEYZON" userId="a2d04f23f7faf3ef" providerId="LiveId" clId="{1D234A9C-22E0-43CD-8D54-3191A7902E4E}"/>
     <pc:docChg chg="undo redo custSel addSld delSld modSld">
-      <pc:chgData name="François GLEYZON" userId="a2d04f23f7faf3ef" providerId="LiveId" clId="{1D234A9C-22E0-43CD-8D54-3191A7902E4E}" dt="2025-02-27T01:03:08.166" v="3623" actId="478"/>
+      <pc:chgData name="François GLEYZON" userId="a2d04f23f7faf3ef" providerId="LiveId" clId="{1D234A9C-22E0-43CD-8D54-3191A7902E4E}" dt="2025-02-28T01:46:25.131" v="3723" actId="1038"/>
       <pc:docMkLst>
         <pc:docMk/>
       </pc:docMkLst>
@@ -1175,38 +1175,6 @@
           <pc:docMk/>
           <pc:sldMk cId="2174773392" sldId="263"/>
         </pc:sldMkLst>
-        <pc:spChg chg="del">
-          <ac:chgData name="François GLEYZON" userId="a2d04f23f7faf3ef" providerId="LiveId" clId="{1D234A9C-22E0-43CD-8D54-3191A7902E4E}" dt="2025-02-26T20:54:16.674" v="3521" actId="478"/>
-          <ac:spMkLst>
-            <pc:docMk/>
-            <pc:sldMk cId="2174773392" sldId="263"/>
-            <ac:spMk id="6" creationId="{51B5442A-C3C4-1A8F-D37A-D5F1A379EC7E}"/>
-          </ac:spMkLst>
-        </pc:spChg>
-        <pc:spChg chg="del">
-          <ac:chgData name="François GLEYZON" userId="a2d04f23f7faf3ef" providerId="LiveId" clId="{1D234A9C-22E0-43CD-8D54-3191A7902E4E}" dt="2025-02-26T20:54:16.674" v="3521" actId="478"/>
-          <ac:spMkLst>
-            <pc:docMk/>
-            <pc:sldMk cId="2174773392" sldId="263"/>
-            <ac:spMk id="10" creationId="{13A11EAD-00C7-DE8C-6393-ABE7B1826CB4}"/>
-          </ac:spMkLst>
-        </pc:spChg>
-        <pc:spChg chg="del">
-          <ac:chgData name="François GLEYZON" userId="a2d04f23f7faf3ef" providerId="LiveId" clId="{1D234A9C-22E0-43CD-8D54-3191A7902E4E}" dt="2025-02-26T20:54:17.844" v="3522" actId="478"/>
-          <ac:spMkLst>
-            <pc:docMk/>
-            <pc:sldMk cId="2174773392" sldId="263"/>
-            <ac:spMk id="15" creationId="{7BDA4E76-F589-4B48-9CFA-A285AB337AE0}"/>
-          </ac:spMkLst>
-        </pc:spChg>
-        <pc:picChg chg="del">
-          <ac:chgData name="François GLEYZON" userId="a2d04f23f7faf3ef" providerId="LiveId" clId="{1D234A9C-22E0-43CD-8D54-3191A7902E4E}" dt="2025-02-26T20:54:16.674" v="3521" actId="478"/>
-          <ac:picMkLst>
-            <pc:docMk/>
-            <pc:sldMk cId="2174773392" sldId="263"/>
-            <ac:picMk id="13" creationId="{EF2EFB49-ED70-4B27-2033-047136B683A5}"/>
-          </ac:picMkLst>
-        </pc:picChg>
       </pc:sldChg>
       <pc:sldChg chg="delSp mod">
         <pc:chgData name="François GLEYZON" userId="a2d04f23f7faf3ef" providerId="LiveId" clId="{1D234A9C-22E0-43CD-8D54-3191A7902E4E}" dt="2025-02-26T20:54:26.404" v="3526" actId="478"/>
@@ -1214,78 +1182,6 @@
           <pc:docMk/>
           <pc:sldMk cId="508563345" sldId="264"/>
         </pc:sldMkLst>
-        <pc:spChg chg="del">
-          <ac:chgData name="François GLEYZON" userId="a2d04f23f7faf3ef" providerId="LiveId" clId="{1D234A9C-22E0-43CD-8D54-3191A7902E4E}" dt="2025-02-26T20:54:26.404" v="3526" actId="478"/>
-          <ac:spMkLst>
-            <pc:docMk/>
-            <pc:sldMk cId="508563345" sldId="264"/>
-            <ac:spMk id="6" creationId="{C0FB229F-7FDE-60BB-7C9D-FA8C75D93FFE}"/>
-          </ac:spMkLst>
-        </pc:spChg>
-        <pc:spChg chg="del">
-          <ac:chgData name="François GLEYZON" userId="a2d04f23f7faf3ef" providerId="LiveId" clId="{1D234A9C-22E0-43CD-8D54-3191A7902E4E}" dt="2025-02-26T20:54:24.334" v="3524" actId="478"/>
-          <ac:spMkLst>
-            <pc:docMk/>
-            <pc:sldMk cId="508563345" sldId="264"/>
-            <ac:spMk id="7" creationId="{70CF15AE-9D08-54F9-6B23-DBA1C0275690}"/>
-          </ac:spMkLst>
-        </pc:spChg>
-        <pc:spChg chg="del">
-          <ac:chgData name="François GLEYZON" userId="a2d04f23f7faf3ef" providerId="LiveId" clId="{1D234A9C-22E0-43CD-8D54-3191A7902E4E}" dt="2025-02-26T20:54:22.558" v="3523" actId="478"/>
-          <ac:spMkLst>
-            <pc:docMk/>
-            <pc:sldMk cId="508563345" sldId="264"/>
-            <ac:spMk id="8" creationId="{3F71D19F-FB6D-FE38-AC51-717B965503B7}"/>
-          </ac:spMkLst>
-        </pc:spChg>
-        <pc:spChg chg="del">
-          <ac:chgData name="François GLEYZON" userId="a2d04f23f7faf3ef" providerId="LiveId" clId="{1D234A9C-22E0-43CD-8D54-3191A7902E4E}" dt="2025-02-26T20:54:25.734" v="3525" actId="478"/>
-          <ac:spMkLst>
-            <pc:docMk/>
-            <pc:sldMk cId="508563345" sldId="264"/>
-            <ac:spMk id="9" creationId="{1A3D098E-C0A1-7DE8-1262-2E4E31F8E4CB}"/>
-          </ac:spMkLst>
-        </pc:spChg>
-        <pc:spChg chg="del">
-          <ac:chgData name="François GLEYZON" userId="a2d04f23f7faf3ef" providerId="LiveId" clId="{1D234A9C-22E0-43CD-8D54-3191A7902E4E}" dt="2025-02-26T20:54:22.558" v="3523" actId="478"/>
-          <ac:spMkLst>
-            <pc:docMk/>
-            <pc:sldMk cId="508563345" sldId="264"/>
-            <ac:spMk id="10" creationId="{1827829A-69C1-05E0-82FC-47D7A4E8CFA8}"/>
-          </ac:spMkLst>
-        </pc:spChg>
-        <pc:spChg chg="del">
-          <ac:chgData name="François GLEYZON" userId="a2d04f23f7faf3ef" providerId="LiveId" clId="{1D234A9C-22E0-43CD-8D54-3191A7902E4E}" dt="2025-02-26T20:54:24.334" v="3524" actId="478"/>
-          <ac:spMkLst>
-            <pc:docMk/>
-            <pc:sldMk cId="508563345" sldId="264"/>
-            <ac:spMk id="11" creationId="{F3FF0ABE-9BDA-8589-BCA2-AC743838ACFC}"/>
-          </ac:spMkLst>
-        </pc:spChg>
-        <pc:spChg chg="del">
-          <ac:chgData name="François GLEYZON" userId="a2d04f23f7faf3ef" providerId="LiveId" clId="{1D234A9C-22E0-43CD-8D54-3191A7902E4E}" dt="2025-02-26T20:54:22.558" v="3523" actId="478"/>
-          <ac:spMkLst>
-            <pc:docMk/>
-            <pc:sldMk cId="508563345" sldId="264"/>
-            <ac:spMk id="12" creationId="{280E63AB-7E7C-412D-9775-611C8F43CE44}"/>
-          </ac:spMkLst>
-        </pc:spChg>
-        <pc:spChg chg="del">
-          <ac:chgData name="François GLEYZON" userId="a2d04f23f7faf3ef" providerId="LiveId" clId="{1D234A9C-22E0-43CD-8D54-3191A7902E4E}" dt="2025-02-26T20:54:22.558" v="3523" actId="478"/>
-          <ac:spMkLst>
-            <pc:docMk/>
-            <pc:sldMk cId="508563345" sldId="264"/>
-            <ac:spMk id="13" creationId="{F2151F1C-7D98-8A07-DABB-9BF880922990}"/>
-          </ac:spMkLst>
-        </pc:spChg>
-        <pc:spChg chg="del">
-          <ac:chgData name="François GLEYZON" userId="a2d04f23f7faf3ef" providerId="LiveId" clId="{1D234A9C-22E0-43CD-8D54-3191A7902E4E}" dt="2025-02-26T20:54:22.558" v="3523" actId="478"/>
-          <ac:spMkLst>
-            <pc:docMk/>
-            <pc:sldMk cId="508563345" sldId="264"/>
-            <ac:spMk id="14" creationId="{E677CC0B-52E0-83B5-C15B-7233C6AD2BA3}"/>
-          </ac:spMkLst>
-        </pc:spChg>
       </pc:sldChg>
       <pc:sldChg chg="addSp delSp modSp mod">
         <pc:chgData name="François GLEYZON" userId="a2d04f23f7faf3ef" providerId="LiveId" clId="{1D234A9C-22E0-43CD-8D54-3191A7902E4E}" dt="2025-02-22T17:48:46.668" v="682" actId="1076"/>
@@ -1550,7 +1446,7 @@
         </pc:cxnChg>
       </pc:sldChg>
       <pc:sldChg chg="addSp delSp modSp add mod">
-        <pc:chgData name="François GLEYZON" userId="a2d04f23f7faf3ef" providerId="LiveId" clId="{1D234A9C-22E0-43CD-8D54-3191A7902E4E}" dt="2025-02-26T23:00:00.644" v="3562" actId="20577"/>
+        <pc:chgData name="François GLEYZON" userId="a2d04f23f7faf3ef" providerId="LiveId" clId="{1D234A9C-22E0-43CD-8D54-3191A7902E4E}" dt="2025-02-28T01:46:25.131" v="3723" actId="1038"/>
         <pc:sldMkLst>
           <pc:docMk/>
           <pc:sldMk cId="3012370290" sldId="267"/>
@@ -1572,7 +1468,7 @@
           </ac:spMkLst>
         </pc:spChg>
         <pc:spChg chg="add mod">
-          <ac:chgData name="François GLEYZON" userId="a2d04f23f7faf3ef" providerId="LiveId" clId="{1D234A9C-22E0-43CD-8D54-3191A7902E4E}" dt="2025-02-22T19:11:08.639" v="1783" actId="14100"/>
+          <ac:chgData name="François GLEYZON" userId="a2d04f23f7faf3ef" providerId="LiveId" clId="{1D234A9C-22E0-43CD-8D54-3191A7902E4E}" dt="2025-02-28T01:42:04.694" v="3668" actId="1038"/>
           <ac:spMkLst>
             <pc:docMk/>
             <pc:sldMk cId="3012370290" sldId="267"/>
@@ -1580,7 +1476,7 @@
           </ac:spMkLst>
         </pc:spChg>
         <pc:spChg chg="add mod">
-          <ac:chgData name="François GLEYZON" userId="a2d04f23f7faf3ef" providerId="LiveId" clId="{1D234A9C-22E0-43CD-8D54-3191A7902E4E}" dt="2025-02-23T01:30:34.913" v="2806" actId="1076"/>
+          <ac:chgData name="François GLEYZON" userId="a2d04f23f7faf3ef" providerId="LiveId" clId="{1D234A9C-22E0-43CD-8D54-3191A7902E4E}" dt="2025-02-28T00:48:34.960" v="3627" actId="20577"/>
           <ac:spMkLst>
             <pc:docMk/>
             <pc:sldMk cId="3012370290" sldId="267"/>
@@ -1596,7 +1492,7 @@
           </ac:spMkLst>
         </pc:spChg>
         <pc:spChg chg="mod">
-          <ac:chgData name="François GLEYZON" userId="a2d04f23f7faf3ef" providerId="LiveId" clId="{1D234A9C-22E0-43CD-8D54-3191A7902E4E}" dt="2025-02-22T19:07:59.194" v="1621" actId="14100"/>
+          <ac:chgData name="François GLEYZON" userId="a2d04f23f7faf3ef" providerId="LiveId" clId="{1D234A9C-22E0-43CD-8D54-3191A7902E4E}" dt="2025-02-28T01:41:17.295" v="3629" actId="14100"/>
           <ac:spMkLst>
             <pc:docMk/>
             <pc:sldMk cId="3012370290" sldId="267"/>
@@ -1604,7 +1500,7 @@
           </ac:spMkLst>
         </pc:spChg>
         <pc:spChg chg="mod">
-          <ac:chgData name="François GLEYZON" userId="a2d04f23f7faf3ef" providerId="LiveId" clId="{1D234A9C-22E0-43CD-8D54-3191A7902E4E}" dt="2025-02-26T23:00:00.644" v="3562" actId="20577"/>
+          <ac:chgData name="François GLEYZON" userId="a2d04f23f7faf3ef" providerId="LiveId" clId="{1D234A9C-22E0-43CD-8D54-3191A7902E4E}" dt="2025-02-28T01:41:57.699" v="3651" actId="1038"/>
           <ac:spMkLst>
             <pc:docMk/>
             <pc:sldMk cId="3012370290" sldId="267"/>
@@ -1612,7 +1508,7 @@
           </ac:spMkLst>
         </pc:spChg>
         <pc:spChg chg="mod">
-          <ac:chgData name="François GLEYZON" userId="a2d04f23f7faf3ef" providerId="LiveId" clId="{1D234A9C-22E0-43CD-8D54-3191A7902E4E}" dt="2025-02-22T19:08:17.074" v="1656" actId="1036"/>
+          <ac:chgData name="François GLEYZON" userId="a2d04f23f7faf3ef" providerId="LiveId" clId="{1D234A9C-22E0-43CD-8D54-3191A7902E4E}" dt="2025-02-28T01:41:48.618" v="3633" actId="14100"/>
           <ac:spMkLst>
             <pc:docMk/>
             <pc:sldMk cId="3012370290" sldId="267"/>
@@ -1620,7 +1516,7 @@
           </ac:spMkLst>
         </pc:spChg>
         <pc:spChg chg="mod">
-          <ac:chgData name="François GLEYZON" userId="a2d04f23f7faf3ef" providerId="LiveId" clId="{1D234A9C-22E0-43CD-8D54-3191A7902E4E}" dt="2025-02-22T19:08:26.999" v="1675" actId="1036"/>
+          <ac:chgData name="François GLEYZON" userId="a2d04f23f7faf3ef" providerId="LiveId" clId="{1D234A9C-22E0-43CD-8D54-3191A7902E4E}" dt="2025-02-28T01:46:25.131" v="3723" actId="1038"/>
           <ac:spMkLst>
             <pc:docMk/>
             <pc:sldMk cId="3012370290" sldId="267"/>
@@ -1628,7 +1524,7 @@
           </ac:spMkLst>
         </pc:spChg>
         <pc:spChg chg="mod">
-          <ac:chgData name="François GLEYZON" userId="a2d04f23f7faf3ef" providerId="LiveId" clId="{1D234A9C-22E0-43CD-8D54-3191A7902E4E}" dt="2025-02-22T19:08:31.209" v="1688" actId="1035"/>
+          <ac:chgData name="François GLEYZON" userId="a2d04f23f7faf3ef" providerId="LiveId" clId="{1D234A9C-22E0-43CD-8D54-3191A7902E4E}" dt="2025-02-28T01:46:25.131" v="3723" actId="1038"/>
           <ac:spMkLst>
             <pc:docMk/>
             <pc:sldMk cId="3012370290" sldId="267"/>
@@ -1872,7 +1768,7 @@
           <a:p>
             <a:fld id="{536D1BE0-9163-4941-8556-7FE0B29195A4}" type="datetimeFigureOut">
               <a:rPr lang="en-GB" smtClean="0"/>
-              <a:t>26/02/2025</a:t>
+              <a:t>27/02/2025</a:t>
             </a:fld>
             <a:endParaRPr lang="en-GB"/>
           </a:p>
@@ -2373,7 +2269,7 @@
           <a:p>
             <a:fld id="{CEFDEF93-0E3A-4A89-BC16-F38BAE82060D}" type="datetimeFigureOut">
               <a:rPr lang="en-GB" smtClean="0"/>
-              <a:t>26/02/2025</a:t>
+              <a:t>27/02/2025</a:t>
             </a:fld>
             <a:endParaRPr lang="en-GB"/>
           </a:p>
@@ -2573,7 +2469,7 @@
           <a:p>
             <a:fld id="{CEFDEF93-0E3A-4A89-BC16-F38BAE82060D}" type="datetimeFigureOut">
               <a:rPr lang="en-GB" smtClean="0"/>
-              <a:t>26/02/2025</a:t>
+              <a:t>27/02/2025</a:t>
             </a:fld>
             <a:endParaRPr lang="en-GB"/>
           </a:p>
@@ -2783,7 +2679,7 @@
           <a:p>
             <a:fld id="{CEFDEF93-0E3A-4A89-BC16-F38BAE82060D}" type="datetimeFigureOut">
               <a:rPr lang="en-GB" smtClean="0"/>
-              <a:t>26/02/2025</a:t>
+              <a:t>27/02/2025</a:t>
             </a:fld>
             <a:endParaRPr lang="en-GB"/>
           </a:p>
@@ -2983,7 +2879,7 @@
           <a:p>
             <a:fld id="{CEFDEF93-0E3A-4A89-BC16-F38BAE82060D}" type="datetimeFigureOut">
               <a:rPr lang="en-GB" smtClean="0"/>
-              <a:t>26/02/2025</a:t>
+              <a:t>27/02/2025</a:t>
             </a:fld>
             <a:endParaRPr lang="en-GB"/>
           </a:p>
@@ -3259,7 +3155,7 @@
           <a:p>
             <a:fld id="{CEFDEF93-0E3A-4A89-BC16-F38BAE82060D}" type="datetimeFigureOut">
               <a:rPr lang="en-GB" smtClean="0"/>
-              <a:t>26/02/2025</a:t>
+              <a:t>27/02/2025</a:t>
             </a:fld>
             <a:endParaRPr lang="en-GB"/>
           </a:p>
@@ -3527,7 +3423,7 @@
           <a:p>
             <a:fld id="{CEFDEF93-0E3A-4A89-BC16-F38BAE82060D}" type="datetimeFigureOut">
               <a:rPr lang="en-GB" smtClean="0"/>
-              <a:t>26/02/2025</a:t>
+              <a:t>27/02/2025</a:t>
             </a:fld>
             <a:endParaRPr lang="en-GB"/>
           </a:p>
@@ -3942,7 +3838,7 @@
           <a:p>
             <a:fld id="{CEFDEF93-0E3A-4A89-BC16-F38BAE82060D}" type="datetimeFigureOut">
               <a:rPr lang="en-GB" smtClean="0"/>
-              <a:t>26/02/2025</a:t>
+              <a:t>27/02/2025</a:t>
             </a:fld>
             <a:endParaRPr lang="en-GB"/>
           </a:p>
@@ -4084,7 +3980,7 @@
           <a:p>
             <a:fld id="{CEFDEF93-0E3A-4A89-BC16-F38BAE82060D}" type="datetimeFigureOut">
               <a:rPr lang="en-GB" smtClean="0"/>
-              <a:t>26/02/2025</a:t>
+              <a:t>27/02/2025</a:t>
             </a:fld>
             <a:endParaRPr lang="en-GB"/>
           </a:p>
@@ -4197,7 +4093,7 @@
           <a:p>
             <a:fld id="{CEFDEF93-0E3A-4A89-BC16-F38BAE82060D}" type="datetimeFigureOut">
               <a:rPr lang="en-GB" smtClean="0"/>
-              <a:t>26/02/2025</a:t>
+              <a:t>27/02/2025</a:t>
             </a:fld>
             <a:endParaRPr lang="en-GB"/>
           </a:p>
@@ -4510,7 +4406,7 @@
           <a:p>
             <a:fld id="{CEFDEF93-0E3A-4A89-BC16-F38BAE82060D}" type="datetimeFigureOut">
               <a:rPr lang="en-GB" smtClean="0"/>
-              <a:t>26/02/2025</a:t>
+              <a:t>27/02/2025</a:t>
             </a:fld>
             <a:endParaRPr lang="en-GB"/>
           </a:p>
@@ -4799,7 +4695,7 @@
           <a:p>
             <a:fld id="{CEFDEF93-0E3A-4A89-BC16-F38BAE82060D}" type="datetimeFigureOut">
               <a:rPr lang="en-GB" smtClean="0"/>
-              <a:t>26/02/2025</a:t>
+              <a:t>27/02/2025</a:t>
             </a:fld>
             <a:endParaRPr lang="en-GB"/>
           </a:p>
@@ -5042,7 +4938,7 @@
           <a:p>
             <a:fld id="{CEFDEF93-0E3A-4A89-BC16-F38BAE82060D}" type="datetimeFigureOut">
               <a:rPr lang="en-GB" smtClean="0"/>
-              <a:t>26/02/2025</a:t>
+              <a:t>27/02/2025</a:t>
             </a:fld>
             <a:endParaRPr lang="en-GB"/>
           </a:p>
@@ -15015,8 +14911,8 @@
           </a:p>
         </p:txBody>
       </p:sp>
-      <mc:AlternateContent xmlns:mc="http://schemas.openxmlformats.org/markup-compatibility/2006" xmlns:a14="http://schemas.microsoft.com/office/drawing/2010/main">
-        <mc:Choice Requires="a14">
+      <mc:AlternateContent xmlns:mc="http://schemas.openxmlformats.org/markup-compatibility/2006">
+        <mc:Choice xmlns:a14="http://schemas.microsoft.com/office/drawing/2010/main" Requires="a14">
           <p:sp>
             <p:nvSpPr>
               <p:cNvPr id="30" name="TextBox 29">
@@ -15032,7 +14928,7 @@
             <p:spPr>
               <a:xfrm>
                 <a:off x="101599" y="2253346"/>
-                <a:ext cx="8827509" cy="553228"/>
+                <a:ext cx="9300955" cy="553228"/>
               </a:xfrm>
               <a:prstGeom prst="rect">
                 <a:avLst/>
@@ -15442,6 +15338,27 @@
                             <m:t>+</m:t>
                           </m:r>
                           <m:r>
+                            <a:rPr lang="fr-FR" sz="1600" i="1">
+                              <a:latin typeface="Cambria Math" panose="02040503050406030204" pitchFamily="18" charset="0"/>
+                              <a:ea typeface="Cambria Math" panose="02040503050406030204" pitchFamily="18" charset="0"/>
+                            </a:rPr>
+                            <m:t>∆</m:t>
+                          </m:r>
+                          <m:r>
+                            <a:rPr lang="fr-FR" sz="1600" i="1">
+                              <a:latin typeface="Cambria Math" panose="02040503050406030204" pitchFamily="18" charset="0"/>
+                              <a:ea typeface="Cambria Math" panose="02040503050406030204" pitchFamily="18" charset="0"/>
+                            </a:rPr>
+                            <m:t>𝑡</m:t>
+                          </m:r>
+                          <m:r>
+                            <a:rPr lang="fr-FR" sz="1600" i="1">
+                              <a:latin typeface="Cambria Math" panose="02040503050406030204" pitchFamily="18" charset="0"/>
+                              <a:ea typeface="Cambria Math" panose="02040503050406030204" pitchFamily="18" charset="0"/>
+                            </a:rPr>
+                            <m:t>∙</m:t>
+                          </m:r>
+                          <m:r>
                             <a:rPr lang="fr-FR" sz="1600" b="0" i="1" smtClean="0">
                               <a:latin typeface="Cambria Math" panose="02040503050406030204" pitchFamily="18" charset="0"/>
                               <a:ea typeface="Cambria Math" panose="02040503050406030204" pitchFamily="18" charset="0"/>
@@ -15723,7 +15640,7 @@
             </p:txBody>
           </p:sp>
         </mc:Choice>
-        <mc:Fallback xmlns="">
+        <mc:Fallback>
           <p:sp>
             <p:nvSpPr>
               <p:cNvPr id="30" name="TextBox 29">
@@ -15741,7 +15658,7 @@
             <p:spPr>
               <a:xfrm>
                 <a:off x="101599" y="2253346"/>
-                <a:ext cx="8827509" cy="553228"/>
+                <a:ext cx="9300955" cy="553228"/>
               </a:xfrm>
               <a:prstGeom prst="rect">
                 <a:avLst/>
@@ -15784,7 +15701,7 @@
             </p:nvSpPr>
             <p:spPr>
               <a:xfrm>
-                <a:off x="233329" y="2841620"/>
+                <a:off x="378367" y="2841620"/>
                 <a:ext cx="9522303" cy="629275"/>
               </a:xfrm>
               <a:prstGeom prst="rect">
@@ -16274,7 +16191,7 @@
             </p:nvSpPr>
             <p:spPr>
               <a:xfrm>
-                <a:off x="233329" y="2841620"/>
+                <a:off x="378367" y="2841620"/>
                 <a:ext cx="9522303" cy="629275"/>
               </a:xfrm>
               <a:prstGeom prst="rect">
@@ -16302,8 +16219,8 @@
           </p:sp>
         </mc:Fallback>
       </mc:AlternateContent>
-      <mc:AlternateContent xmlns:mc="http://schemas.openxmlformats.org/markup-compatibility/2006" xmlns:a14="http://schemas.microsoft.com/office/drawing/2010/main">
-        <mc:Choice Requires="a14">
+      <mc:AlternateContent xmlns:mc="http://schemas.openxmlformats.org/markup-compatibility/2006">
+        <mc:Choice xmlns:a14="http://schemas.microsoft.com/office/drawing/2010/main" Requires="a14">
           <p:sp>
             <p:nvSpPr>
               <p:cNvPr id="32" name="TextBox 31">
@@ -16319,7 +16236,7 @@
             <p:spPr>
               <a:xfrm>
                 <a:off x="101598" y="3380916"/>
-                <a:ext cx="9654034" cy="553228"/>
+                <a:ext cx="10322562" cy="553228"/>
               </a:xfrm>
               <a:prstGeom prst="rect">
                 <a:avLst/>
@@ -16735,6 +16652,27 @@
                             <m:t>+</m:t>
                           </m:r>
                           <m:r>
+                            <a:rPr lang="fr-FR" sz="1600" i="1">
+                              <a:latin typeface="Cambria Math" panose="02040503050406030204" pitchFamily="18" charset="0"/>
+                              <a:ea typeface="Cambria Math" panose="02040503050406030204" pitchFamily="18" charset="0"/>
+                            </a:rPr>
+                            <m:t>∆</m:t>
+                          </m:r>
+                          <m:r>
+                            <a:rPr lang="fr-FR" sz="1600" i="1">
+                              <a:latin typeface="Cambria Math" panose="02040503050406030204" pitchFamily="18" charset="0"/>
+                              <a:ea typeface="Cambria Math" panose="02040503050406030204" pitchFamily="18" charset="0"/>
+                            </a:rPr>
+                            <m:t>𝑡</m:t>
+                          </m:r>
+                          <m:r>
+                            <a:rPr lang="fr-FR" sz="1600" i="1">
+                              <a:latin typeface="Cambria Math" panose="02040503050406030204" pitchFamily="18" charset="0"/>
+                              <a:ea typeface="Cambria Math" panose="02040503050406030204" pitchFamily="18" charset="0"/>
+                            </a:rPr>
+                            <m:t>∙</m:t>
+                          </m:r>
+                          <m:r>
                             <a:rPr lang="fr-FR" sz="1600" b="0" i="1" smtClean="0">
                               <a:latin typeface="Cambria Math" panose="02040503050406030204" pitchFamily="18" charset="0"/>
                               <a:ea typeface="Cambria Math" panose="02040503050406030204" pitchFamily="18" charset="0"/>
@@ -17010,7 +16948,7 @@
             </p:txBody>
           </p:sp>
         </mc:Choice>
-        <mc:Fallback xmlns="">
+        <mc:Fallback>
           <p:sp>
             <p:nvSpPr>
               <p:cNvPr id="32" name="TextBox 31">
@@ -17028,7 +16966,7 @@
             <p:spPr>
               <a:xfrm>
                 <a:off x="101598" y="3380916"/>
-                <a:ext cx="9654034" cy="553228"/>
+                <a:ext cx="10322562" cy="553228"/>
               </a:xfrm>
               <a:prstGeom prst="rect">
                 <a:avLst/>
@@ -17055,8 +16993,8 @@
           </p:sp>
         </mc:Fallback>
       </mc:AlternateContent>
-      <mc:AlternateContent xmlns:mc="http://schemas.openxmlformats.org/markup-compatibility/2006" xmlns:a14="http://schemas.microsoft.com/office/drawing/2010/main">
-        <mc:Choice Requires="a14">
+      <mc:AlternateContent xmlns:mc="http://schemas.openxmlformats.org/markup-compatibility/2006">
+        <mc:Choice xmlns:a14="http://schemas.microsoft.com/office/drawing/2010/main" Requires="a14">
           <p:sp>
             <p:nvSpPr>
               <p:cNvPr id="33" name="TextBox 32">
@@ -17071,8 +17009,8 @@
             </p:nvSpPr>
             <p:spPr>
               <a:xfrm>
-                <a:off x="101599" y="3931352"/>
-                <a:ext cx="9654034" cy="553228"/>
+                <a:off x="95289" y="3931352"/>
+                <a:ext cx="10322562" cy="553228"/>
               </a:xfrm>
               <a:prstGeom prst="rect">
                 <a:avLst/>
@@ -17488,6 +17426,27 @@
                             <m:t>+</m:t>
                           </m:r>
                           <m:r>
+                            <a:rPr lang="fr-FR" sz="1600" i="1">
+                              <a:latin typeface="Cambria Math" panose="02040503050406030204" pitchFamily="18" charset="0"/>
+                              <a:ea typeface="Cambria Math" panose="02040503050406030204" pitchFamily="18" charset="0"/>
+                            </a:rPr>
+                            <m:t>∆</m:t>
+                          </m:r>
+                          <m:r>
+                            <a:rPr lang="fr-FR" sz="1600" i="1">
+                              <a:latin typeface="Cambria Math" panose="02040503050406030204" pitchFamily="18" charset="0"/>
+                              <a:ea typeface="Cambria Math" panose="02040503050406030204" pitchFamily="18" charset="0"/>
+                            </a:rPr>
+                            <m:t>𝑡</m:t>
+                          </m:r>
+                          <m:r>
+                            <a:rPr lang="fr-FR" sz="1600" i="1">
+                              <a:latin typeface="Cambria Math" panose="02040503050406030204" pitchFamily="18" charset="0"/>
+                              <a:ea typeface="Cambria Math" panose="02040503050406030204" pitchFamily="18" charset="0"/>
+                            </a:rPr>
+                            <m:t>∙</m:t>
+                          </m:r>
+                          <m:r>
                             <a:rPr lang="fr-FR" sz="1600" b="0" i="1" smtClean="0">
                               <a:latin typeface="Cambria Math" panose="02040503050406030204" pitchFamily="18" charset="0"/>
                               <a:ea typeface="Cambria Math" panose="02040503050406030204" pitchFamily="18" charset="0"/>
@@ -17763,7 +17722,7 @@
             </p:txBody>
           </p:sp>
         </mc:Choice>
-        <mc:Fallback xmlns="">
+        <mc:Fallback>
           <p:sp>
             <p:nvSpPr>
               <p:cNvPr id="33" name="TextBox 32">
@@ -17780,8 +17739,8 @@
             </p:nvSpPr>
             <p:spPr>
               <a:xfrm>
-                <a:off x="101599" y="3931352"/>
-                <a:ext cx="9654034" cy="553228"/>
+                <a:off x="95289" y="3931352"/>
+                <a:ext cx="10322562" cy="553228"/>
               </a:xfrm>
               <a:prstGeom prst="rect">
                 <a:avLst/>
@@ -17808,8 +17767,8 @@
           </p:sp>
         </mc:Fallback>
       </mc:AlternateContent>
-      <mc:AlternateContent xmlns:mc="http://schemas.openxmlformats.org/markup-compatibility/2006" xmlns:a14="http://schemas.microsoft.com/office/drawing/2010/main">
-        <mc:Choice Requires="a14">
+      <mc:AlternateContent xmlns:mc="http://schemas.openxmlformats.org/markup-compatibility/2006">
+        <mc:Choice xmlns:a14="http://schemas.microsoft.com/office/drawing/2010/main" Requires="a14">
           <p:sp>
             <p:nvSpPr>
               <p:cNvPr id="34" name="TextBox 33">
@@ -17824,8 +17783,8 @@
             </p:nvSpPr>
             <p:spPr>
               <a:xfrm>
-                <a:off x="101598" y="4470652"/>
-                <a:ext cx="9654034" cy="553228"/>
+                <a:off x="95288" y="4470652"/>
+                <a:ext cx="10322562" cy="553228"/>
               </a:xfrm>
               <a:prstGeom prst="rect">
                 <a:avLst/>
@@ -18241,6 +18200,27 @@
                             <m:t>+</m:t>
                           </m:r>
                           <m:r>
+                            <a:rPr lang="fr-FR" sz="1600" i="1">
+                              <a:latin typeface="Cambria Math" panose="02040503050406030204" pitchFamily="18" charset="0"/>
+                              <a:ea typeface="Cambria Math" panose="02040503050406030204" pitchFamily="18" charset="0"/>
+                            </a:rPr>
+                            <m:t>∆</m:t>
+                          </m:r>
+                          <m:r>
+                            <a:rPr lang="fr-FR" sz="1600" i="1">
+                              <a:latin typeface="Cambria Math" panose="02040503050406030204" pitchFamily="18" charset="0"/>
+                              <a:ea typeface="Cambria Math" panose="02040503050406030204" pitchFamily="18" charset="0"/>
+                            </a:rPr>
+                            <m:t>𝑡</m:t>
+                          </m:r>
+                          <m:r>
+                            <a:rPr lang="fr-FR" sz="1600" i="1">
+                              <a:latin typeface="Cambria Math" panose="02040503050406030204" pitchFamily="18" charset="0"/>
+                              <a:ea typeface="Cambria Math" panose="02040503050406030204" pitchFamily="18" charset="0"/>
+                            </a:rPr>
+                            <m:t>∙</m:t>
+                          </m:r>
+                          <m:r>
                             <a:rPr lang="fr-FR" sz="1600" b="0" i="1" smtClean="0">
                               <a:latin typeface="Cambria Math" panose="02040503050406030204" pitchFamily="18" charset="0"/>
                               <a:ea typeface="Cambria Math" panose="02040503050406030204" pitchFamily="18" charset="0"/>
@@ -18516,7 +18496,7 @@
             </p:txBody>
           </p:sp>
         </mc:Choice>
-        <mc:Fallback xmlns="">
+        <mc:Fallback>
           <p:sp>
             <p:nvSpPr>
               <p:cNvPr id="34" name="TextBox 33">
@@ -18533,8 +18513,8 @@
             </p:nvSpPr>
             <p:spPr>
               <a:xfrm>
-                <a:off x="101598" y="4470652"/>
-                <a:ext cx="9654034" cy="553228"/>
+                <a:off x="95288" y="4470652"/>
+                <a:ext cx="10322562" cy="553228"/>
               </a:xfrm>
               <a:prstGeom prst="rect">
                 <a:avLst/>
@@ -18561,8 +18541,8 @@
           </p:sp>
         </mc:Fallback>
       </mc:AlternateContent>
-      <mc:AlternateContent xmlns:mc="http://schemas.openxmlformats.org/markup-compatibility/2006" xmlns:a14="http://schemas.microsoft.com/office/drawing/2010/main">
-        <mc:Choice Requires="a14">
+      <mc:AlternateContent xmlns:mc="http://schemas.openxmlformats.org/markup-compatibility/2006">
+        <mc:Choice xmlns:a14="http://schemas.microsoft.com/office/drawing/2010/main" Requires="a14">
           <p:sp>
             <p:nvSpPr>
               <p:cNvPr id="6" name="TextBox 5">
@@ -18577,7 +18557,7 @@
             </p:nvSpPr>
             <p:spPr>
               <a:xfrm>
-                <a:off x="101598" y="5035016"/>
+                <a:off x="252944" y="5035016"/>
                 <a:ext cx="1821795" cy="255391"/>
               </a:xfrm>
               <a:prstGeom prst="rect">
@@ -18688,7 +18668,7 @@
             </p:txBody>
           </p:sp>
         </mc:Choice>
-        <mc:Fallback xmlns="">
+        <mc:Fallback>
           <p:sp>
             <p:nvSpPr>
               <p:cNvPr id="6" name="TextBox 5">
@@ -18705,7 +18685,7 @@
             </p:nvSpPr>
             <p:spPr>
               <a:xfrm>
-                <a:off x="101598" y="5035016"/>
+                <a:off x="252944" y="5035016"/>
                 <a:ext cx="1821795" cy="255391"/>
               </a:xfrm>
               <a:prstGeom prst="rect">
@@ -18733,8 +18713,8 @@
           </p:sp>
         </mc:Fallback>
       </mc:AlternateContent>
-      <mc:AlternateContent xmlns:mc="http://schemas.openxmlformats.org/markup-compatibility/2006" xmlns:a14="http://schemas.microsoft.com/office/drawing/2010/main">
-        <mc:Choice Requires="a14">
+      <mc:AlternateContent xmlns:mc="http://schemas.openxmlformats.org/markup-compatibility/2006">
+        <mc:Choice xmlns:a14="http://schemas.microsoft.com/office/drawing/2010/main" Requires="a14">
           <p:sp>
             <p:nvSpPr>
               <p:cNvPr id="7" name="TextBox 6">
@@ -18916,49 +18896,17 @@
                         </m:r>
                       </m:sup>
                     </m:sSup>
-                    <m:r>
-                      <a:rPr lang="fr-FR" b="0" i="1" noProof="0" smtClean="0">
-                        <a:latin typeface="Cambria Math" panose="02040503050406030204" pitchFamily="18" charset="0"/>
-                        <a:ea typeface="Cambria Math" panose="02040503050406030204" pitchFamily="18" charset="0"/>
-                        <a:cs typeface="Times New Roman" panose="02020603050405020304" pitchFamily="18" charset="0"/>
-                      </a:rPr>
-                      <m:t>+</m:t>
-                    </m:r>
-                    <m:bar>
-                      <m:barPr>
-                        <m:ctrlPr>
-                          <a:rPr lang="fr-FR" b="0" i="1" noProof="0" smtClean="0">
-                            <a:latin typeface="Cambria Math" panose="02040503050406030204" pitchFamily="18" charset="0"/>
-                            <a:ea typeface="Cambria Math" panose="02040503050406030204" pitchFamily="18" charset="0"/>
-                            <a:cs typeface="Times New Roman" panose="02020603050405020304" pitchFamily="18" charset="0"/>
-                          </a:rPr>
-                        </m:ctrlPr>
-                      </m:barPr>
-                      <m:e>
-                        <m:r>
-                          <a:rPr lang="fr-FR" b="0" i="1" noProof="0" smtClean="0">
-                            <a:latin typeface="Cambria Math" panose="02040503050406030204" pitchFamily="18" charset="0"/>
-                            <a:ea typeface="Cambria Math" panose="02040503050406030204" pitchFamily="18" charset="0"/>
-                            <a:cs typeface="Times New Roman" panose="02020603050405020304" pitchFamily="18" charset="0"/>
-                          </a:rPr>
-                          <m:t>𝑏</m:t>
-                        </m:r>
-                      </m:e>
-                    </m:bar>
                   </m:oMath>
                 </a14:m>
-                <a:r>
-                  <a:rPr lang="fr-FR" noProof="0" dirty="0">
-                    <a:latin typeface="Times New Roman" panose="02020603050405020304" pitchFamily="18" charset="0"/>
-                    <a:cs typeface="Times New Roman" panose="02020603050405020304" pitchFamily="18" charset="0"/>
-                  </a:rPr>
-                  <a:t>  </a:t>
-                </a:r>
+                <a:endParaRPr lang="fr-FR" noProof="0" dirty="0">
+                  <a:latin typeface="Times New Roman" panose="02020603050405020304" pitchFamily="18" charset="0"/>
+                  <a:cs typeface="Times New Roman" panose="02020603050405020304" pitchFamily="18" charset="0"/>
+                </a:endParaRPr>
               </a:p>
             </p:txBody>
           </p:sp>
         </mc:Choice>
-        <mc:Fallback xmlns="">
+        <mc:Fallback>
           <p:sp>
             <p:nvSpPr>
               <p:cNvPr id="7" name="TextBox 6">
@@ -24402,8 +24350,8 @@
           </a:p>
         </p:txBody>
       </p:sp>
-      <mc:AlternateContent xmlns:mc="http://schemas.openxmlformats.org/markup-compatibility/2006">
-        <mc:Choice xmlns:a14="http://schemas.microsoft.com/office/drawing/2010/main" Requires="a14">
+      <mc:AlternateContent xmlns:mc="http://schemas.openxmlformats.org/markup-compatibility/2006" xmlns:a14="http://schemas.microsoft.com/office/drawing/2010/main">
+        <mc:Choice Requires="a14">
           <p:sp>
             <p:nvSpPr>
               <p:cNvPr id="10" name="TextBox 9">
@@ -24695,7 +24643,7 @@
             </p:txBody>
           </p:sp>
         </mc:Choice>
-        <mc:Fallback>
+        <mc:Fallback xmlns="">
           <p:sp>
             <p:nvSpPr>
               <p:cNvPr id="10" name="TextBox 9">
@@ -24779,8 +24727,8 @@
           </a:p>
         </p:txBody>
       </p:sp>
-      <mc:AlternateContent xmlns:mc="http://schemas.openxmlformats.org/markup-compatibility/2006">
-        <mc:Choice xmlns:a14="http://schemas.microsoft.com/office/drawing/2010/main" Requires="a14">
+      <mc:AlternateContent xmlns:mc="http://schemas.openxmlformats.org/markup-compatibility/2006" xmlns:a14="http://schemas.microsoft.com/office/drawing/2010/main">
+        <mc:Choice Requires="a14">
           <p:sp>
             <p:nvSpPr>
               <p:cNvPr id="13" name="TextBox 12">
@@ -25099,7 +25047,7 @@
             </p:txBody>
           </p:sp>
         </mc:Choice>
-        <mc:Fallback>
+        <mc:Fallback xmlns="">
           <p:sp>
             <p:nvSpPr>
               <p:cNvPr id="13" name="TextBox 12">
@@ -25428,8 +25376,8 @@
           </p:sp>
         </mc:Fallback>
       </mc:AlternateContent>
-      <mc:AlternateContent xmlns:mc="http://schemas.openxmlformats.org/markup-compatibility/2006">
-        <mc:Choice xmlns:a14="http://schemas.microsoft.com/office/drawing/2010/main" Requires="a14">
+      <mc:AlternateContent xmlns:mc="http://schemas.openxmlformats.org/markup-compatibility/2006" xmlns:a14="http://schemas.microsoft.com/office/drawing/2010/main">
+        <mc:Choice Requires="a14">
           <p:sp>
             <p:nvSpPr>
               <p:cNvPr id="15" name="TextBox 14">
@@ -25688,7 +25636,7 @@
             </p:txBody>
           </p:sp>
         </mc:Choice>
-        <mc:Fallback>
+        <mc:Fallback xmlns="">
           <p:sp>
             <p:nvSpPr>
               <p:cNvPr id="15" name="TextBox 14">
@@ -25810,8 +25758,8 @@
           </a:p>
         </p:txBody>
       </p:sp>
-      <mc:AlternateContent xmlns:mc="http://schemas.openxmlformats.org/markup-compatibility/2006">
-        <mc:Choice xmlns:a14="http://schemas.microsoft.com/office/drawing/2010/main" Requires="a14">
+      <mc:AlternateContent xmlns:mc="http://schemas.openxmlformats.org/markup-compatibility/2006" xmlns:a14="http://schemas.microsoft.com/office/drawing/2010/main">
+        <mc:Choice Requires="a14">
           <p:sp>
             <p:nvSpPr>
               <p:cNvPr id="20" name="TextBox 19">
@@ -27511,7 +27459,7 @@
             </p:txBody>
           </p:sp>
         </mc:Choice>
-        <mc:Fallback>
+        <mc:Fallback xmlns="">
           <p:sp>
             <p:nvSpPr>
               <p:cNvPr id="20" name="TextBox 19">
@@ -27556,8 +27504,8 @@
           </p:sp>
         </mc:Fallback>
       </mc:AlternateContent>
-      <mc:AlternateContent xmlns:mc="http://schemas.openxmlformats.org/markup-compatibility/2006">
-        <mc:Choice xmlns:a14="http://schemas.microsoft.com/office/drawing/2010/main" Requires="a14">
+      <mc:AlternateContent xmlns:mc="http://schemas.openxmlformats.org/markup-compatibility/2006" xmlns:a14="http://schemas.microsoft.com/office/drawing/2010/main">
+        <mc:Choice Requires="a14">
           <p:sp>
             <p:nvSpPr>
               <p:cNvPr id="21" name="TextBox 20">
@@ -27881,7 +27829,7 @@
             </p:txBody>
           </p:sp>
         </mc:Choice>
-        <mc:Fallback>
+        <mc:Fallback xmlns="">
           <p:sp>
             <p:nvSpPr>
               <p:cNvPr id="21" name="TextBox 20">
@@ -29045,8 +28993,8 @@
           </a:p>
         </p:txBody>
       </p:sp>
-      <mc:AlternateContent xmlns:mc="http://schemas.openxmlformats.org/markup-compatibility/2006">
-        <mc:Choice xmlns:a14="http://schemas.microsoft.com/office/drawing/2010/main" Requires="a14">
+      <mc:AlternateContent xmlns:mc="http://schemas.openxmlformats.org/markup-compatibility/2006" xmlns:a14="http://schemas.microsoft.com/office/drawing/2010/main">
+        <mc:Choice Requires="a14">
           <p:sp>
             <p:nvSpPr>
               <p:cNvPr id="11" name="TextBox 10">
@@ -29754,7 +29702,7 @@
             </p:txBody>
           </p:sp>
         </mc:Choice>
-        <mc:Fallback>
+        <mc:Fallback xmlns="">
           <p:sp>
             <p:nvSpPr>
               <p:cNvPr id="11" name="TextBox 10">
@@ -30123,8 +30071,8 @@
           </a:p>
         </p:txBody>
       </p:sp>
-      <mc:AlternateContent xmlns:mc="http://schemas.openxmlformats.org/markup-compatibility/2006">
-        <mc:Choice xmlns:a14="http://schemas.microsoft.com/office/drawing/2010/main" Requires="a14">
+      <mc:AlternateContent xmlns:mc="http://schemas.openxmlformats.org/markup-compatibility/2006" xmlns:a14="http://schemas.microsoft.com/office/drawing/2010/main">
+        <mc:Choice Requires="a14">
           <p:sp>
             <p:nvSpPr>
               <p:cNvPr id="27" name="TextBox 26">
@@ -31206,7 +31154,7 @@
             </p:txBody>
           </p:sp>
         </mc:Choice>
-        <mc:Fallback>
+        <mc:Fallback xmlns="">
           <p:sp>
             <p:nvSpPr>
               <p:cNvPr id="27" name="TextBox 26">
@@ -31290,8 +31238,8 @@
           </a:p>
         </p:txBody>
       </p:sp>
-      <mc:AlternateContent xmlns:mc="http://schemas.openxmlformats.org/markup-compatibility/2006">
-        <mc:Choice xmlns:a14="http://schemas.microsoft.com/office/drawing/2010/main" Requires="a14">
+      <mc:AlternateContent xmlns:mc="http://schemas.openxmlformats.org/markup-compatibility/2006" xmlns:a14="http://schemas.microsoft.com/office/drawing/2010/main">
+        <mc:Choice Requires="a14">
           <p:sp>
             <p:nvSpPr>
               <p:cNvPr id="30" name="TextBox 29">
@@ -32488,7 +32436,7 @@
             </p:txBody>
           </p:sp>
         </mc:Choice>
-        <mc:Fallback>
+        <mc:Fallback xmlns="">
           <p:sp>
             <p:nvSpPr>
               <p:cNvPr id="30" name="TextBox 29">
@@ -33055,8 +33003,8 @@
           </p:sp>
         </mc:Fallback>
       </mc:AlternateContent>
-      <mc:AlternateContent xmlns:mc="http://schemas.openxmlformats.org/markup-compatibility/2006">
-        <mc:Choice xmlns:a14="http://schemas.microsoft.com/office/drawing/2010/main" Requires="a14">
+      <mc:AlternateContent xmlns:mc="http://schemas.openxmlformats.org/markup-compatibility/2006" xmlns:a14="http://schemas.microsoft.com/office/drawing/2010/main">
+        <mc:Choice Requires="a14">
           <p:sp>
             <p:nvSpPr>
               <p:cNvPr id="32" name="TextBox 31">
@@ -34253,7 +34201,7 @@
             </p:txBody>
           </p:sp>
         </mc:Choice>
-        <mc:Fallback>
+        <mc:Fallback xmlns="">
           <p:sp>
             <p:nvSpPr>
               <p:cNvPr id="32" name="TextBox 31">
@@ -34298,8 +34246,8 @@
           </p:sp>
         </mc:Fallback>
       </mc:AlternateContent>
-      <mc:AlternateContent xmlns:mc="http://schemas.openxmlformats.org/markup-compatibility/2006">
-        <mc:Choice xmlns:a14="http://schemas.microsoft.com/office/drawing/2010/main" Requires="a14">
+      <mc:AlternateContent xmlns:mc="http://schemas.openxmlformats.org/markup-compatibility/2006" xmlns:a14="http://schemas.microsoft.com/office/drawing/2010/main">
+        <mc:Choice Requires="a14">
           <p:sp>
             <p:nvSpPr>
               <p:cNvPr id="33" name="TextBox 32">
@@ -35496,7 +35444,7 @@
             </p:txBody>
           </p:sp>
         </mc:Choice>
-        <mc:Fallback>
+        <mc:Fallback xmlns="">
           <p:sp>
             <p:nvSpPr>
               <p:cNvPr id="33" name="TextBox 32">
@@ -35541,8 +35489,8 @@
           </p:sp>
         </mc:Fallback>
       </mc:AlternateContent>
-      <mc:AlternateContent xmlns:mc="http://schemas.openxmlformats.org/markup-compatibility/2006">
-        <mc:Choice xmlns:a14="http://schemas.microsoft.com/office/drawing/2010/main" Requires="a14">
+      <mc:AlternateContent xmlns:mc="http://schemas.openxmlformats.org/markup-compatibility/2006" xmlns:a14="http://schemas.microsoft.com/office/drawing/2010/main">
+        <mc:Choice Requires="a14">
           <p:sp>
             <p:nvSpPr>
               <p:cNvPr id="34" name="TextBox 33">
@@ -36739,7 +36687,7 @@
             </p:txBody>
           </p:sp>
         </mc:Choice>
-        <mc:Fallback>
+        <mc:Fallback xmlns="">
           <p:sp>
             <p:nvSpPr>
               <p:cNvPr id="34" name="TextBox 33">
@@ -36784,8 +36732,8 @@
           </p:sp>
         </mc:Fallback>
       </mc:AlternateContent>
-      <mc:AlternateContent xmlns:mc="http://schemas.openxmlformats.org/markup-compatibility/2006">
-        <mc:Choice xmlns:a14="http://schemas.microsoft.com/office/drawing/2010/main" Requires="a14">
+      <mc:AlternateContent xmlns:mc="http://schemas.openxmlformats.org/markup-compatibility/2006" xmlns:a14="http://schemas.microsoft.com/office/drawing/2010/main">
+        <mc:Choice Requires="a14">
           <p:sp>
             <p:nvSpPr>
               <p:cNvPr id="6" name="TextBox 5">
@@ -36992,7 +36940,7 @@
             </p:txBody>
           </p:sp>
         </mc:Choice>
-        <mc:Fallback>
+        <mc:Fallback xmlns="">
           <p:sp>
             <p:nvSpPr>
               <p:cNvPr id="6" name="TextBox 5">

</xml_diff>